<commit_message>
Finish eccentricity error prediction; begin true anomaly error prediction
</commit_message>
<xml_diff>
--- a/journal/figures/hodographMapping.pptx
+++ b/journal/figures/hodographMapping.pptx
@@ -7,6 +7,7 @@
   <p:sldIdLst>
     <p:sldId id="256" r:id="rId2"/>
     <p:sldId id="257" r:id="rId3"/>
+    <p:sldId id="259" r:id="rId4"/>
   </p:sldIdLst>
   <p:sldSz cx="12192000" cy="6858000"/>
   <p:notesSz cx="6858000" cy="9144000"/>
@@ -105,6 +106,11 @@
       </a:defRPr>
     </a:lvl9pPr>
   </p:defaultTextStyle>
+  <p:extLst>
+    <p:ext uri="{EFAFB233-063F-42B5-8137-9DF3F51BA10A}">
+      <p15:sldGuideLst xmlns:p15="http://schemas.microsoft.com/office/powerpoint/2012/main"/>
+    </p:ext>
+  </p:extLst>
 </p:presentation>
 </file>
 
@@ -255,7 +261,7 @@
           <a:p>
             <a:fld id="{2CEF6C36-5691-4952-B197-D88666D142D8}" type="datetimeFigureOut">
               <a:rPr lang="en-US" smtClean="0"/>
-              <a:t>7/27/2020</a:t>
+              <a:t>7/31/2020</a:t>
             </a:fld>
             <a:endParaRPr lang="en-US"/>
           </a:p>
@@ -453,7 +459,7 @@
           <a:p>
             <a:fld id="{2CEF6C36-5691-4952-B197-D88666D142D8}" type="datetimeFigureOut">
               <a:rPr lang="en-US" smtClean="0"/>
-              <a:t>7/27/2020</a:t>
+              <a:t>7/31/2020</a:t>
             </a:fld>
             <a:endParaRPr lang="en-US"/>
           </a:p>
@@ -661,7 +667,7 @@
           <a:p>
             <a:fld id="{2CEF6C36-5691-4952-B197-D88666D142D8}" type="datetimeFigureOut">
               <a:rPr lang="en-US" smtClean="0"/>
-              <a:t>7/27/2020</a:t>
+              <a:t>7/31/2020</a:t>
             </a:fld>
             <a:endParaRPr lang="en-US"/>
           </a:p>
@@ -859,7 +865,7 @@
           <a:p>
             <a:fld id="{2CEF6C36-5691-4952-B197-D88666D142D8}" type="datetimeFigureOut">
               <a:rPr lang="en-US" smtClean="0"/>
-              <a:t>7/27/2020</a:t>
+              <a:t>7/31/2020</a:t>
             </a:fld>
             <a:endParaRPr lang="en-US"/>
           </a:p>
@@ -1134,7 +1140,7 @@
           <a:p>
             <a:fld id="{2CEF6C36-5691-4952-B197-D88666D142D8}" type="datetimeFigureOut">
               <a:rPr lang="en-US" smtClean="0"/>
-              <a:t>7/27/2020</a:t>
+              <a:t>7/31/2020</a:t>
             </a:fld>
             <a:endParaRPr lang="en-US"/>
           </a:p>
@@ -1399,7 +1405,7 @@
           <a:p>
             <a:fld id="{2CEF6C36-5691-4952-B197-D88666D142D8}" type="datetimeFigureOut">
               <a:rPr lang="en-US" smtClean="0"/>
-              <a:t>7/27/2020</a:t>
+              <a:t>7/31/2020</a:t>
             </a:fld>
             <a:endParaRPr lang="en-US"/>
           </a:p>
@@ -1811,7 +1817,7 @@
           <a:p>
             <a:fld id="{2CEF6C36-5691-4952-B197-D88666D142D8}" type="datetimeFigureOut">
               <a:rPr lang="en-US" smtClean="0"/>
-              <a:t>7/27/2020</a:t>
+              <a:t>7/31/2020</a:t>
             </a:fld>
             <a:endParaRPr lang="en-US"/>
           </a:p>
@@ -1952,7 +1958,7 @@
           <a:p>
             <a:fld id="{2CEF6C36-5691-4952-B197-D88666D142D8}" type="datetimeFigureOut">
               <a:rPr lang="en-US" smtClean="0"/>
-              <a:t>7/27/2020</a:t>
+              <a:t>7/31/2020</a:t>
             </a:fld>
             <a:endParaRPr lang="en-US"/>
           </a:p>
@@ -2065,7 +2071,7 @@
           <a:p>
             <a:fld id="{2CEF6C36-5691-4952-B197-D88666D142D8}" type="datetimeFigureOut">
               <a:rPr lang="en-US" smtClean="0"/>
-              <a:t>7/27/2020</a:t>
+              <a:t>7/31/2020</a:t>
             </a:fld>
             <a:endParaRPr lang="en-US"/>
           </a:p>
@@ -2376,7 +2382,7 @@
           <a:p>
             <a:fld id="{2CEF6C36-5691-4952-B197-D88666D142D8}" type="datetimeFigureOut">
               <a:rPr lang="en-US" smtClean="0"/>
-              <a:t>7/27/2020</a:t>
+              <a:t>7/31/2020</a:t>
             </a:fld>
             <a:endParaRPr lang="en-US"/>
           </a:p>
@@ -2664,7 +2670,7 @@
           <a:p>
             <a:fld id="{2CEF6C36-5691-4952-B197-D88666D142D8}" type="datetimeFigureOut">
               <a:rPr lang="en-US" smtClean="0"/>
-              <a:t>7/27/2020</a:t>
+              <a:t>7/31/2020</a:t>
             </a:fld>
             <a:endParaRPr lang="en-US"/>
           </a:p>
@@ -2905,7 +2911,7 @@
           <a:p>
             <a:fld id="{2CEF6C36-5691-4952-B197-D88666D142D8}" type="datetimeFigureOut">
               <a:rPr lang="en-US" smtClean="0"/>
-              <a:t>7/27/2020</a:t>
+              <a:t>7/31/2020</a:t>
             </a:fld>
             <a:endParaRPr lang="en-US"/>
           </a:p>
@@ -5140,6 +5146,1446 @@
 </p:sld>
 </file>
 
+<file path=ppt/slides/slide3.xml><?xml version="1.0" encoding="utf-8"?>
+<p:sld xmlns:a="http://schemas.openxmlformats.org/drawingml/2006/main" xmlns:r="http://schemas.openxmlformats.org/officeDocument/2006/relationships" xmlns:p="http://schemas.openxmlformats.org/presentationml/2006/main">
+  <p:cSld>
+    <p:spTree>
+      <p:nvGrpSpPr>
+        <p:cNvPr id="1" name=""/>
+        <p:cNvGrpSpPr/>
+        <p:nvPr/>
+      </p:nvGrpSpPr>
+      <p:grpSpPr>
+        <a:xfrm>
+          <a:off x="0" y="0"/>
+          <a:ext cx="0" cy="0"/>
+          <a:chOff x="0" y="0"/>
+          <a:chExt cx="0" cy="0"/>
+        </a:xfrm>
+      </p:grpSpPr>
+      <p:sp>
+        <p:nvSpPr>
+          <p:cNvPr id="17" name="Freeform: Shape 16">
+            <a:extLst>
+              <a:ext uri="{FF2B5EF4-FFF2-40B4-BE49-F238E27FC236}">
+                <a16:creationId xmlns:a16="http://schemas.microsoft.com/office/drawing/2014/main" id="{0EF9CF59-7489-46D9-A486-C34791C4B71A}"/>
+              </a:ext>
+            </a:extLst>
+          </p:cNvPr>
+          <p:cNvSpPr/>
+          <p:nvPr/>
+        </p:nvSpPr>
+        <p:spPr>
+          <a:xfrm>
+            <a:off x="7827818" y="415636"/>
+            <a:ext cx="1129146" cy="2064328"/>
+          </a:xfrm>
+          <a:custGeom>
+            <a:avLst/>
+            <a:gdLst>
+              <a:gd name="connsiteX0" fmla="*/ 581891 w 1129146"/>
+              <a:gd name="connsiteY0" fmla="*/ 2064328 h 2064328"/>
+              <a:gd name="connsiteX1" fmla="*/ 1129146 w 1129146"/>
+              <a:gd name="connsiteY1" fmla="*/ 152400 h 2064328"/>
+              <a:gd name="connsiteX2" fmla="*/ 997527 w 1129146"/>
+              <a:gd name="connsiteY2" fmla="*/ 69273 h 2064328"/>
+              <a:gd name="connsiteX3" fmla="*/ 886691 w 1129146"/>
+              <a:gd name="connsiteY3" fmla="*/ 41564 h 2064328"/>
+              <a:gd name="connsiteX4" fmla="*/ 775855 w 1129146"/>
+              <a:gd name="connsiteY4" fmla="*/ 13855 h 2064328"/>
+              <a:gd name="connsiteX5" fmla="*/ 692727 w 1129146"/>
+              <a:gd name="connsiteY5" fmla="*/ 13855 h 2064328"/>
+              <a:gd name="connsiteX6" fmla="*/ 581891 w 1129146"/>
+              <a:gd name="connsiteY6" fmla="*/ 6928 h 2064328"/>
+              <a:gd name="connsiteX7" fmla="*/ 484909 w 1129146"/>
+              <a:gd name="connsiteY7" fmla="*/ 0 h 2064328"/>
+              <a:gd name="connsiteX8" fmla="*/ 367146 w 1129146"/>
+              <a:gd name="connsiteY8" fmla="*/ 34637 h 2064328"/>
+              <a:gd name="connsiteX9" fmla="*/ 187037 w 1129146"/>
+              <a:gd name="connsiteY9" fmla="*/ 90055 h 2064328"/>
+              <a:gd name="connsiteX10" fmla="*/ 69273 w 1129146"/>
+              <a:gd name="connsiteY10" fmla="*/ 138546 h 2064328"/>
+              <a:gd name="connsiteX11" fmla="*/ 0 w 1129146"/>
+              <a:gd name="connsiteY11" fmla="*/ 173182 h 2064328"/>
+              <a:gd name="connsiteX12" fmla="*/ 581891 w 1129146"/>
+              <a:gd name="connsiteY12" fmla="*/ 2064328 h 2064328"/>
+            </a:gdLst>
+            <a:ahLst/>
+            <a:cxnLst>
+              <a:cxn ang="0">
+                <a:pos x="connsiteX0" y="connsiteY0"/>
+              </a:cxn>
+              <a:cxn ang="0">
+                <a:pos x="connsiteX1" y="connsiteY1"/>
+              </a:cxn>
+              <a:cxn ang="0">
+                <a:pos x="connsiteX2" y="connsiteY2"/>
+              </a:cxn>
+              <a:cxn ang="0">
+                <a:pos x="connsiteX3" y="connsiteY3"/>
+              </a:cxn>
+              <a:cxn ang="0">
+                <a:pos x="connsiteX4" y="connsiteY4"/>
+              </a:cxn>
+              <a:cxn ang="0">
+                <a:pos x="connsiteX5" y="connsiteY5"/>
+              </a:cxn>
+              <a:cxn ang="0">
+                <a:pos x="connsiteX6" y="connsiteY6"/>
+              </a:cxn>
+              <a:cxn ang="0">
+                <a:pos x="connsiteX7" y="connsiteY7"/>
+              </a:cxn>
+              <a:cxn ang="0">
+                <a:pos x="connsiteX8" y="connsiteY8"/>
+              </a:cxn>
+              <a:cxn ang="0">
+                <a:pos x="connsiteX9" y="connsiteY9"/>
+              </a:cxn>
+              <a:cxn ang="0">
+                <a:pos x="connsiteX10" y="connsiteY10"/>
+              </a:cxn>
+              <a:cxn ang="0">
+                <a:pos x="connsiteX11" y="connsiteY11"/>
+              </a:cxn>
+              <a:cxn ang="0">
+                <a:pos x="connsiteX12" y="connsiteY12"/>
+              </a:cxn>
+            </a:cxnLst>
+            <a:rect l="l" t="t" r="r" b="b"/>
+            <a:pathLst>
+              <a:path w="1129146" h="2064328">
+                <a:moveTo>
+                  <a:pt x="581891" y="2064328"/>
+                </a:moveTo>
+                <a:lnTo>
+                  <a:pt x="1129146" y="152400"/>
+                </a:lnTo>
+                <a:lnTo>
+                  <a:pt x="997527" y="69273"/>
+                </a:lnTo>
+                <a:lnTo>
+                  <a:pt x="886691" y="41564"/>
+                </a:lnTo>
+                <a:lnTo>
+                  <a:pt x="775855" y="13855"/>
+                </a:lnTo>
+                <a:lnTo>
+                  <a:pt x="692727" y="13855"/>
+                </a:lnTo>
+                <a:lnTo>
+                  <a:pt x="581891" y="6928"/>
+                </a:lnTo>
+                <a:lnTo>
+                  <a:pt x="484909" y="0"/>
+                </a:lnTo>
+                <a:lnTo>
+                  <a:pt x="367146" y="34637"/>
+                </a:lnTo>
+                <a:lnTo>
+                  <a:pt x="187037" y="90055"/>
+                </a:lnTo>
+                <a:lnTo>
+                  <a:pt x="69273" y="138546"/>
+                </a:lnTo>
+                <a:lnTo>
+                  <a:pt x="0" y="173182"/>
+                </a:lnTo>
+                <a:lnTo>
+                  <a:pt x="581891" y="2064328"/>
+                </a:lnTo>
+                <a:close/>
+              </a:path>
+            </a:pathLst>
+          </a:custGeom>
+          <a:solidFill>
+            <a:srgbClr val="FF0000">
+              <a:alpha val="30000"/>
+            </a:srgbClr>
+          </a:solidFill>
+          <a:ln>
+            <a:noFill/>
+          </a:ln>
+        </p:spPr>
+        <p:style>
+          <a:lnRef idx="2">
+            <a:schemeClr val="accent1">
+              <a:shade val="50000"/>
+            </a:schemeClr>
+          </a:lnRef>
+          <a:fillRef idx="1">
+            <a:schemeClr val="accent1"/>
+          </a:fillRef>
+          <a:effectRef idx="0">
+            <a:schemeClr val="accent1"/>
+          </a:effectRef>
+          <a:fontRef idx="minor">
+            <a:schemeClr val="lt1"/>
+          </a:fontRef>
+        </p:style>
+        <p:txBody>
+          <a:bodyPr rtlCol="0" anchor="ctr"/>
+          <a:lstStyle/>
+          <a:p>
+            <a:pPr algn="ctr"/>
+            <a:endParaRPr lang="en-US"/>
+          </a:p>
+        </p:txBody>
+      </p:sp>
+      <p:sp>
+        <p:nvSpPr>
+          <p:cNvPr id="16" name="Freeform: Shape 15">
+            <a:extLst>
+              <a:ext uri="{FF2B5EF4-FFF2-40B4-BE49-F238E27FC236}">
+                <a16:creationId xmlns:a16="http://schemas.microsoft.com/office/drawing/2014/main" id="{C75B2E79-34CE-4E3C-BD82-CC2095B5298E}"/>
+              </a:ext>
+            </a:extLst>
+          </p:cNvPr>
+          <p:cNvSpPr/>
+          <p:nvPr/>
+        </p:nvSpPr>
+        <p:spPr>
+          <a:xfrm rot="251432">
+            <a:off x="3068783" y="2493818"/>
+            <a:ext cx="1468582" cy="685800"/>
+          </a:xfrm>
+          <a:custGeom>
+            <a:avLst/>
+            <a:gdLst>
+              <a:gd name="connsiteX0" fmla="*/ 644237 w 1468582"/>
+              <a:gd name="connsiteY0" fmla="*/ 0 h 685800"/>
+              <a:gd name="connsiteX1" fmla="*/ 0 w 1468582"/>
+              <a:gd name="connsiteY1" fmla="*/ 450272 h 685800"/>
+              <a:gd name="connsiteX2" fmla="*/ 76200 w 1468582"/>
+              <a:gd name="connsiteY2" fmla="*/ 512618 h 685800"/>
+              <a:gd name="connsiteX3" fmla="*/ 242455 w 1468582"/>
+              <a:gd name="connsiteY3" fmla="*/ 602672 h 685800"/>
+              <a:gd name="connsiteX4" fmla="*/ 346364 w 1468582"/>
+              <a:gd name="connsiteY4" fmla="*/ 637309 h 685800"/>
+              <a:gd name="connsiteX5" fmla="*/ 526473 w 1468582"/>
+              <a:gd name="connsiteY5" fmla="*/ 671945 h 685800"/>
+              <a:gd name="connsiteX6" fmla="*/ 671946 w 1468582"/>
+              <a:gd name="connsiteY6" fmla="*/ 685800 h 685800"/>
+              <a:gd name="connsiteX7" fmla="*/ 803564 w 1468582"/>
+              <a:gd name="connsiteY7" fmla="*/ 665018 h 685800"/>
+              <a:gd name="connsiteX8" fmla="*/ 983673 w 1468582"/>
+              <a:gd name="connsiteY8" fmla="*/ 623454 h 685800"/>
+              <a:gd name="connsiteX9" fmla="*/ 1184564 w 1468582"/>
+              <a:gd name="connsiteY9" fmla="*/ 540327 h 685800"/>
+              <a:gd name="connsiteX10" fmla="*/ 1295400 w 1468582"/>
+              <a:gd name="connsiteY10" fmla="*/ 450272 h 685800"/>
+              <a:gd name="connsiteX11" fmla="*/ 1468582 w 1468582"/>
+              <a:gd name="connsiteY11" fmla="*/ 304800 h 685800"/>
+              <a:gd name="connsiteX12" fmla="*/ 644237 w 1468582"/>
+              <a:gd name="connsiteY12" fmla="*/ 0 h 685800"/>
+            </a:gdLst>
+            <a:ahLst/>
+            <a:cxnLst>
+              <a:cxn ang="0">
+                <a:pos x="connsiteX0" y="connsiteY0"/>
+              </a:cxn>
+              <a:cxn ang="0">
+                <a:pos x="connsiteX1" y="connsiteY1"/>
+              </a:cxn>
+              <a:cxn ang="0">
+                <a:pos x="connsiteX2" y="connsiteY2"/>
+              </a:cxn>
+              <a:cxn ang="0">
+                <a:pos x="connsiteX3" y="connsiteY3"/>
+              </a:cxn>
+              <a:cxn ang="0">
+                <a:pos x="connsiteX4" y="connsiteY4"/>
+              </a:cxn>
+              <a:cxn ang="0">
+                <a:pos x="connsiteX5" y="connsiteY5"/>
+              </a:cxn>
+              <a:cxn ang="0">
+                <a:pos x="connsiteX6" y="connsiteY6"/>
+              </a:cxn>
+              <a:cxn ang="0">
+                <a:pos x="connsiteX7" y="connsiteY7"/>
+              </a:cxn>
+              <a:cxn ang="0">
+                <a:pos x="connsiteX8" y="connsiteY8"/>
+              </a:cxn>
+              <a:cxn ang="0">
+                <a:pos x="connsiteX9" y="connsiteY9"/>
+              </a:cxn>
+              <a:cxn ang="0">
+                <a:pos x="connsiteX10" y="connsiteY10"/>
+              </a:cxn>
+              <a:cxn ang="0">
+                <a:pos x="connsiteX11" y="connsiteY11"/>
+              </a:cxn>
+              <a:cxn ang="0">
+                <a:pos x="connsiteX12" y="connsiteY12"/>
+              </a:cxn>
+            </a:cxnLst>
+            <a:rect l="l" t="t" r="r" b="b"/>
+            <a:pathLst>
+              <a:path w="1468582" h="685800">
+                <a:moveTo>
+                  <a:pt x="644237" y="0"/>
+                </a:moveTo>
+                <a:lnTo>
+                  <a:pt x="0" y="450272"/>
+                </a:lnTo>
+                <a:lnTo>
+                  <a:pt x="76200" y="512618"/>
+                </a:lnTo>
+                <a:lnTo>
+                  <a:pt x="242455" y="602672"/>
+                </a:lnTo>
+                <a:lnTo>
+                  <a:pt x="346364" y="637309"/>
+                </a:lnTo>
+                <a:lnTo>
+                  <a:pt x="526473" y="671945"/>
+                </a:lnTo>
+                <a:lnTo>
+                  <a:pt x="671946" y="685800"/>
+                </a:lnTo>
+                <a:lnTo>
+                  <a:pt x="803564" y="665018"/>
+                </a:lnTo>
+                <a:lnTo>
+                  <a:pt x="983673" y="623454"/>
+                </a:lnTo>
+                <a:lnTo>
+                  <a:pt x="1184564" y="540327"/>
+                </a:lnTo>
+                <a:lnTo>
+                  <a:pt x="1295400" y="450272"/>
+                </a:lnTo>
+                <a:lnTo>
+                  <a:pt x="1468582" y="304800"/>
+                </a:lnTo>
+                <a:lnTo>
+                  <a:pt x="644237" y="0"/>
+                </a:lnTo>
+                <a:close/>
+              </a:path>
+            </a:pathLst>
+          </a:custGeom>
+          <a:solidFill>
+            <a:srgbClr val="FF0000">
+              <a:alpha val="30000"/>
+            </a:srgbClr>
+          </a:solidFill>
+          <a:ln>
+            <a:noFill/>
+          </a:ln>
+        </p:spPr>
+        <p:style>
+          <a:lnRef idx="2">
+            <a:schemeClr val="accent1">
+              <a:shade val="50000"/>
+            </a:schemeClr>
+          </a:lnRef>
+          <a:fillRef idx="1">
+            <a:schemeClr val="accent1"/>
+          </a:fillRef>
+          <a:effectRef idx="0">
+            <a:schemeClr val="accent1"/>
+          </a:effectRef>
+          <a:fontRef idx="minor">
+            <a:schemeClr val="lt1"/>
+          </a:fontRef>
+        </p:style>
+        <p:txBody>
+          <a:bodyPr rtlCol="0" anchor="ctr"/>
+          <a:lstStyle/>
+          <a:p>
+            <a:pPr algn="ctr"/>
+            <a:endParaRPr lang="en-US"/>
+          </a:p>
+        </p:txBody>
+      </p:sp>
+      <p:sp>
+        <p:nvSpPr>
+          <p:cNvPr id="52" name="Oval 51">
+            <a:extLst>
+              <a:ext uri="{FF2B5EF4-FFF2-40B4-BE49-F238E27FC236}">
+                <a16:creationId xmlns:a16="http://schemas.microsoft.com/office/drawing/2014/main" id="{4213E594-A30C-4D6C-8F3F-E8BA78089DB1}"/>
+              </a:ext>
+            </a:extLst>
+          </p:cNvPr>
+          <p:cNvSpPr>
+            <a:spLocks noChangeAspect="1"/>
+          </p:cNvSpPr>
+          <p:nvPr/>
+        </p:nvSpPr>
+        <p:spPr>
+          <a:xfrm>
+            <a:off x="2577782" y="3997984"/>
+            <a:ext cx="2377440" cy="2377440"/>
+          </a:xfrm>
+          <a:prstGeom prst="ellipse">
+            <a:avLst/>
+          </a:prstGeom>
+          <a:noFill/>
+          <a:ln w="19050">
+            <a:solidFill>
+              <a:schemeClr val="tx1"/>
+            </a:solidFill>
+            <a:prstDash val="lgDashDotDot"/>
+          </a:ln>
+        </p:spPr>
+        <p:style>
+          <a:lnRef idx="2">
+            <a:schemeClr val="accent1">
+              <a:shade val="50000"/>
+            </a:schemeClr>
+          </a:lnRef>
+          <a:fillRef idx="1">
+            <a:schemeClr val="accent1"/>
+          </a:fillRef>
+          <a:effectRef idx="0">
+            <a:schemeClr val="accent1"/>
+          </a:effectRef>
+          <a:fontRef idx="minor">
+            <a:schemeClr val="lt1"/>
+          </a:fontRef>
+        </p:style>
+        <p:txBody>
+          <a:bodyPr rtlCol="0" anchor="ctr"/>
+          <a:lstStyle/>
+          <a:p>
+            <a:pPr algn="ctr"/>
+            <a:endParaRPr lang="en-US"/>
+          </a:p>
+        </p:txBody>
+      </p:sp>
+      <p:sp>
+        <p:nvSpPr>
+          <p:cNvPr id="8" name="Oval 7">
+            <a:extLst>
+              <a:ext uri="{FF2B5EF4-FFF2-40B4-BE49-F238E27FC236}">
+                <a16:creationId xmlns:a16="http://schemas.microsoft.com/office/drawing/2014/main" id="{C273A25D-56D9-41CF-96B8-8E12CCE99AA7}"/>
+              </a:ext>
+            </a:extLst>
+          </p:cNvPr>
+          <p:cNvSpPr/>
+          <p:nvPr/>
+        </p:nvSpPr>
+        <p:spPr>
+          <a:xfrm>
+            <a:off x="2570048" y="427248"/>
+            <a:ext cx="2377440" cy="2743200"/>
+          </a:xfrm>
+          <a:prstGeom prst="ellipse">
+            <a:avLst/>
+          </a:prstGeom>
+          <a:noFill/>
+          <a:ln w="28575">
+            <a:solidFill>
+              <a:schemeClr val="tx1"/>
+            </a:solidFill>
+          </a:ln>
+        </p:spPr>
+        <p:style>
+          <a:lnRef idx="2">
+            <a:schemeClr val="accent1">
+              <a:shade val="50000"/>
+            </a:schemeClr>
+          </a:lnRef>
+          <a:fillRef idx="1">
+            <a:schemeClr val="accent1"/>
+          </a:fillRef>
+          <a:effectRef idx="0">
+            <a:schemeClr val="accent1"/>
+          </a:effectRef>
+          <a:fontRef idx="minor">
+            <a:schemeClr val="lt1"/>
+          </a:fontRef>
+        </p:style>
+        <p:txBody>
+          <a:bodyPr rtlCol="0" anchor="ctr"/>
+          <a:lstStyle/>
+          <a:p>
+            <a:pPr algn="ctr"/>
+            <a:endParaRPr lang="en-US" dirty="0"/>
+          </a:p>
+        </p:txBody>
+      </p:sp>
+      <p:sp>
+        <p:nvSpPr>
+          <p:cNvPr id="11" name="Oval 10">
+            <a:extLst>
+              <a:ext uri="{FF2B5EF4-FFF2-40B4-BE49-F238E27FC236}">
+                <a16:creationId xmlns:a16="http://schemas.microsoft.com/office/drawing/2014/main" id="{A5FCA370-8F4B-4C7C-A374-D7D6B8B18920}"/>
+              </a:ext>
+            </a:extLst>
+          </p:cNvPr>
+          <p:cNvSpPr/>
+          <p:nvPr/>
+        </p:nvSpPr>
+        <p:spPr>
+          <a:xfrm>
+            <a:off x="3713048" y="2438928"/>
+            <a:ext cx="91440" cy="91440"/>
+          </a:xfrm>
+          <a:prstGeom prst="ellipse">
+            <a:avLst/>
+          </a:prstGeom>
+          <a:solidFill>
+            <a:schemeClr val="tx1"/>
+          </a:solidFill>
+          <a:ln>
+            <a:solidFill>
+              <a:schemeClr val="tx1"/>
+            </a:solidFill>
+          </a:ln>
+        </p:spPr>
+        <p:style>
+          <a:lnRef idx="2">
+            <a:schemeClr val="accent1">
+              <a:shade val="50000"/>
+            </a:schemeClr>
+          </a:lnRef>
+          <a:fillRef idx="1">
+            <a:schemeClr val="accent1"/>
+          </a:fillRef>
+          <a:effectRef idx="0">
+            <a:schemeClr val="accent1"/>
+          </a:effectRef>
+          <a:fontRef idx="minor">
+            <a:schemeClr val="lt1"/>
+          </a:fontRef>
+        </p:style>
+        <p:txBody>
+          <a:bodyPr rtlCol="0" anchor="ctr"/>
+          <a:lstStyle/>
+          <a:p>
+            <a:pPr algn="ctr"/>
+            <a:endParaRPr lang="en-US"/>
+          </a:p>
+        </p:txBody>
+      </p:sp>
+      <p:cxnSp>
+        <p:nvCxnSpPr>
+          <p:cNvPr id="23" name="Straight Arrow Connector 22">
+            <a:extLst>
+              <a:ext uri="{FF2B5EF4-FFF2-40B4-BE49-F238E27FC236}">
+                <a16:creationId xmlns:a16="http://schemas.microsoft.com/office/drawing/2014/main" id="{12873E06-039F-4BA3-9E9F-CE0D3B917AB8}"/>
+              </a:ext>
+            </a:extLst>
+          </p:cNvPr>
+          <p:cNvCxnSpPr>
+            <a:cxnSpLocks/>
+          </p:cNvCxnSpPr>
+          <p:nvPr/>
+        </p:nvCxnSpPr>
+        <p:spPr>
+          <a:xfrm rot="2700000">
+            <a:off x="2695373" y="3255978"/>
+            <a:ext cx="1417320" cy="0"/>
+          </a:xfrm>
+          <a:prstGeom prst="straightConnector1">
+            <a:avLst/>
+          </a:prstGeom>
+          <a:ln w="19050">
+            <a:solidFill>
+              <a:schemeClr val="tx1"/>
+            </a:solidFill>
+            <a:tailEnd type="triangle"/>
+          </a:ln>
+        </p:spPr>
+        <p:style>
+          <a:lnRef idx="1">
+            <a:schemeClr val="accent1"/>
+          </a:lnRef>
+          <a:fillRef idx="0">
+            <a:schemeClr val="accent1"/>
+          </a:fillRef>
+          <a:effectRef idx="0">
+            <a:schemeClr val="accent1"/>
+          </a:effectRef>
+          <a:fontRef idx="minor">
+            <a:schemeClr val="tx1"/>
+          </a:fontRef>
+        </p:style>
+      </p:cxnSp>
+      <p:cxnSp>
+        <p:nvCxnSpPr>
+          <p:cNvPr id="28" name="Straight Arrow Connector 27">
+            <a:extLst>
+              <a:ext uri="{FF2B5EF4-FFF2-40B4-BE49-F238E27FC236}">
+                <a16:creationId xmlns:a16="http://schemas.microsoft.com/office/drawing/2014/main" id="{25C34C2A-0EE0-4255-9B72-DFB85C570695}"/>
+              </a:ext>
+            </a:extLst>
+          </p:cNvPr>
+          <p:cNvCxnSpPr>
+            <a:cxnSpLocks/>
+          </p:cNvCxnSpPr>
+          <p:nvPr/>
+        </p:nvCxnSpPr>
+        <p:spPr>
+          <a:xfrm>
+            <a:off x="3759073" y="3169748"/>
+            <a:ext cx="1554480" cy="0"/>
+          </a:xfrm>
+          <a:prstGeom prst="straightConnector1">
+            <a:avLst/>
+          </a:prstGeom>
+          <a:ln w="19050">
+            <a:solidFill>
+              <a:schemeClr val="tx1"/>
+            </a:solidFill>
+            <a:prstDash val="lgDash"/>
+            <a:tailEnd type="triangle"/>
+          </a:ln>
+        </p:spPr>
+        <p:style>
+          <a:lnRef idx="1">
+            <a:schemeClr val="accent1"/>
+          </a:lnRef>
+          <a:fillRef idx="0">
+            <a:schemeClr val="accent1"/>
+          </a:fillRef>
+          <a:effectRef idx="0">
+            <a:schemeClr val="accent1"/>
+          </a:effectRef>
+          <a:fontRef idx="minor">
+            <a:schemeClr val="tx1"/>
+          </a:fontRef>
+        </p:style>
+      </p:cxnSp>
+      <p:cxnSp>
+        <p:nvCxnSpPr>
+          <p:cNvPr id="32" name="Straight Arrow Connector 31">
+            <a:extLst>
+              <a:ext uri="{FF2B5EF4-FFF2-40B4-BE49-F238E27FC236}">
+                <a16:creationId xmlns:a16="http://schemas.microsoft.com/office/drawing/2014/main" id="{9E1477F4-8A98-420B-AC42-DAD37E783D3A}"/>
+              </a:ext>
+            </a:extLst>
+          </p:cNvPr>
+          <p:cNvCxnSpPr>
+            <a:cxnSpLocks/>
+          </p:cNvCxnSpPr>
+          <p:nvPr/>
+        </p:nvCxnSpPr>
+        <p:spPr>
+          <a:xfrm rot="18900000">
+            <a:off x="4289989" y="2384087"/>
+            <a:ext cx="1417320" cy="0"/>
+          </a:xfrm>
+          <a:prstGeom prst="straightConnector1">
+            <a:avLst/>
+          </a:prstGeom>
+          <a:ln w="19050">
+            <a:solidFill>
+              <a:schemeClr val="tx1"/>
+            </a:solidFill>
+            <a:prstDash val="dashDot"/>
+            <a:tailEnd type="triangle"/>
+          </a:ln>
+        </p:spPr>
+        <p:style>
+          <a:lnRef idx="1">
+            <a:schemeClr val="accent1"/>
+          </a:lnRef>
+          <a:fillRef idx="0">
+            <a:schemeClr val="accent1"/>
+          </a:fillRef>
+          <a:effectRef idx="0">
+            <a:schemeClr val="accent1"/>
+          </a:effectRef>
+          <a:fontRef idx="minor">
+            <a:schemeClr val="tx1"/>
+          </a:fontRef>
+        </p:style>
+      </p:cxnSp>
+      <p:sp>
+        <p:nvSpPr>
+          <p:cNvPr id="38" name="Oval 37">
+            <a:extLst>
+              <a:ext uri="{FF2B5EF4-FFF2-40B4-BE49-F238E27FC236}">
+                <a16:creationId xmlns:a16="http://schemas.microsoft.com/office/drawing/2014/main" id="{95233036-5C41-49C2-877D-FECD6A23D1A0}"/>
+              </a:ext>
+            </a:extLst>
+          </p:cNvPr>
+          <p:cNvSpPr/>
+          <p:nvPr/>
+        </p:nvSpPr>
+        <p:spPr>
+          <a:xfrm>
+            <a:off x="3345902" y="5171699"/>
+            <a:ext cx="91440" cy="91440"/>
+          </a:xfrm>
+          <a:prstGeom prst="ellipse">
+            <a:avLst/>
+          </a:prstGeom>
+          <a:solidFill>
+            <a:schemeClr val="tx1"/>
+          </a:solidFill>
+          <a:ln>
+            <a:solidFill>
+              <a:schemeClr val="tx1"/>
+            </a:solidFill>
+          </a:ln>
+        </p:spPr>
+        <p:style>
+          <a:lnRef idx="2">
+            <a:schemeClr val="accent1">
+              <a:shade val="50000"/>
+            </a:schemeClr>
+          </a:lnRef>
+          <a:fillRef idx="1">
+            <a:schemeClr val="accent1"/>
+          </a:fillRef>
+          <a:effectRef idx="0">
+            <a:schemeClr val="accent1"/>
+          </a:effectRef>
+          <a:fontRef idx="minor">
+            <a:schemeClr val="lt1"/>
+          </a:fontRef>
+        </p:style>
+        <p:txBody>
+          <a:bodyPr rtlCol="0" anchor="ctr"/>
+          <a:lstStyle/>
+          <a:p>
+            <a:pPr algn="ctr"/>
+            <a:endParaRPr lang="en-US"/>
+          </a:p>
+        </p:txBody>
+      </p:sp>
+      <p:sp>
+        <p:nvSpPr>
+          <p:cNvPr id="74" name="Arc 73">
+            <a:extLst>
+              <a:ext uri="{FF2B5EF4-FFF2-40B4-BE49-F238E27FC236}">
+                <a16:creationId xmlns:a16="http://schemas.microsoft.com/office/drawing/2014/main" id="{383AB614-01D2-472E-A406-A07E482FEEF7}"/>
+              </a:ext>
+            </a:extLst>
+          </p:cNvPr>
+          <p:cNvSpPr/>
+          <p:nvPr/>
+        </p:nvSpPr>
+        <p:spPr>
+          <a:xfrm>
+            <a:off x="2582444" y="3998379"/>
+            <a:ext cx="2377440" cy="2377440"/>
+          </a:xfrm>
+          <a:prstGeom prst="arc">
+            <a:avLst>
+              <a:gd name="adj1" fmla="val 18149876"/>
+              <a:gd name="adj2" fmla="val 3620261"/>
+            </a:avLst>
+          </a:prstGeom>
+          <a:noFill/>
+          <a:ln w="38100">
+            <a:solidFill>
+              <a:srgbClr val="FF0000"/>
+            </a:solidFill>
+          </a:ln>
+        </p:spPr>
+        <p:style>
+          <a:lnRef idx="1">
+            <a:schemeClr val="accent1"/>
+          </a:lnRef>
+          <a:fillRef idx="0">
+            <a:schemeClr val="accent1"/>
+          </a:fillRef>
+          <a:effectRef idx="0">
+            <a:schemeClr val="accent1"/>
+          </a:effectRef>
+          <a:fontRef idx="minor">
+            <a:schemeClr val="tx1"/>
+          </a:fontRef>
+        </p:style>
+        <p:txBody>
+          <a:bodyPr rtlCol="0" anchor="ctr"/>
+          <a:lstStyle/>
+          <a:p>
+            <a:pPr algn="ctr"/>
+            <a:endParaRPr lang="en-US"/>
+          </a:p>
+        </p:txBody>
+      </p:sp>
+      <p:cxnSp>
+        <p:nvCxnSpPr>
+          <p:cNvPr id="51" name="Straight Arrow Connector 50">
+            <a:extLst>
+              <a:ext uri="{FF2B5EF4-FFF2-40B4-BE49-F238E27FC236}">
+                <a16:creationId xmlns:a16="http://schemas.microsoft.com/office/drawing/2014/main" id="{81597ACF-F3AA-4002-9423-831BF1EE5CE0}"/>
+              </a:ext>
+            </a:extLst>
+          </p:cNvPr>
+          <p:cNvCxnSpPr>
+            <a:cxnSpLocks/>
+          </p:cNvCxnSpPr>
+          <p:nvPr/>
+        </p:nvCxnSpPr>
+        <p:spPr>
+          <a:xfrm rot="2700000">
+            <a:off x="3180282" y="5722089"/>
+            <a:ext cx="1417320" cy="0"/>
+          </a:xfrm>
+          <a:prstGeom prst="straightConnector1">
+            <a:avLst/>
+          </a:prstGeom>
+          <a:ln w="19050">
+            <a:solidFill>
+              <a:schemeClr val="tx1"/>
+            </a:solidFill>
+            <a:tailEnd type="triangle"/>
+          </a:ln>
+        </p:spPr>
+        <p:style>
+          <a:lnRef idx="1">
+            <a:schemeClr val="accent1"/>
+          </a:lnRef>
+          <a:fillRef idx="0">
+            <a:schemeClr val="accent1"/>
+          </a:fillRef>
+          <a:effectRef idx="0">
+            <a:schemeClr val="accent1"/>
+          </a:effectRef>
+          <a:fontRef idx="minor">
+            <a:schemeClr val="tx1"/>
+          </a:fontRef>
+        </p:style>
+      </p:cxnSp>
+      <p:cxnSp>
+        <p:nvCxnSpPr>
+          <p:cNvPr id="55" name="Straight Arrow Connector 54">
+            <a:extLst>
+              <a:ext uri="{FF2B5EF4-FFF2-40B4-BE49-F238E27FC236}">
+                <a16:creationId xmlns:a16="http://schemas.microsoft.com/office/drawing/2014/main" id="{FBADEFBE-3026-4DAF-9FCB-66B55ACF988D}"/>
+              </a:ext>
+            </a:extLst>
+          </p:cNvPr>
+          <p:cNvCxnSpPr>
+            <a:cxnSpLocks/>
+          </p:cNvCxnSpPr>
+          <p:nvPr/>
+        </p:nvCxnSpPr>
+        <p:spPr>
+          <a:xfrm>
+            <a:off x="3385001" y="5213294"/>
+            <a:ext cx="1554480" cy="0"/>
+          </a:xfrm>
+          <a:prstGeom prst="straightConnector1">
+            <a:avLst/>
+          </a:prstGeom>
+          <a:ln w="19050">
+            <a:solidFill>
+              <a:schemeClr val="tx1"/>
+            </a:solidFill>
+            <a:prstDash val="lgDash"/>
+            <a:tailEnd type="triangle"/>
+          </a:ln>
+        </p:spPr>
+        <p:style>
+          <a:lnRef idx="1">
+            <a:schemeClr val="accent1"/>
+          </a:lnRef>
+          <a:fillRef idx="0">
+            <a:schemeClr val="accent1"/>
+          </a:fillRef>
+          <a:effectRef idx="0">
+            <a:schemeClr val="accent1"/>
+          </a:effectRef>
+          <a:fontRef idx="minor">
+            <a:schemeClr val="tx1"/>
+          </a:fontRef>
+        </p:style>
+      </p:cxnSp>
+      <p:cxnSp>
+        <p:nvCxnSpPr>
+          <p:cNvPr id="56" name="Straight Arrow Connector 55">
+            <a:extLst>
+              <a:ext uri="{FF2B5EF4-FFF2-40B4-BE49-F238E27FC236}">
+                <a16:creationId xmlns:a16="http://schemas.microsoft.com/office/drawing/2014/main" id="{0E88508E-B31A-45C6-ADEC-37E657E8E83D}"/>
+              </a:ext>
+            </a:extLst>
+          </p:cNvPr>
+          <p:cNvCxnSpPr>
+            <a:cxnSpLocks/>
+          </p:cNvCxnSpPr>
+          <p:nvPr/>
+        </p:nvCxnSpPr>
+        <p:spPr>
+          <a:xfrm rot="18900000">
+            <a:off x="3195478" y="4704728"/>
+            <a:ext cx="1417320" cy="0"/>
+          </a:xfrm>
+          <a:prstGeom prst="straightConnector1">
+            <a:avLst/>
+          </a:prstGeom>
+          <a:ln w="19050">
+            <a:solidFill>
+              <a:schemeClr val="tx1"/>
+            </a:solidFill>
+            <a:prstDash val="dashDot"/>
+            <a:tailEnd type="triangle"/>
+          </a:ln>
+        </p:spPr>
+        <p:style>
+          <a:lnRef idx="1">
+            <a:schemeClr val="accent1"/>
+          </a:lnRef>
+          <a:fillRef idx="0">
+            <a:schemeClr val="accent1"/>
+          </a:fillRef>
+          <a:effectRef idx="0">
+            <a:schemeClr val="accent1"/>
+          </a:effectRef>
+          <a:fontRef idx="minor">
+            <a:schemeClr val="tx1"/>
+          </a:fontRef>
+        </p:style>
+      </p:cxnSp>
+      <p:sp>
+        <p:nvSpPr>
+          <p:cNvPr id="57" name="Oval 56">
+            <a:extLst>
+              <a:ext uri="{FF2B5EF4-FFF2-40B4-BE49-F238E27FC236}">
+                <a16:creationId xmlns:a16="http://schemas.microsoft.com/office/drawing/2014/main" id="{9B642268-B6FC-47ED-8E4B-3F39083CAB44}"/>
+              </a:ext>
+            </a:extLst>
+          </p:cNvPr>
+          <p:cNvSpPr>
+            <a:spLocks noChangeAspect="1"/>
+          </p:cNvSpPr>
+          <p:nvPr/>
+        </p:nvSpPr>
+        <p:spPr>
+          <a:xfrm>
+            <a:off x="7232923" y="3997987"/>
+            <a:ext cx="2377440" cy="2377440"/>
+          </a:xfrm>
+          <a:prstGeom prst="ellipse">
+            <a:avLst/>
+          </a:prstGeom>
+          <a:noFill/>
+          <a:ln w="19050">
+            <a:solidFill>
+              <a:schemeClr val="tx1"/>
+            </a:solidFill>
+            <a:prstDash val="lgDashDotDot"/>
+          </a:ln>
+        </p:spPr>
+        <p:style>
+          <a:lnRef idx="2">
+            <a:schemeClr val="accent1">
+              <a:shade val="50000"/>
+            </a:schemeClr>
+          </a:lnRef>
+          <a:fillRef idx="1">
+            <a:schemeClr val="accent1"/>
+          </a:fillRef>
+          <a:effectRef idx="0">
+            <a:schemeClr val="accent1"/>
+          </a:effectRef>
+          <a:fontRef idx="minor">
+            <a:schemeClr val="lt1"/>
+          </a:fontRef>
+        </p:style>
+        <p:txBody>
+          <a:bodyPr rtlCol="0" anchor="ctr"/>
+          <a:lstStyle/>
+          <a:p>
+            <a:pPr algn="ctr"/>
+            <a:endParaRPr lang="en-US"/>
+          </a:p>
+        </p:txBody>
+      </p:sp>
+      <p:sp>
+        <p:nvSpPr>
+          <p:cNvPr id="58" name="Oval 57">
+            <a:extLst>
+              <a:ext uri="{FF2B5EF4-FFF2-40B4-BE49-F238E27FC236}">
+                <a16:creationId xmlns:a16="http://schemas.microsoft.com/office/drawing/2014/main" id="{26CF3105-0B96-41C6-A9AE-F55C07A791B3}"/>
+              </a:ext>
+            </a:extLst>
+          </p:cNvPr>
+          <p:cNvSpPr/>
+          <p:nvPr/>
+        </p:nvSpPr>
+        <p:spPr>
+          <a:xfrm>
+            <a:off x="7225189" y="427251"/>
+            <a:ext cx="2377440" cy="2743200"/>
+          </a:xfrm>
+          <a:prstGeom prst="ellipse">
+            <a:avLst/>
+          </a:prstGeom>
+          <a:noFill/>
+          <a:ln w="28575">
+            <a:solidFill>
+              <a:schemeClr val="tx1"/>
+            </a:solidFill>
+          </a:ln>
+        </p:spPr>
+        <p:style>
+          <a:lnRef idx="2">
+            <a:schemeClr val="accent1">
+              <a:shade val="50000"/>
+            </a:schemeClr>
+          </a:lnRef>
+          <a:fillRef idx="1">
+            <a:schemeClr val="accent1"/>
+          </a:fillRef>
+          <a:effectRef idx="0">
+            <a:schemeClr val="accent1"/>
+          </a:effectRef>
+          <a:fontRef idx="minor">
+            <a:schemeClr val="lt1"/>
+          </a:fontRef>
+        </p:style>
+        <p:txBody>
+          <a:bodyPr rtlCol="0" anchor="ctr"/>
+          <a:lstStyle/>
+          <a:p>
+            <a:pPr algn="ctr"/>
+            <a:endParaRPr lang="en-US" dirty="0"/>
+          </a:p>
+        </p:txBody>
+      </p:sp>
+      <p:sp>
+        <p:nvSpPr>
+          <p:cNvPr id="59" name="Oval 58">
+            <a:extLst>
+              <a:ext uri="{FF2B5EF4-FFF2-40B4-BE49-F238E27FC236}">
+                <a16:creationId xmlns:a16="http://schemas.microsoft.com/office/drawing/2014/main" id="{AD33B52D-D9CB-4929-B0B1-85F574D1C33E}"/>
+              </a:ext>
+            </a:extLst>
+          </p:cNvPr>
+          <p:cNvSpPr/>
+          <p:nvPr/>
+        </p:nvSpPr>
+        <p:spPr>
+          <a:xfrm>
+            <a:off x="8368189" y="2438931"/>
+            <a:ext cx="91440" cy="91440"/>
+          </a:xfrm>
+          <a:prstGeom prst="ellipse">
+            <a:avLst/>
+          </a:prstGeom>
+          <a:solidFill>
+            <a:schemeClr val="tx1"/>
+          </a:solidFill>
+          <a:ln>
+            <a:solidFill>
+              <a:schemeClr val="tx1"/>
+            </a:solidFill>
+          </a:ln>
+        </p:spPr>
+        <p:style>
+          <a:lnRef idx="2">
+            <a:schemeClr val="accent1">
+              <a:shade val="50000"/>
+            </a:schemeClr>
+          </a:lnRef>
+          <a:fillRef idx="1">
+            <a:schemeClr val="accent1"/>
+          </a:fillRef>
+          <a:effectRef idx="0">
+            <a:schemeClr val="accent1"/>
+          </a:effectRef>
+          <a:fontRef idx="minor">
+            <a:schemeClr val="lt1"/>
+          </a:fontRef>
+        </p:style>
+        <p:txBody>
+          <a:bodyPr rtlCol="0" anchor="ctr"/>
+          <a:lstStyle/>
+          <a:p>
+            <a:pPr algn="ctr"/>
+            <a:endParaRPr lang="en-US"/>
+          </a:p>
+        </p:txBody>
+      </p:sp>
+      <p:cxnSp>
+        <p:nvCxnSpPr>
+          <p:cNvPr id="60" name="Straight Arrow Connector 59">
+            <a:extLst>
+              <a:ext uri="{FF2B5EF4-FFF2-40B4-BE49-F238E27FC236}">
+                <a16:creationId xmlns:a16="http://schemas.microsoft.com/office/drawing/2014/main" id="{4E1E7B4D-BC6E-4454-A067-71A9E5311C28}"/>
+              </a:ext>
+            </a:extLst>
+          </p:cNvPr>
+          <p:cNvCxnSpPr>
+            <a:cxnSpLocks/>
+          </p:cNvCxnSpPr>
+          <p:nvPr/>
+        </p:nvCxnSpPr>
+        <p:spPr>
+          <a:xfrm rot="12600000">
+            <a:off x="8135261" y="345747"/>
+            <a:ext cx="822960" cy="0"/>
+          </a:xfrm>
+          <a:prstGeom prst="straightConnector1">
+            <a:avLst/>
+          </a:prstGeom>
+          <a:ln w="19050">
+            <a:solidFill>
+              <a:schemeClr val="tx1"/>
+            </a:solidFill>
+            <a:tailEnd type="triangle"/>
+          </a:ln>
+        </p:spPr>
+        <p:style>
+          <a:lnRef idx="1">
+            <a:schemeClr val="accent1"/>
+          </a:lnRef>
+          <a:fillRef idx="0">
+            <a:schemeClr val="accent1"/>
+          </a:fillRef>
+          <a:effectRef idx="0">
+            <a:schemeClr val="accent1"/>
+          </a:effectRef>
+          <a:fontRef idx="minor">
+            <a:schemeClr val="tx1"/>
+          </a:fontRef>
+        </p:style>
+      </p:cxnSp>
+      <p:sp>
+        <p:nvSpPr>
+          <p:cNvPr id="63" name="Oval 62">
+            <a:extLst>
+              <a:ext uri="{FF2B5EF4-FFF2-40B4-BE49-F238E27FC236}">
+                <a16:creationId xmlns:a16="http://schemas.microsoft.com/office/drawing/2014/main" id="{6965329C-23D4-44F3-AE41-A66A16450458}"/>
+              </a:ext>
+            </a:extLst>
+          </p:cNvPr>
+          <p:cNvSpPr/>
+          <p:nvPr/>
+        </p:nvSpPr>
+        <p:spPr>
+          <a:xfrm>
+            <a:off x="8001043" y="5171702"/>
+            <a:ext cx="91440" cy="91440"/>
+          </a:xfrm>
+          <a:prstGeom prst="ellipse">
+            <a:avLst/>
+          </a:prstGeom>
+          <a:solidFill>
+            <a:schemeClr val="tx1"/>
+          </a:solidFill>
+          <a:ln>
+            <a:solidFill>
+              <a:schemeClr val="tx1"/>
+            </a:solidFill>
+          </a:ln>
+        </p:spPr>
+        <p:style>
+          <a:lnRef idx="2">
+            <a:schemeClr val="accent1">
+              <a:shade val="50000"/>
+            </a:schemeClr>
+          </a:lnRef>
+          <a:fillRef idx="1">
+            <a:schemeClr val="accent1"/>
+          </a:fillRef>
+          <a:effectRef idx="0">
+            <a:schemeClr val="accent1"/>
+          </a:effectRef>
+          <a:fontRef idx="minor">
+            <a:schemeClr val="lt1"/>
+          </a:fontRef>
+        </p:style>
+        <p:txBody>
+          <a:bodyPr rtlCol="0" anchor="ctr"/>
+          <a:lstStyle/>
+          <a:p>
+            <a:pPr algn="ctr"/>
+            <a:endParaRPr lang="en-US"/>
+          </a:p>
+        </p:txBody>
+      </p:sp>
+      <p:sp>
+        <p:nvSpPr>
+          <p:cNvPr id="64" name="Arc 63">
+            <a:extLst>
+              <a:ext uri="{FF2B5EF4-FFF2-40B4-BE49-F238E27FC236}">
+                <a16:creationId xmlns:a16="http://schemas.microsoft.com/office/drawing/2014/main" id="{4D2BD7AB-CC1C-4E4D-B5C0-EC49041F5D64}"/>
+              </a:ext>
+            </a:extLst>
+          </p:cNvPr>
+          <p:cNvSpPr/>
+          <p:nvPr/>
+        </p:nvSpPr>
+        <p:spPr>
+          <a:xfrm>
+            <a:off x="7237585" y="3998382"/>
+            <a:ext cx="2377440" cy="2377440"/>
+          </a:xfrm>
+          <a:prstGeom prst="arc">
+            <a:avLst>
+              <a:gd name="adj1" fmla="val 9418419"/>
+              <a:gd name="adj2" fmla="val 11941944"/>
+            </a:avLst>
+          </a:prstGeom>
+          <a:noFill/>
+          <a:ln w="38100">
+            <a:solidFill>
+              <a:srgbClr val="FF0000"/>
+            </a:solidFill>
+          </a:ln>
+        </p:spPr>
+        <p:style>
+          <a:lnRef idx="1">
+            <a:schemeClr val="accent1"/>
+          </a:lnRef>
+          <a:fillRef idx="0">
+            <a:schemeClr val="accent1"/>
+          </a:fillRef>
+          <a:effectRef idx="0">
+            <a:schemeClr val="accent1"/>
+          </a:effectRef>
+          <a:fontRef idx="minor">
+            <a:schemeClr val="tx1"/>
+          </a:fontRef>
+        </p:style>
+        <p:txBody>
+          <a:bodyPr rtlCol="0" anchor="ctr"/>
+          <a:lstStyle/>
+          <a:p>
+            <a:pPr algn="ctr"/>
+            <a:endParaRPr lang="en-US"/>
+          </a:p>
+        </p:txBody>
+      </p:sp>
+      <p:cxnSp>
+        <p:nvCxnSpPr>
+          <p:cNvPr id="72" name="Straight Arrow Connector 71">
+            <a:extLst>
+              <a:ext uri="{FF2B5EF4-FFF2-40B4-BE49-F238E27FC236}">
+                <a16:creationId xmlns:a16="http://schemas.microsoft.com/office/drawing/2014/main" id="{2CD123D7-076B-4740-B005-DFD203081316}"/>
+              </a:ext>
+            </a:extLst>
+          </p:cNvPr>
+          <p:cNvCxnSpPr>
+            <a:cxnSpLocks/>
+          </p:cNvCxnSpPr>
+          <p:nvPr/>
+        </p:nvCxnSpPr>
+        <p:spPr>
+          <a:xfrm rot="12600000">
+            <a:off x="7262426" y="5007812"/>
+            <a:ext cx="822960" cy="0"/>
+          </a:xfrm>
+          <a:prstGeom prst="straightConnector1">
+            <a:avLst/>
+          </a:prstGeom>
+          <a:ln w="19050">
+            <a:solidFill>
+              <a:schemeClr val="tx1"/>
+            </a:solidFill>
+            <a:tailEnd type="triangle"/>
+          </a:ln>
+        </p:spPr>
+        <p:style>
+          <a:lnRef idx="1">
+            <a:schemeClr val="accent1"/>
+          </a:lnRef>
+          <a:fillRef idx="0">
+            <a:schemeClr val="accent1"/>
+          </a:fillRef>
+          <a:effectRef idx="0">
+            <a:schemeClr val="accent1"/>
+          </a:effectRef>
+          <a:fontRef idx="minor">
+            <a:schemeClr val="tx1"/>
+          </a:fontRef>
+        </p:style>
+      </p:cxnSp>
+      <p:cxnSp>
+        <p:nvCxnSpPr>
+          <p:cNvPr id="76" name="Straight Arrow Connector 75">
+            <a:extLst>
+              <a:ext uri="{FF2B5EF4-FFF2-40B4-BE49-F238E27FC236}">
+                <a16:creationId xmlns:a16="http://schemas.microsoft.com/office/drawing/2014/main" id="{4E30987F-1EFF-42FD-BA71-D56DC4011EED}"/>
+              </a:ext>
+            </a:extLst>
+          </p:cNvPr>
+          <p:cNvCxnSpPr>
+            <a:cxnSpLocks/>
+          </p:cNvCxnSpPr>
+          <p:nvPr/>
+        </p:nvCxnSpPr>
+        <p:spPr>
+          <a:xfrm rot="10800000">
+            <a:off x="7618076" y="423669"/>
+            <a:ext cx="795528" cy="0"/>
+          </a:xfrm>
+          <a:prstGeom prst="straightConnector1">
+            <a:avLst/>
+          </a:prstGeom>
+          <a:ln w="19050">
+            <a:solidFill>
+              <a:schemeClr val="tx1"/>
+            </a:solidFill>
+            <a:prstDash val="lgDash"/>
+            <a:tailEnd type="triangle"/>
+          </a:ln>
+        </p:spPr>
+        <p:style>
+          <a:lnRef idx="1">
+            <a:schemeClr val="accent1"/>
+          </a:lnRef>
+          <a:fillRef idx="0">
+            <a:schemeClr val="accent1"/>
+          </a:fillRef>
+          <a:effectRef idx="0">
+            <a:schemeClr val="accent1"/>
+          </a:effectRef>
+          <a:fontRef idx="minor">
+            <a:schemeClr val="tx1"/>
+          </a:fontRef>
+        </p:style>
+      </p:cxnSp>
+      <p:cxnSp>
+        <p:nvCxnSpPr>
+          <p:cNvPr id="77" name="Straight Arrow Connector 76">
+            <a:extLst>
+              <a:ext uri="{FF2B5EF4-FFF2-40B4-BE49-F238E27FC236}">
+                <a16:creationId xmlns:a16="http://schemas.microsoft.com/office/drawing/2014/main" id="{6BD5AE89-0534-4B0C-9F47-C17EF9775E6F}"/>
+              </a:ext>
+            </a:extLst>
+          </p:cNvPr>
+          <p:cNvCxnSpPr>
+            <a:cxnSpLocks/>
+          </p:cNvCxnSpPr>
+          <p:nvPr/>
+        </p:nvCxnSpPr>
+        <p:spPr>
+          <a:xfrm rot="10800000">
+            <a:off x="7250929" y="5217355"/>
+            <a:ext cx="795528" cy="0"/>
+          </a:xfrm>
+          <a:prstGeom prst="straightConnector1">
+            <a:avLst/>
+          </a:prstGeom>
+          <a:ln w="19050">
+            <a:solidFill>
+              <a:schemeClr val="tx1"/>
+            </a:solidFill>
+            <a:prstDash val="lgDash"/>
+            <a:tailEnd type="triangle"/>
+          </a:ln>
+        </p:spPr>
+        <p:style>
+          <a:lnRef idx="1">
+            <a:schemeClr val="accent1"/>
+          </a:lnRef>
+          <a:fillRef idx="0">
+            <a:schemeClr val="accent1"/>
+          </a:fillRef>
+          <a:effectRef idx="0">
+            <a:schemeClr val="accent1"/>
+          </a:effectRef>
+          <a:fontRef idx="minor">
+            <a:schemeClr val="tx1"/>
+          </a:fontRef>
+        </p:style>
+      </p:cxnSp>
+      <p:cxnSp>
+        <p:nvCxnSpPr>
+          <p:cNvPr id="78" name="Straight Arrow Connector 77">
+            <a:extLst>
+              <a:ext uri="{FF2B5EF4-FFF2-40B4-BE49-F238E27FC236}">
+                <a16:creationId xmlns:a16="http://schemas.microsoft.com/office/drawing/2014/main" id="{BD0E28B1-3CAB-4389-8D88-5CBD4CA25CD1}"/>
+              </a:ext>
+            </a:extLst>
+          </p:cNvPr>
+          <p:cNvCxnSpPr>
+            <a:cxnSpLocks/>
+          </p:cNvCxnSpPr>
+          <p:nvPr/>
+        </p:nvCxnSpPr>
+        <p:spPr>
+          <a:xfrm rot="9000000">
+            <a:off x="7156511" y="758870"/>
+            <a:ext cx="822960" cy="0"/>
+          </a:xfrm>
+          <a:prstGeom prst="straightConnector1">
+            <a:avLst/>
+          </a:prstGeom>
+          <a:ln w="19050">
+            <a:solidFill>
+              <a:schemeClr val="tx1"/>
+            </a:solidFill>
+            <a:prstDash val="dashDot"/>
+            <a:tailEnd type="triangle"/>
+          </a:ln>
+        </p:spPr>
+        <p:style>
+          <a:lnRef idx="1">
+            <a:schemeClr val="accent1"/>
+          </a:lnRef>
+          <a:fillRef idx="0">
+            <a:schemeClr val="accent1"/>
+          </a:fillRef>
+          <a:effectRef idx="0">
+            <a:schemeClr val="accent1"/>
+          </a:effectRef>
+          <a:fontRef idx="minor">
+            <a:schemeClr val="tx1"/>
+          </a:fontRef>
+        </p:style>
+      </p:cxnSp>
+      <p:cxnSp>
+        <p:nvCxnSpPr>
+          <p:cNvPr id="79" name="Straight Arrow Connector 78">
+            <a:extLst>
+              <a:ext uri="{FF2B5EF4-FFF2-40B4-BE49-F238E27FC236}">
+                <a16:creationId xmlns:a16="http://schemas.microsoft.com/office/drawing/2014/main" id="{7E2B5E4B-381C-44BE-8CE3-FE735EE28C2E}"/>
+              </a:ext>
+            </a:extLst>
+          </p:cNvPr>
+          <p:cNvCxnSpPr>
+            <a:cxnSpLocks/>
+          </p:cNvCxnSpPr>
+          <p:nvPr/>
+        </p:nvCxnSpPr>
+        <p:spPr>
+          <a:xfrm rot="9000000">
+            <a:off x="7281203" y="5434791"/>
+            <a:ext cx="822960" cy="0"/>
+          </a:xfrm>
+          <a:prstGeom prst="straightConnector1">
+            <a:avLst/>
+          </a:prstGeom>
+          <a:ln w="19050">
+            <a:solidFill>
+              <a:schemeClr val="tx1"/>
+            </a:solidFill>
+            <a:prstDash val="dashDot"/>
+            <a:tailEnd type="triangle"/>
+          </a:ln>
+        </p:spPr>
+        <p:style>
+          <a:lnRef idx="1">
+            <a:schemeClr val="accent1"/>
+          </a:lnRef>
+          <a:fillRef idx="0">
+            <a:schemeClr val="accent1"/>
+          </a:fillRef>
+          <a:effectRef idx="0">
+            <a:schemeClr val="accent1"/>
+          </a:effectRef>
+          <a:fontRef idx="minor">
+            <a:schemeClr val="tx1"/>
+          </a:fontRef>
+        </p:style>
+      </p:cxnSp>
+    </p:spTree>
+    <p:extLst>
+      <p:ext uri="{BB962C8B-B14F-4D97-AF65-F5344CB8AC3E}">
+        <p14:creationId xmlns:p14="http://schemas.microsoft.com/office/powerpoint/2010/main" val="2185806288"/>
+      </p:ext>
+    </p:extLst>
+  </p:cSld>
+  <p:clrMapOvr>
+    <a:masterClrMapping/>
+  </p:clrMapOvr>
+</p:sld>
+</file>
+
 <file path=ppt/theme/theme1.xml><?xml version="1.0" encoding="utf-8"?>
 <a:theme xmlns:a="http://schemas.openxmlformats.org/drawingml/2006/main" name="Office Theme">
   <a:themeElements>

</xml_diff>

<commit_message>
RROD work on sine fitting approach
</commit_message>
<xml_diff>
--- a/journal/figures/hodographMapping.pptx
+++ b/journal/figures/hodographMapping.pptx
@@ -261,7 +261,7 @@
           <a:p>
             <a:fld id="{2CEF6C36-5691-4952-B197-D88666D142D8}" type="datetimeFigureOut">
               <a:rPr lang="en-US" smtClean="0"/>
-              <a:t>7/31/2020</a:t>
+              <a:t>9/21/2020</a:t>
             </a:fld>
             <a:endParaRPr lang="en-US"/>
           </a:p>
@@ -459,7 +459,7 @@
           <a:p>
             <a:fld id="{2CEF6C36-5691-4952-B197-D88666D142D8}" type="datetimeFigureOut">
               <a:rPr lang="en-US" smtClean="0"/>
-              <a:t>7/31/2020</a:t>
+              <a:t>9/21/2020</a:t>
             </a:fld>
             <a:endParaRPr lang="en-US"/>
           </a:p>
@@ -667,7 +667,7 @@
           <a:p>
             <a:fld id="{2CEF6C36-5691-4952-B197-D88666D142D8}" type="datetimeFigureOut">
               <a:rPr lang="en-US" smtClean="0"/>
-              <a:t>7/31/2020</a:t>
+              <a:t>9/21/2020</a:t>
             </a:fld>
             <a:endParaRPr lang="en-US"/>
           </a:p>
@@ -865,7 +865,7 @@
           <a:p>
             <a:fld id="{2CEF6C36-5691-4952-B197-D88666D142D8}" type="datetimeFigureOut">
               <a:rPr lang="en-US" smtClean="0"/>
-              <a:t>7/31/2020</a:t>
+              <a:t>9/21/2020</a:t>
             </a:fld>
             <a:endParaRPr lang="en-US"/>
           </a:p>
@@ -1140,7 +1140,7 @@
           <a:p>
             <a:fld id="{2CEF6C36-5691-4952-B197-D88666D142D8}" type="datetimeFigureOut">
               <a:rPr lang="en-US" smtClean="0"/>
-              <a:t>7/31/2020</a:t>
+              <a:t>9/21/2020</a:t>
             </a:fld>
             <a:endParaRPr lang="en-US"/>
           </a:p>
@@ -1405,7 +1405,7 @@
           <a:p>
             <a:fld id="{2CEF6C36-5691-4952-B197-D88666D142D8}" type="datetimeFigureOut">
               <a:rPr lang="en-US" smtClean="0"/>
-              <a:t>7/31/2020</a:t>
+              <a:t>9/21/2020</a:t>
             </a:fld>
             <a:endParaRPr lang="en-US"/>
           </a:p>
@@ -1817,7 +1817,7 @@
           <a:p>
             <a:fld id="{2CEF6C36-5691-4952-B197-D88666D142D8}" type="datetimeFigureOut">
               <a:rPr lang="en-US" smtClean="0"/>
-              <a:t>7/31/2020</a:t>
+              <a:t>9/21/2020</a:t>
             </a:fld>
             <a:endParaRPr lang="en-US"/>
           </a:p>
@@ -1958,7 +1958,7 @@
           <a:p>
             <a:fld id="{2CEF6C36-5691-4952-B197-D88666D142D8}" type="datetimeFigureOut">
               <a:rPr lang="en-US" smtClean="0"/>
-              <a:t>7/31/2020</a:t>
+              <a:t>9/21/2020</a:t>
             </a:fld>
             <a:endParaRPr lang="en-US"/>
           </a:p>
@@ -2071,7 +2071,7 @@
           <a:p>
             <a:fld id="{2CEF6C36-5691-4952-B197-D88666D142D8}" type="datetimeFigureOut">
               <a:rPr lang="en-US" smtClean="0"/>
-              <a:t>7/31/2020</a:t>
+              <a:t>9/21/2020</a:t>
             </a:fld>
             <a:endParaRPr lang="en-US"/>
           </a:p>
@@ -2382,7 +2382,7 @@
           <a:p>
             <a:fld id="{2CEF6C36-5691-4952-B197-D88666D142D8}" type="datetimeFigureOut">
               <a:rPr lang="en-US" smtClean="0"/>
-              <a:t>7/31/2020</a:t>
+              <a:t>9/21/2020</a:t>
             </a:fld>
             <a:endParaRPr lang="en-US"/>
           </a:p>
@@ -2670,7 +2670,7 @@
           <a:p>
             <a:fld id="{2CEF6C36-5691-4952-B197-D88666D142D8}" type="datetimeFigureOut">
               <a:rPr lang="en-US" smtClean="0"/>
-              <a:t>7/31/2020</a:t>
+              <a:t>9/21/2020</a:t>
             </a:fld>
             <a:endParaRPr lang="en-US"/>
           </a:p>
@@ -2911,7 +2911,7 @@
           <a:p>
             <a:fld id="{2CEF6C36-5691-4952-B197-D88666D142D8}" type="datetimeFigureOut">
               <a:rPr lang="en-US" smtClean="0"/>
-              <a:t>7/31/2020</a:t>
+              <a:t>9/21/2020</a:t>
             </a:fld>
             <a:endParaRPr lang="en-US"/>
           </a:p>
@@ -5177,7 +5177,7 @@
         </p:nvSpPr>
         <p:spPr>
           <a:xfrm>
-            <a:off x="7827818" y="415636"/>
+            <a:off x="7139558" y="2057628"/>
             <a:ext cx="1129146" cy="2064328"/>
           </a:xfrm>
           <a:custGeom>
@@ -5346,7 +5346,7 @@
         </p:nvSpPr>
         <p:spPr>
           <a:xfrm rot="251432">
-            <a:off x="3068783" y="2493818"/>
+            <a:off x="728701" y="4135811"/>
             <a:ext cx="1468582" cy="685800"/>
           </a:xfrm>
           <a:custGeom>
@@ -5517,7 +5517,7 @@
         </p:nvSpPr>
         <p:spPr>
           <a:xfrm>
-            <a:off x="2577782" y="3997984"/>
+            <a:off x="3374199" y="2228180"/>
             <a:ext cx="2377440" cy="2377440"/>
           </a:xfrm>
           <a:prstGeom prst="ellipse">
@@ -5570,7 +5570,7 @@
         </p:nvSpPr>
         <p:spPr>
           <a:xfrm>
-            <a:off x="2570048" y="427248"/>
+            <a:off x="229966" y="2069241"/>
             <a:ext cx="2377440" cy="2743200"/>
           </a:xfrm>
           <a:prstGeom prst="ellipse">
@@ -5622,7 +5622,7 @@
         </p:nvSpPr>
         <p:spPr>
           <a:xfrm>
-            <a:off x="3713048" y="2438928"/>
+            <a:off x="1372966" y="4080921"/>
             <a:ext cx="91440" cy="91440"/>
           </a:xfrm>
           <a:prstGeom prst="ellipse">
@@ -5678,7 +5678,7 @@
         </p:nvCxnSpPr>
         <p:spPr>
           <a:xfrm rot="2700000">
-            <a:off x="2695373" y="3255978"/>
+            <a:off x="355291" y="4897971"/>
             <a:ext cx="1417320" cy="0"/>
           </a:xfrm>
           <a:prstGeom prst="straightConnector1">
@@ -5722,7 +5722,7 @@
         </p:nvCxnSpPr>
         <p:spPr>
           <a:xfrm>
-            <a:off x="3759073" y="3169748"/>
+            <a:off x="1418991" y="4811741"/>
             <a:ext cx="1554480" cy="0"/>
           </a:xfrm>
           <a:prstGeom prst="straightConnector1">
@@ -5767,7 +5767,7 @@
         </p:nvCxnSpPr>
         <p:spPr>
           <a:xfrm rot="18900000">
-            <a:off x="4289989" y="2384087"/>
+            <a:off x="1949907" y="4026080"/>
             <a:ext cx="1417320" cy="0"/>
           </a:xfrm>
           <a:prstGeom prst="straightConnector1">
@@ -5810,7 +5810,7 @@
         </p:nvSpPr>
         <p:spPr>
           <a:xfrm>
-            <a:off x="3345902" y="5171699"/>
+            <a:off x="4142319" y="3401895"/>
             <a:ext cx="91440" cy="91440"/>
           </a:xfrm>
           <a:prstGeom prst="ellipse">
@@ -5864,7 +5864,7 @@
         </p:nvSpPr>
         <p:spPr>
           <a:xfrm>
-            <a:off x="2582444" y="3998379"/>
+            <a:off x="3378861" y="2228575"/>
             <a:ext cx="2377440" cy="2377440"/>
           </a:xfrm>
           <a:prstGeom prst="arc">
@@ -5919,7 +5919,7 @@
         </p:nvCxnSpPr>
         <p:spPr>
           <a:xfrm rot="2700000">
-            <a:off x="3180282" y="5722089"/>
+            <a:off x="3976699" y="3952285"/>
             <a:ext cx="1417320" cy="0"/>
           </a:xfrm>
           <a:prstGeom prst="straightConnector1">
@@ -5963,7 +5963,7 @@
         </p:nvCxnSpPr>
         <p:spPr>
           <a:xfrm>
-            <a:off x="3385001" y="5213294"/>
+            <a:off x="4181418" y="3443490"/>
             <a:ext cx="1554480" cy="0"/>
           </a:xfrm>
           <a:prstGeom prst="straightConnector1">
@@ -6008,7 +6008,7 @@
         </p:nvCxnSpPr>
         <p:spPr>
           <a:xfrm rot="18900000">
-            <a:off x="3195478" y="4704728"/>
+            <a:off x="3991895" y="2934924"/>
             <a:ext cx="1417320" cy="0"/>
           </a:xfrm>
           <a:prstGeom prst="straightConnector1">
@@ -6053,7 +6053,7 @@
         </p:nvSpPr>
         <p:spPr>
           <a:xfrm>
-            <a:off x="7232923" y="3997987"/>
+            <a:off x="9553341" y="2208510"/>
             <a:ext cx="2377440" cy="2377440"/>
           </a:xfrm>
           <a:prstGeom prst="ellipse">
@@ -6106,7 +6106,7 @@
         </p:nvSpPr>
         <p:spPr>
           <a:xfrm>
-            <a:off x="7225189" y="427251"/>
+            <a:off x="6536929" y="2069243"/>
             <a:ext cx="2377440" cy="2743200"/>
           </a:xfrm>
           <a:prstGeom prst="ellipse">
@@ -6158,7 +6158,7 @@
         </p:nvSpPr>
         <p:spPr>
           <a:xfrm>
-            <a:off x="8368189" y="2438931"/>
+            <a:off x="7679929" y="4080923"/>
             <a:ext cx="91440" cy="91440"/>
           </a:xfrm>
           <a:prstGeom prst="ellipse">
@@ -6214,7 +6214,7 @@
         </p:nvCxnSpPr>
         <p:spPr>
           <a:xfrm rot="12600000">
-            <a:off x="8135261" y="345747"/>
+            <a:off x="7447001" y="1987739"/>
             <a:ext cx="822960" cy="0"/>
           </a:xfrm>
           <a:prstGeom prst="straightConnector1">
@@ -6256,7 +6256,7 @@
         </p:nvSpPr>
         <p:spPr>
           <a:xfrm>
-            <a:off x="8001043" y="5171702"/>
+            <a:off x="10321461" y="3382225"/>
             <a:ext cx="91440" cy="91440"/>
           </a:xfrm>
           <a:prstGeom prst="ellipse">
@@ -6310,7 +6310,7 @@
         </p:nvSpPr>
         <p:spPr>
           <a:xfrm>
-            <a:off x="7237585" y="3998382"/>
+            <a:off x="9558003" y="2208905"/>
             <a:ext cx="2377440" cy="2377440"/>
           </a:xfrm>
           <a:prstGeom prst="arc">
@@ -6365,7 +6365,7 @@
         </p:nvCxnSpPr>
         <p:spPr>
           <a:xfrm rot="12600000">
-            <a:off x="7262426" y="5007812"/>
+            <a:off x="9582844" y="3218335"/>
             <a:ext cx="822960" cy="0"/>
           </a:xfrm>
           <a:prstGeom prst="straightConnector1">
@@ -6409,7 +6409,7 @@
         </p:nvCxnSpPr>
         <p:spPr>
           <a:xfrm rot="10800000">
-            <a:off x="7618076" y="423669"/>
+            <a:off x="6929816" y="2065661"/>
             <a:ext cx="795528" cy="0"/>
           </a:xfrm>
           <a:prstGeom prst="straightConnector1">
@@ -6454,7 +6454,7 @@
         </p:nvCxnSpPr>
         <p:spPr>
           <a:xfrm rot="10800000">
-            <a:off x="7250929" y="5217355"/>
+            <a:off x="9571347" y="3427878"/>
             <a:ext cx="795528" cy="0"/>
           </a:xfrm>
           <a:prstGeom prst="straightConnector1">
@@ -6499,7 +6499,7 @@
         </p:nvCxnSpPr>
         <p:spPr>
           <a:xfrm rot="9000000">
-            <a:off x="7156511" y="758870"/>
+            <a:off x="6468251" y="2400862"/>
             <a:ext cx="822960" cy="0"/>
           </a:xfrm>
           <a:prstGeom prst="straightConnector1">
@@ -6544,7 +6544,7 @@
         </p:nvCxnSpPr>
         <p:spPr>
           <a:xfrm rot="9000000">
-            <a:off x="7281203" y="5434791"/>
+            <a:off x="9601621" y="3645314"/>
             <a:ext cx="822960" cy="0"/>
           </a:xfrm>
           <a:prstGeom prst="straightConnector1">
@@ -6556,6 +6556,47 @@
             </a:solidFill>
             <a:prstDash val="dashDot"/>
             <a:tailEnd type="triangle"/>
+          </a:ln>
+        </p:spPr>
+        <p:style>
+          <a:lnRef idx="1">
+            <a:schemeClr val="accent1"/>
+          </a:lnRef>
+          <a:fillRef idx="0">
+            <a:schemeClr val="accent1"/>
+          </a:fillRef>
+          <a:effectRef idx="0">
+            <a:schemeClr val="accent1"/>
+          </a:effectRef>
+          <a:fontRef idx="minor">
+            <a:schemeClr val="tx1"/>
+          </a:fontRef>
+        </p:style>
+      </p:cxnSp>
+      <p:cxnSp>
+        <p:nvCxnSpPr>
+          <p:cNvPr id="3" name="Straight Connector 2">
+            <a:extLst>
+              <a:ext uri="{FF2B5EF4-FFF2-40B4-BE49-F238E27FC236}">
+                <a16:creationId xmlns:a16="http://schemas.microsoft.com/office/drawing/2014/main" id="{08A28400-A180-44B9-B7BA-F5DFA0C388F2}"/>
+              </a:ext>
+            </a:extLst>
+          </p:cNvPr>
+          <p:cNvCxnSpPr/>
+          <p:nvPr/>
+        </p:nvCxnSpPr>
+        <p:spPr>
+          <a:xfrm>
+            <a:off x="6096000" y="1143000"/>
+            <a:ext cx="0" cy="4572000"/>
+          </a:xfrm>
+          <a:prstGeom prst="line">
+            <a:avLst/>
+          </a:prstGeom>
+          <a:ln w="28575">
+            <a:solidFill>
+              <a:schemeClr val="tx1"/>
+            </a:solidFill>
           </a:ln>
         </p:spPr>
         <p:style>

</xml_diff>

<commit_message>
Second draft of VIOD paper
paper structure overhaul
error analysis overhaul with MSE
figure style overhaul for accessibility
</commit_message>
<xml_diff>
--- a/journal/figures/hodographMapping.pptx
+++ b/journal/figures/hodographMapping.pptx
@@ -5,12 +5,12 @@
     <p:sldMasterId id="2147483648" r:id="rId1"/>
   </p:sldMasterIdLst>
   <p:sldIdLst>
-    <p:sldId id="256" r:id="rId2"/>
-    <p:sldId id="257" r:id="rId3"/>
-    <p:sldId id="259" r:id="rId4"/>
+    <p:sldId id="257" r:id="rId2"/>
+    <p:sldId id="259" r:id="rId3"/>
+    <p:sldId id="260" r:id="rId4"/>
   </p:sldIdLst>
   <p:sldSz cx="12192000" cy="6858000"/>
-  <p:notesSz cx="6858000" cy="9144000"/>
+  <p:notesSz cx="7315200" cy="9601200"/>
   <p:defaultTextStyle>
     <a:defPPr>
       <a:defRPr lang="en-US"/>
@@ -261,7 +261,7 @@
           <a:p>
             <a:fld id="{2CEF6C36-5691-4952-B197-D88666D142D8}" type="datetimeFigureOut">
               <a:rPr lang="en-US" smtClean="0"/>
-              <a:t>9/21/2020</a:t>
+              <a:t>10/1/2020</a:t>
             </a:fld>
             <a:endParaRPr lang="en-US"/>
           </a:p>
@@ -459,7 +459,7 @@
           <a:p>
             <a:fld id="{2CEF6C36-5691-4952-B197-D88666D142D8}" type="datetimeFigureOut">
               <a:rPr lang="en-US" smtClean="0"/>
-              <a:t>9/21/2020</a:t>
+              <a:t>10/1/2020</a:t>
             </a:fld>
             <a:endParaRPr lang="en-US"/>
           </a:p>
@@ -667,7 +667,7 @@
           <a:p>
             <a:fld id="{2CEF6C36-5691-4952-B197-D88666D142D8}" type="datetimeFigureOut">
               <a:rPr lang="en-US" smtClean="0"/>
-              <a:t>9/21/2020</a:t>
+              <a:t>10/1/2020</a:t>
             </a:fld>
             <a:endParaRPr lang="en-US"/>
           </a:p>
@@ -865,7 +865,7 @@
           <a:p>
             <a:fld id="{2CEF6C36-5691-4952-B197-D88666D142D8}" type="datetimeFigureOut">
               <a:rPr lang="en-US" smtClean="0"/>
-              <a:t>9/21/2020</a:t>
+              <a:t>10/1/2020</a:t>
             </a:fld>
             <a:endParaRPr lang="en-US"/>
           </a:p>
@@ -1140,7 +1140,7 @@
           <a:p>
             <a:fld id="{2CEF6C36-5691-4952-B197-D88666D142D8}" type="datetimeFigureOut">
               <a:rPr lang="en-US" smtClean="0"/>
-              <a:t>9/21/2020</a:t>
+              <a:t>10/1/2020</a:t>
             </a:fld>
             <a:endParaRPr lang="en-US"/>
           </a:p>
@@ -1405,7 +1405,7 @@
           <a:p>
             <a:fld id="{2CEF6C36-5691-4952-B197-D88666D142D8}" type="datetimeFigureOut">
               <a:rPr lang="en-US" smtClean="0"/>
-              <a:t>9/21/2020</a:t>
+              <a:t>10/1/2020</a:t>
             </a:fld>
             <a:endParaRPr lang="en-US"/>
           </a:p>
@@ -1817,7 +1817,7 @@
           <a:p>
             <a:fld id="{2CEF6C36-5691-4952-B197-D88666D142D8}" type="datetimeFigureOut">
               <a:rPr lang="en-US" smtClean="0"/>
-              <a:t>9/21/2020</a:t>
+              <a:t>10/1/2020</a:t>
             </a:fld>
             <a:endParaRPr lang="en-US"/>
           </a:p>
@@ -1958,7 +1958,7 @@
           <a:p>
             <a:fld id="{2CEF6C36-5691-4952-B197-D88666D142D8}" type="datetimeFigureOut">
               <a:rPr lang="en-US" smtClean="0"/>
-              <a:t>9/21/2020</a:t>
+              <a:t>10/1/2020</a:t>
             </a:fld>
             <a:endParaRPr lang="en-US"/>
           </a:p>
@@ -2071,7 +2071,7 @@
           <a:p>
             <a:fld id="{2CEF6C36-5691-4952-B197-D88666D142D8}" type="datetimeFigureOut">
               <a:rPr lang="en-US" smtClean="0"/>
-              <a:t>9/21/2020</a:t>
+              <a:t>10/1/2020</a:t>
             </a:fld>
             <a:endParaRPr lang="en-US"/>
           </a:p>
@@ -2382,7 +2382,7 @@
           <a:p>
             <a:fld id="{2CEF6C36-5691-4952-B197-D88666D142D8}" type="datetimeFigureOut">
               <a:rPr lang="en-US" smtClean="0"/>
-              <a:t>9/21/2020</a:t>
+              <a:t>10/1/2020</a:t>
             </a:fld>
             <a:endParaRPr lang="en-US"/>
           </a:p>
@@ -2670,7 +2670,7 @@
           <a:p>
             <a:fld id="{2CEF6C36-5691-4952-B197-D88666D142D8}" type="datetimeFigureOut">
               <a:rPr lang="en-US" smtClean="0"/>
-              <a:t>9/21/2020</a:t>
+              <a:t>10/1/2020</a:t>
             </a:fld>
             <a:endParaRPr lang="en-US"/>
           </a:p>
@@ -2911,7 +2911,7 @@
           <a:p>
             <a:fld id="{2CEF6C36-5691-4952-B197-D88666D142D8}" type="datetimeFigureOut">
               <a:rPr lang="en-US" smtClean="0"/>
-              <a:t>9/21/2020</a:t>
+              <a:t>10/1/2020</a:t>
             </a:fld>
             <a:endParaRPr lang="en-US"/>
           </a:p>
@@ -3330,86 +3330,6 @@
       </p:grpSpPr>
       <p:sp>
         <p:nvSpPr>
-          <p:cNvPr id="2" name="Title 1">
-            <a:extLst>
-              <a:ext uri="{FF2B5EF4-FFF2-40B4-BE49-F238E27FC236}">
-                <a16:creationId xmlns:a16="http://schemas.microsoft.com/office/drawing/2014/main" id="{4D6DC2BA-DFB9-4500-976E-27F1867EE751}"/>
-              </a:ext>
-            </a:extLst>
-          </p:cNvPr>
-          <p:cNvSpPr>
-            <a:spLocks noGrp="1"/>
-          </p:cNvSpPr>
-          <p:nvPr>
-            <p:ph type="ctrTitle"/>
-          </p:nvPr>
-        </p:nvSpPr>
-        <p:spPr/>
-        <p:txBody>
-          <a:bodyPr/>
-          <a:lstStyle/>
-          <a:p>
-            <a:endParaRPr lang="en-US"/>
-          </a:p>
-        </p:txBody>
-      </p:sp>
-      <p:sp>
-        <p:nvSpPr>
-          <p:cNvPr id="3" name="Subtitle 2">
-            <a:extLst>
-              <a:ext uri="{FF2B5EF4-FFF2-40B4-BE49-F238E27FC236}">
-                <a16:creationId xmlns:a16="http://schemas.microsoft.com/office/drawing/2014/main" id="{7118F47C-03AC-4659-A930-73AD925FEE27}"/>
-              </a:ext>
-            </a:extLst>
-          </p:cNvPr>
-          <p:cNvSpPr>
-            <a:spLocks noGrp="1"/>
-          </p:cNvSpPr>
-          <p:nvPr>
-            <p:ph type="subTitle" idx="1"/>
-          </p:nvPr>
-        </p:nvSpPr>
-        <p:spPr/>
-        <p:txBody>
-          <a:bodyPr/>
-          <a:lstStyle/>
-          <a:p>
-            <a:endParaRPr lang="en-US"/>
-          </a:p>
-        </p:txBody>
-      </p:sp>
-    </p:spTree>
-    <p:extLst>
-      <p:ext uri="{BB962C8B-B14F-4D97-AF65-F5344CB8AC3E}">
-        <p14:creationId xmlns:p14="http://schemas.microsoft.com/office/powerpoint/2010/main" val="1796859747"/>
-      </p:ext>
-    </p:extLst>
-  </p:cSld>
-  <p:clrMapOvr>
-    <a:masterClrMapping/>
-  </p:clrMapOvr>
-</p:sld>
-</file>
-
-<file path=ppt/slides/slide2.xml><?xml version="1.0" encoding="utf-8"?>
-<p:sld xmlns:a="http://schemas.openxmlformats.org/drawingml/2006/main" xmlns:r="http://schemas.openxmlformats.org/officeDocument/2006/relationships" xmlns:p="http://schemas.openxmlformats.org/presentationml/2006/main">
-  <p:cSld>
-    <p:spTree>
-      <p:nvGrpSpPr>
-        <p:cNvPr id="1" name=""/>
-        <p:cNvGrpSpPr/>
-        <p:nvPr/>
-      </p:nvGrpSpPr>
-      <p:grpSpPr>
-        <a:xfrm>
-          <a:off x="0" y="0"/>
-          <a:ext cx="0" cy="0"/>
-          <a:chOff x="0" y="0"/>
-          <a:chExt cx="0" cy="0"/>
-        </a:xfrm>
-      </p:grpSpPr>
-      <p:sp>
-        <p:nvSpPr>
           <p:cNvPr id="50" name="Oval 49">
             <a:extLst>
               <a:ext uri="{FF2B5EF4-FFF2-40B4-BE49-F238E27FC236}">
@@ -3796,7 +3716,7 @@
         </p:nvSpPr>
         <p:spPr>
           <a:xfrm>
-            <a:off x="1846050" y="1688296"/>
+            <a:off x="1846050" y="1806280"/>
             <a:ext cx="91440" cy="91440"/>
           </a:xfrm>
           <a:prstGeom prst="ellipse">
@@ -4924,8 +4844,8 @@
         </p:nvSpPr>
         <p:spPr>
           <a:xfrm rot="19800000">
-            <a:off x="66094" y="3445340"/>
-            <a:ext cx="2014432" cy="523220"/>
+            <a:off x="66094" y="3476117"/>
+            <a:ext cx="2014432" cy="461665"/>
           </a:xfrm>
           <a:prstGeom prst="rect">
             <a:avLst/>
@@ -4940,7 +4860,7 @@
           <a:p>
             <a:pPr algn="ctr"/>
             <a:r>
-              <a:rPr lang="en-US" sz="2800" dirty="0">
+              <a:rPr lang="en-US" sz="2400" dirty="0">
                 <a:latin typeface="Times New Roman" panose="02020603050405020304" pitchFamily="18" charset="0"/>
                 <a:cs typeface="Times New Roman" panose="02020603050405020304" pitchFamily="18" charset="0"/>
               </a:rPr>
@@ -4963,8 +4883,8 @@
         </p:nvSpPr>
         <p:spPr>
           <a:xfrm rot="19800000">
-            <a:off x="4094665" y="3448100"/>
-            <a:ext cx="2014432" cy="523220"/>
+            <a:off x="4094665" y="3478877"/>
+            <a:ext cx="2014432" cy="461665"/>
           </a:xfrm>
           <a:prstGeom prst="rect">
             <a:avLst/>
@@ -4979,7 +4899,7 @@
           <a:p>
             <a:pPr algn="ctr"/>
             <a:r>
-              <a:rPr lang="en-US" sz="2800" dirty="0">
+              <a:rPr lang="en-US" sz="2400" dirty="0">
                 <a:latin typeface="Times New Roman" panose="02020603050405020304" pitchFamily="18" charset="0"/>
                 <a:cs typeface="Times New Roman" panose="02020603050405020304" pitchFamily="18" charset="0"/>
               </a:rPr>
@@ -5002,8 +4922,8 @@
         </p:nvSpPr>
         <p:spPr>
           <a:xfrm rot="19800000">
-            <a:off x="7822272" y="3443691"/>
-            <a:ext cx="2014432" cy="523220"/>
+            <a:off x="7822272" y="3474468"/>
+            <a:ext cx="2014432" cy="461665"/>
           </a:xfrm>
           <a:prstGeom prst="rect">
             <a:avLst/>
@@ -5018,7 +4938,7 @@
           <a:p>
             <a:pPr algn="ctr"/>
             <a:r>
-              <a:rPr lang="en-US" sz="2800" dirty="0">
+              <a:rPr lang="en-US" sz="2400" dirty="0">
                 <a:latin typeface="Times New Roman" panose="02020603050405020304" pitchFamily="18" charset="0"/>
                 <a:cs typeface="Times New Roman" panose="02020603050405020304" pitchFamily="18" charset="0"/>
               </a:rPr>
@@ -5130,6 +5050,1005 @@
           <a:p>
             <a:pPr algn="ctr"/>
             <a:endParaRPr lang="en-US"/>
+          </a:p>
+        </p:txBody>
+      </p:sp>
+      <p:sp>
+        <p:nvSpPr>
+          <p:cNvPr id="2" name="TextBox 1">
+            <a:extLst>
+              <a:ext uri="{FF2B5EF4-FFF2-40B4-BE49-F238E27FC236}">
+                <a16:creationId xmlns:a16="http://schemas.microsoft.com/office/drawing/2014/main" id="{A2483200-3852-493D-BB76-B93F63176770}"/>
+              </a:ext>
+            </a:extLst>
+          </p:cNvPr>
+          <p:cNvSpPr txBox="1"/>
+          <p:nvPr/>
+        </p:nvSpPr>
+        <p:spPr>
+          <a:xfrm>
+            <a:off x="2810411" y="4917294"/>
+            <a:ext cx="914400" cy="400110"/>
+          </a:xfrm>
+          <a:prstGeom prst="rect">
+            <a:avLst/>
+          </a:prstGeom>
+          <a:noFill/>
+        </p:spPr>
+        <p:txBody>
+          <a:bodyPr wrap="square" rtlCol="0">
+            <a:spAutoFit/>
+          </a:bodyPr>
+          <a:lstStyle/>
+          <a:p>
+            <a:r>
+              <a:rPr lang="en-US" sz="2000" dirty="0">
+                <a:latin typeface="Times New Roman" panose="02020603050405020304" pitchFamily="18" charset="0"/>
+                <a:cs typeface="Times New Roman" panose="02020603050405020304" pitchFamily="18" charset="0"/>
+              </a:rPr>
+              <a:t>v</a:t>
+            </a:r>
+            <a:r>
+              <a:rPr lang="en-US" sz="1200" dirty="0">
+                <a:latin typeface="Times New Roman" panose="02020603050405020304" pitchFamily="18" charset="0"/>
+                <a:cs typeface="Times New Roman" panose="02020603050405020304" pitchFamily="18" charset="0"/>
+              </a:rPr>
+              <a:t>1</a:t>
+            </a:r>
+            <a:endParaRPr lang="en-US" dirty="0">
+              <a:latin typeface="Times New Roman" panose="02020603050405020304" pitchFamily="18" charset="0"/>
+              <a:cs typeface="Times New Roman" panose="02020603050405020304" pitchFamily="18" charset="0"/>
+            </a:endParaRPr>
+          </a:p>
+        </p:txBody>
+      </p:sp>
+      <p:sp>
+        <p:nvSpPr>
+          <p:cNvPr id="39" name="TextBox 38">
+            <a:extLst>
+              <a:ext uri="{FF2B5EF4-FFF2-40B4-BE49-F238E27FC236}">
+                <a16:creationId xmlns:a16="http://schemas.microsoft.com/office/drawing/2014/main" id="{65F42FF8-146A-4799-86F1-81B726FD7B49}"/>
+              </a:ext>
+            </a:extLst>
+          </p:cNvPr>
+          <p:cNvSpPr txBox="1"/>
+          <p:nvPr/>
+        </p:nvSpPr>
+        <p:spPr>
+          <a:xfrm>
+            <a:off x="2763646" y="2873338"/>
+            <a:ext cx="914400" cy="400110"/>
+          </a:xfrm>
+          <a:prstGeom prst="rect">
+            <a:avLst/>
+          </a:prstGeom>
+          <a:noFill/>
+        </p:spPr>
+        <p:txBody>
+          <a:bodyPr wrap="square" rtlCol="0">
+            <a:spAutoFit/>
+          </a:bodyPr>
+          <a:lstStyle/>
+          <a:p>
+            <a:r>
+              <a:rPr lang="en-US" sz="2000" dirty="0">
+                <a:latin typeface="Times New Roman" panose="02020603050405020304" pitchFamily="18" charset="0"/>
+                <a:cs typeface="Times New Roman" panose="02020603050405020304" pitchFamily="18" charset="0"/>
+              </a:rPr>
+              <a:t>v</a:t>
+            </a:r>
+            <a:r>
+              <a:rPr lang="en-US" sz="1200" dirty="0">
+                <a:latin typeface="Times New Roman" panose="02020603050405020304" pitchFamily="18" charset="0"/>
+                <a:cs typeface="Times New Roman" panose="02020603050405020304" pitchFamily="18" charset="0"/>
+              </a:rPr>
+              <a:t>1</a:t>
+            </a:r>
+            <a:endParaRPr lang="en-US" dirty="0">
+              <a:latin typeface="Times New Roman" panose="02020603050405020304" pitchFamily="18" charset="0"/>
+              <a:cs typeface="Times New Roman" panose="02020603050405020304" pitchFamily="18" charset="0"/>
+            </a:endParaRPr>
+          </a:p>
+        </p:txBody>
+      </p:sp>
+      <p:sp>
+        <p:nvSpPr>
+          <p:cNvPr id="51" name="TextBox 50">
+            <a:extLst>
+              <a:ext uri="{FF2B5EF4-FFF2-40B4-BE49-F238E27FC236}">
+                <a16:creationId xmlns:a16="http://schemas.microsoft.com/office/drawing/2014/main" id="{5E5AE4FE-0F88-43AF-B4EB-82AEEEFFFE75}"/>
+              </a:ext>
+            </a:extLst>
+          </p:cNvPr>
+          <p:cNvSpPr txBox="1"/>
+          <p:nvPr/>
+        </p:nvSpPr>
+        <p:spPr>
+          <a:xfrm>
+            <a:off x="2693508" y="4507108"/>
+            <a:ext cx="914400" cy="400110"/>
+          </a:xfrm>
+          <a:prstGeom prst="rect">
+            <a:avLst/>
+          </a:prstGeom>
+          <a:noFill/>
+        </p:spPr>
+        <p:txBody>
+          <a:bodyPr wrap="square" rtlCol="0">
+            <a:spAutoFit/>
+          </a:bodyPr>
+          <a:lstStyle/>
+          <a:p>
+            <a:r>
+              <a:rPr lang="en-US" sz="2000" dirty="0">
+                <a:latin typeface="Times New Roman" panose="02020603050405020304" pitchFamily="18" charset="0"/>
+                <a:cs typeface="Times New Roman" panose="02020603050405020304" pitchFamily="18" charset="0"/>
+              </a:rPr>
+              <a:t>v</a:t>
+            </a:r>
+            <a:r>
+              <a:rPr lang="en-US" sz="1200" dirty="0">
+                <a:latin typeface="Times New Roman" panose="02020603050405020304" pitchFamily="18" charset="0"/>
+                <a:cs typeface="Times New Roman" panose="02020603050405020304" pitchFamily="18" charset="0"/>
+              </a:rPr>
+              <a:t>2</a:t>
+            </a:r>
+            <a:endParaRPr lang="en-US" dirty="0">
+              <a:latin typeface="Times New Roman" panose="02020603050405020304" pitchFamily="18" charset="0"/>
+              <a:cs typeface="Times New Roman" panose="02020603050405020304" pitchFamily="18" charset="0"/>
+            </a:endParaRPr>
+          </a:p>
+        </p:txBody>
+      </p:sp>
+      <p:sp>
+        <p:nvSpPr>
+          <p:cNvPr id="53" name="TextBox 52">
+            <a:extLst>
+              <a:ext uri="{FF2B5EF4-FFF2-40B4-BE49-F238E27FC236}">
+                <a16:creationId xmlns:a16="http://schemas.microsoft.com/office/drawing/2014/main" id="{7A64D4B3-CB56-4D79-BAC9-FC8D6DC71F73}"/>
+              </a:ext>
+            </a:extLst>
+          </p:cNvPr>
+          <p:cNvSpPr txBox="1"/>
+          <p:nvPr/>
+        </p:nvSpPr>
+        <p:spPr>
+          <a:xfrm>
+            <a:off x="3306939" y="2358777"/>
+            <a:ext cx="914400" cy="400110"/>
+          </a:xfrm>
+          <a:prstGeom prst="rect">
+            <a:avLst/>
+          </a:prstGeom>
+          <a:noFill/>
+        </p:spPr>
+        <p:txBody>
+          <a:bodyPr wrap="square" rtlCol="0">
+            <a:spAutoFit/>
+          </a:bodyPr>
+          <a:lstStyle/>
+          <a:p>
+            <a:r>
+              <a:rPr lang="en-US" sz="2000" dirty="0">
+                <a:latin typeface="Times New Roman" panose="02020603050405020304" pitchFamily="18" charset="0"/>
+                <a:cs typeface="Times New Roman" panose="02020603050405020304" pitchFamily="18" charset="0"/>
+              </a:rPr>
+              <a:t>v</a:t>
+            </a:r>
+            <a:r>
+              <a:rPr lang="en-US" sz="1200" dirty="0">
+                <a:latin typeface="Times New Roman" panose="02020603050405020304" pitchFamily="18" charset="0"/>
+                <a:cs typeface="Times New Roman" panose="02020603050405020304" pitchFamily="18" charset="0"/>
+              </a:rPr>
+              <a:t>2</a:t>
+            </a:r>
+            <a:endParaRPr lang="en-US" dirty="0">
+              <a:latin typeface="Times New Roman" panose="02020603050405020304" pitchFamily="18" charset="0"/>
+              <a:cs typeface="Times New Roman" panose="02020603050405020304" pitchFamily="18" charset="0"/>
+            </a:endParaRPr>
+          </a:p>
+        </p:txBody>
+      </p:sp>
+      <p:sp>
+        <p:nvSpPr>
+          <p:cNvPr id="55" name="TextBox 54">
+            <a:extLst>
+              <a:ext uri="{FF2B5EF4-FFF2-40B4-BE49-F238E27FC236}">
+                <a16:creationId xmlns:a16="http://schemas.microsoft.com/office/drawing/2014/main" id="{E0D432EA-8B46-4DD0-8526-E48B5ED543FE}"/>
+              </a:ext>
+            </a:extLst>
+          </p:cNvPr>
+          <p:cNvSpPr txBox="1"/>
+          <p:nvPr/>
+        </p:nvSpPr>
+        <p:spPr>
+          <a:xfrm>
+            <a:off x="2477474" y="4146643"/>
+            <a:ext cx="914400" cy="400110"/>
+          </a:xfrm>
+          <a:prstGeom prst="rect">
+            <a:avLst/>
+          </a:prstGeom>
+          <a:noFill/>
+        </p:spPr>
+        <p:txBody>
+          <a:bodyPr wrap="square" rtlCol="0">
+            <a:spAutoFit/>
+          </a:bodyPr>
+          <a:lstStyle/>
+          <a:p>
+            <a:r>
+              <a:rPr lang="en-US" sz="2000" dirty="0">
+                <a:latin typeface="Times New Roman" panose="02020603050405020304" pitchFamily="18" charset="0"/>
+                <a:cs typeface="Times New Roman" panose="02020603050405020304" pitchFamily="18" charset="0"/>
+              </a:rPr>
+              <a:t>v</a:t>
+            </a:r>
+            <a:r>
+              <a:rPr lang="en-US" sz="1200" dirty="0">
+                <a:latin typeface="Times New Roman" panose="02020603050405020304" pitchFamily="18" charset="0"/>
+                <a:cs typeface="Times New Roman" panose="02020603050405020304" pitchFamily="18" charset="0"/>
+              </a:rPr>
+              <a:t>3</a:t>
+            </a:r>
+            <a:endParaRPr lang="en-US" dirty="0">
+              <a:latin typeface="Times New Roman" panose="02020603050405020304" pitchFamily="18" charset="0"/>
+              <a:cs typeface="Times New Roman" panose="02020603050405020304" pitchFamily="18" charset="0"/>
+            </a:endParaRPr>
+          </a:p>
+        </p:txBody>
+      </p:sp>
+      <p:sp>
+        <p:nvSpPr>
+          <p:cNvPr id="56" name="TextBox 55">
+            <a:extLst>
+              <a:ext uri="{FF2B5EF4-FFF2-40B4-BE49-F238E27FC236}">
+                <a16:creationId xmlns:a16="http://schemas.microsoft.com/office/drawing/2014/main" id="{C6DC249C-685A-4419-9E7B-32EE04D055B6}"/>
+              </a:ext>
+            </a:extLst>
+          </p:cNvPr>
+          <p:cNvSpPr txBox="1"/>
+          <p:nvPr/>
+        </p:nvSpPr>
+        <p:spPr>
+          <a:xfrm>
+            <a:off x="3455044" y="1734695"/>
+            <a:ext cx="914400" cy="400110"/>
+          </a:xfrm>
+          <a:prstGeom prst="rect">
+            <a:avLst/>
+          </a:prstGeom>
+          <a:noFill/>
+        </p:spPr>
+        <p:txBody>
+          <a:bodyPr wrap="square" rtlCol="0">
+            <a:spAutoFit/>
+          </a:bodyPr>
+          <a:lstStyle/>
+          <a:p>
+            <a:r>
+              <a:rPr lang="en-US" sz="2000" dirty="0">
+                <a:latin typeface="Times New Roman" panose="02020603050405020304" pitchFamily="18" charset="0"/>
+                <a:cs typeface="Times New Roman" panose="02020603050405020304" pitchFamily="18" charset="0"/>
+              </a:rPr>
+              <a:t>v</a:t>
+            </a:r>
+            <a:r>
+              <a:rPr lang="en-US" sz="1200" dirty="0">
+                <a:latin typeface="Times New Roman" panose="02020603050405020304" pitchFamily="18" charset="0"/>
+                <a:cs typeface="Times New Roman" panose="02020603050405020304" pitchFamily="18" charset="0"/>
+              </a:rPr>
+              <a:t>3</a:t>
+            </a:r>
+            <a:endParaRPr lang="en-US" dirty="0">
+              <a:latin typeface="Times New Roman" panose="02020603050405020304" pitchFamily="18" charset="0"/>
+              <a:cs typeface="Times New Roman" panose="02020603050405020304" pitchFamily="18" charset="0"/>
+            </a:endParaRPr>
+          </a:p>
+        </p:txBody>
+      </p:sp>
+      <p:sp>
+        <p:nvSpPr>
+          <p:cNvPr id="57" name="TextBox 56">
+            <a:extLst>
+              <a:ext uri="{FF2B5EF4-FFF2-40B4-BE49-F238E27FC236}">
+                <a16:creationId xmlns:a16="http://schemas.microsoft.com/office/drawing/2014/main" id="{CC83EE61-6A87-4639-B6AA-767AAAD6F257}"/>
+              </a:ext>
+            </a:extLst>
+          </p:cNvPr>
+          <p:cNvSpPr txBox="1"/>
+          <p:nvPr/>
+        </p:nvSpPr>
+        <p:spPr>
+          <a:xfrm>
+            <a:off x="7105335" y="4895698"/>
+            <a:ext cx="914400" cy="400110"/>
+          </a:xfrm>
+          <a:prstGeom prst="rect">
+            <a:avLst/>
+          </a:prstGeom>
+          <a:noFill/>
+        </p:spPr>
+        <p:txBody>
+          <a:bodyPr wrap="square" rtlCol="0">
+            <a:spAutoFit/>
+          </a:bodyPr>
+          <a:lstStyle/>
+          <a:p>
+            <a:r>
+              <a:rPr lang="en-US" sz="2000" dirty="0">
+                <a:latin typeface="Times New Roman" panose="02020603050405020304" pitchFamily="18" charset="0"/>
+                <a:cs typeface="Times New Roman" panose="02020603050405020304" pitchFamily="18" charset="0"/>
+              </a:rPr>
+              <a:t>v</a:t>
+            </a:r>
+            <a:r>
+              <a:rPr lang="en-US" sz="1200" dirty="0">
+                <a:latin typeface="Times New Roman" panose="02020603050405020304" pitchFamily="18" charset="0"/>
+                <a:cs typeface="Times New Roman" panose="02020603050405020304" pitchFamily="18" charset="0"/>
+              </a:rPr>
+              <a:t>1</a:t>
+            </a:r>
+            <a:endParaRPr lang="en-US" dirty="0">
+              <a:latin typeface="Times New Roman" panose="02020603050405020304" pitchFamily="18" charset="0"/>
+              <a:cs typeface="Times New Roman" panose="02020603050405020304" pitchFamily="18" charset="0"/>
+            </a:endParaRPr>
+          </a:p>
+        </p:txBody>
+      </p:sp>
+      <p:sp>
+        <p:nvSpPr>
+          <p:cNvPr id="58" name="TextBox 57">
+            <a:extLst>
+              <a:ext uri="{FF2B5EF4-FFF2-40B4-BE49-F238E27FC236}">
+                <a16:creationId xmlns:a16="http://schemas.microsoft.com/office/drawing/2014/main" id="{1824B875-4D3B-45DC-8E31-6C625EECA9C6}"/>
+              </a:ext>
+            </a:extLst>
+          </p:cNvPr>
+          <p:cNvSpPr txBox="1"/>
+          <p:nvPr/>
+        </p:nvSpPr>
+        <p:spPr>
+          <a:xfrm>
+            <a:off x="7437473" y="2878968"/>
+            <a:ext cx="914400" cy="400110"/>
+          </a:xfrm>
+          <a:prstGeom prst="rect">
+            <a:avLst/>
+          </a:prstGeom>
+          <a:noFill/>
+        </p:spPr>
+        <p:txBody>
+          <a:bodyPr wrap="square" rtlCol="0">
+            <a:spAutoFit/>
+          </a:bodyPr>
+          <a:lstStyle/>
+          <a:p>
+            <a:r>
+              <a:rPr lang="en-US" sz="2000" dirty="0">
+                <a:latin typeface="Times New Roman" panose="02020603050405020304" pitchFamily="18" charset="0"/>
+                <a:cs typeface="Times New Roman" panose="02020603050405020304" pitchFamily="18" charset="0"/>
+              </a:rPr>
+              <a:t>v</a:t>
+            </a:r>
+            <a:r>
+              <a:rPr lang="en-US" sz="1200" dirty="0">
+                <a:latin typeface="Times New Roman" panose="02020603050405020304" pitchFamily="18" charset="0"/>
+                <a:cs typeface="Times New Roman" panose="02020603050405020304" pitchFamily="18" charset="0"/>
+              </a:rPr>
+              <a:t>1</a:t>
+            </a:r>
+            <a:endParaRPr lang="en-US" dirty="0">
+              <a:latin typeface="Times New Roman" panose="02020603050405020304" pitchFamily="18" charset="0"/>
+              <a:cs typeface="Times New Roman" panose="02020603050405020304" pitchFamily="18" charset="0"/>
+            </a:endParaRPr>
+          </a:p>
+        </p:txBody>
+      </p:sp>
+      <p:sp>
+        <p:nvSpPr>
+          <p:cNvPr id="59" name="TextBox 58">
+            <a:extLst>
+              <a:ext uri="{FF2B5EF4-FFF2-40B4-BE49-F238E27FC236}">
+                <a16:creationId xmlns:a16="http://schemas.microsoft.com/office/drawing/2014/main" id="{26B2699A-5EA4-499A-B60C-A6623E42B6FD}"/>
+              </a:ext>
+            </a:extLst>
+          </p:cNvPr>
+          <p:cNvSpPr txBox="1"/>
+          <p:nvPr/>
+        </p:nvSpPr>
+        <p:spPr>
+          <a:xfrm>
+            <a:off x="11214630" y="2701180"/>
+            <a:ext cx="914400" cy="400110"/>
+          </a:xfrm>
+          <a:prstGeom prst="rect">
+            <a:avLst/>
+          </a:prstGeom>
+          <a:noFill/>
+        </p:spPr>
+        <p:txBody>
+          <a:bodyPr wrap="square" rtlCol="0">
+            <a:spAutoFit/>
+          </a:bodyPr>
+          <a:lstStyle/>
+          <a:p>
+            <a:r>
+              <a:rPr lang="en-US" sz="2000" dirty="0">
+                <a:latin typeface="Times New Roman" panose="02020603050405020304" pitchFamily="18" charset="0"/>
+                <a:cs typeface="Times New Roman" panose="02020603050405020304" pitchFamily="18" charset="0"/>
+              </a:rPr>
+              <a:t>v</a:t>
+            </a:r>
+            <a:r>
+              <a:rPr lang="en-US" sz="1200" dirty="0">
+                <a:latin typeface="Times New Roman" panose="02020603050405020304" pitchFamily="18" charset="0"/>
+                <a:cs typeface="Times New Roman" panose="02020603050405020304" pitchFamily="18" charset="0"/>
+              </a:rPr>
+              <a:t>1</a:t>
+            </a:r>
+            <a:endParaRPr lang="en-US" dirty="0">
+              <a:latin typeface="Times New Roman" panose="02020603050405020304" pitchFamily="18" charset="0"/>
+              <a:cs typeface="Times New Roman" panose="02020603050405020304" pitchFamily="18" charset="0"/>
+            </a:endParaRPr>
+          </a:p>
+        </p:txBody>
+      </p:sp>
+      <p:sp>
+        <p:nvSpPr>
+          <p:cNvPr id="60" name="TextBox 59">
+            <a:extLst>
+              <a:ext uri="{FF2B5EF4-FFF2-40B4-BE49-F238E27FC236}">
+                <a16:creationId xmlns:a16="http://schemas.microsoft.com/office/drawing/2014/main" id="{00BF9113-A8E0-4B79-B037-AC595D48C1C3}"/>
+              </a:ext>
+            </a:extLst>
+          </p:cNvPr>
+          <p:cNvSpPr txBox="1"/>
+          <p:nvPr/>
+        </p:nvSpPr>
+        <p:spPr>
+          <a:xfrm>
+            <a:off x="10840478" y="4755114"/>
+            <a:ext cx="914400" cy="400110"/>
+          </a:xfrm>
+          <a:prstGeom prst="rect">
+            <a:avLst/>
+          </a:prstGeom>
+          <a:noFill/>
+        </p:spPr>
+        <p:txBody>
+          <a:bodyPr wrap="square" rtlCol="0">
+            <a:spAutoFit/>
+          </a:bodyPr>
+          <a:lstStyle/>
+          <a:p>
+            <a:r>
+              <a:rPr lang="en-US" sz="2000" dirty="0">
+                <a:latin typeface="Times New Roman" panose="02020603050405020304" pitchFamily="18" charset="0"/>
+                <a:cs typeface="Times New Roman" panose="02020603050405020304" pitchFamily="18" charset="0"/>
+              </a:rPr>
+              <a:t>v</a:t>
+            </a:r>
+            <a:r>
+              <a:rPr lang="en-US" sz="1200" dirty="0">
+                <a:latin typeface="Times New Roman" panose="02020603050405020304" pitchFamily="18" charset="0"/>
+                <a:cs typeface="Times New Roman" panose="02020603050405020304" pitchFamily="18" charset="0"/>
+              </a:rPr>
+              <a:t>1</a:t>
+            </a:r>
+            <a:endParaRPr lang="en-US" dirty="0">
+              <a:latin typeface="Times New Roman" panose="02020603050405020304" pitchFamily="18" charset="0"/>
+              <a:cs typeface="Times New Roman" panose="02020603050405020304" pitchFamily="18" charset="0"/>
+            </a:endParaRPr>
+          </a:p>
+        </p:txBody>
+      </p:sp>
+      <p:sp>
+        <p:nvSpPr>
+          <p:cNvPr id="61" name="TextBox 60">
+            <a:extLst>
+              <a:ext uri="{FF2B5EF4-FFF2-40B4-BE49-F238E27FC236}">
+                <a16:creationId xmlns:a16="http://schemas.microsoft.com/office/drawing/2014/main" id="{25F57FF3-059D-443B-A4FD-653B2EDF2CE5}"/>
+              </a:ext>
+            </a:extLst>
+          </p:cNvPr>
+          <p:cNvSpPr txBox="1"/>
+          <p:nvPr/>
+        </p:nvSpPr>
+        <p:spPr>
+          <a:xfrm>
+            <a:off x="6630762" y="3873226"/>
+            <a:ext cx="914400" cy="400110"/>
+          </a:xfrm>
+          <a:prstGeom prst="rect">
+            <a:avLst/>
+          </a:prstGeom>
+          <a:noFill/>
+        </p:spPr>
+        <p:txBody>
+          <a:bodyPr wrap="square" rtlCol="0">
+            <a:spAutoFit/>
+          </a:bodyPr>
+          <a:lstStyle/>
+          <a:p>
+            <a:r>
+              <a:rPr lang="en-US" sz="2000" dirty="0">
+                <a:latin typeface="Times New Roman" panose="02020603050405020304" pitchFamily="18" charset="0"/>
+                <a:cs typeface="Times New Roman" panose="02020603050405020304" pitchFamily="18" charset="0"/>
+              </a:rPr>
+              <a:t>v</a:t>
+            </a:r>
+            <a:r>
+              <a:rPr lang="en-US" sz="1200" dirty="0">
+                <a:latin typeface="Times New Roman" panose="02020603050405020304" pitchFamily="18" charset="0"/>
+                <a:cs typeface="Times New Roman" panose="02020603050405020304" pitchFamily="18" charset="0"/>
+              </a:rPr>
+              <a:t>2</a:t>
+            </a:r>
+            <a:endParaRPr lang="en-US" dirty="0">
+              <a:latin typeface="Times New Roman" panose="02020603050405020304" pitchFamily="18" charset="0"/>
+              <a:cs typeface="Times New Roman" panose="02020603050405020304" pitchFamily="18" charset="0"/>
+            </a:endParaRPr>
+          </a:p>
+        </p:txBody>
+      </p:sp>
+      <p:sp>
+        <p:nvSpPr>
+          <p:cNvPr id="62" name="TextBox 61">
+            <a:extLst>
+              <a:ext uri="{FF2B5EF4-FFF2-40B4-BE49-F238E27FC236}">
+                <a16:creationId xmlns:a16="http://schemas.microsoft.com/office/drawing/2014/main" id="{071F33AA-EB49-446F-9949-AD454EC4FFE9}"/>
+              </a:ext>
+            </a:extLst>
+          </p:cNvPr>
+          <p:cNvSpPr txBox="1"/>
+          <p:nvPr/>
+        </p:nvSpPr>
+        <p:spPr>
+          <a:xfrm>
+            <a:off x="7632340" y="1607895"/>
+            <a:ext cx="914400" cy="400110"/>
+          </a:xfrm>
+          <a:prstGeom prst="rect">
+            <a:avLst/>
+          </a:prstGeom>
+          <a:noFill/>
+        </p:spPr>
+        <p:txBody>
+          <a:bodyPr wrap="square" rtlCol="0">
+            <a:spAutoFit/>
+          </a:bodyPr>
+          <a:lstStyle/>
+          <a:p>
+            <a:r>
+              <a:rPr lang="en-US" sz="2000" dirty="0">
+                <a:latin typeface="Times New Roman" panose="02020603050405020304" pitchFamily="18" charset="0"/>
+                <a:cs typeface="Times New Roman" panose="02020603050405020304" pitchFamily="18" charset="0"/>
+              </a:rPr>
+              <a:t>v</a:t>
+            </a:r>
+            <a:r>
+              <a:rPr lang="en-US" sz="1200" dirty="0">
+                <a:latin typeface="Times New Roman" panose="02020603050405020304" pitchFamily="18" charset="0"/>
+                <a:cs typeface="Times New Roman" panose="02020603050405020304" pitchFamily="18" charset="0"/>
+              </a:rPr>
+              <a:t>2</a:t>
+            </a:r>
+            <a:endParaRPr lang="en-US" dirty="0">
+              <a:latin typeface="Times New Roman" panose="02020603050405020304" pitchFamily="18" charset="0"/>
+              <a:cs typeface="Times New Roman" panose="02020603050405020304" pitchFamily="18" charset="0"/>
+            </a:endParaRPr>
+          </a:p>
+        </p:txBody>
+      </p:sp>
+      <p:sp>
+        <p:nvSpPr>
+          <p:cNvPr id="63" name="TextBox 62">
+            <a:extLst>
+              <a:ext uri="{FF2B5EF4-FFF2-40B4-BE49-F238E27FC236}">
+                <a16:creationId xmlns:a16="http://schemas.microsoft.com/office/drawing/2014/main" id="{BA9B78C8-9AC9-4870-987A-9670389E4142}"/>
+              </a:ext>
+            </a:extLst>
+          </p:cNvPr>
+          <p:cNvSpPr txBox="1"/>
+          <p:nvPr/>
+        </p:nvSpPr>
+        <p:spPr>
+          <a:xfrm>
+            <a:off x="10155005" y="712596"/>
+            <a:ext cx="914400" cy="400110"/>
+          </a:xfrm>
+          <a:prstGeom prst="rect">
+            <a:avLst/>
+          </a:prstGeom>
+          <a:noFill/>
+        </p:spPr>
+        <p:txBody>
+          <a:bodyPr wrap="square" rtlCol="0">
+            <a:spAutoFit/>
+          </a:bodyPr>
+          <a:lstStyle/>
+          <a:p>
+            <a:r>
+              <a:rPr lang="en-US" sz="2000" dirty="0">
+                <a:latin typeface="Times New Roman" panose="02020603050405020304" pitchFamily="18" charset="0"/>
+                <a:cs typeface="Times New Roman" panose="02020603050405020304" pitchFamily="18" charset="0"/>
+              </a:rPr>
+              <a:t>v</a:t>
+            </a:r>
+            <a:r>
+              <a:rPr lang="en-US" sz="1200" dirty="0">
+                <a:latin typeface="Times New Roman" panose="02020603050405020304" pitchFamily="18" charset="0"/>
+                <a:cs typeface="Times New Roman" panose="02020603050405020304" pitchFamily="18" charset="0"/>
+              </a:rPr>
+              <a:t>2</a:t>
+            </a:r>
+            <a:endParaRPr lang="en-US" dirty="0">
+              <a:latin typeface="Times New Roman" panose="02020603050405020304" pitchFamily="18" charset="0"/>
+              <a:cs typeface="Times New Roman" panose="02020603050405020304" pitchFamily="18" charset="0"/>
+            </a:endParaRPr>
+          </a:p>
+        </p:txBody>
+      </p:sp>
+      <p:sp>
+        <p:nvSpPr>
+          <p:cNvPr id="64" name="TextBox 63">
+            <a:extLst>
+              <a:ext uri="{FF2B5EF4-FFF2-40B4-BE49-F238E27FC236}">
+                <a16:creationId xmlns:a16="http://schemas.microsoft.com/office/drawing/2014/main" id="{269FCEC2-2288-4B62-958E-D5F9C0906FA8}"/>
+              </a:ext>
+            </a:extLst>
+          </p:cNvPr>
+          <p:cNvSpPr txBox="1"/>
+          <p:nvPr/>
+        </p:nvSpPr>
+        <p:spPr>
+          <a:xfrm>
+            <a:off x="9150254" y="4037640"/>
+            <a:ext cx="914400" cy="400110"/>
+          </a:xfrm>
+          <a:prstGeom prst="rect">
+            <a:avLst/>
+          </a:prstGeom>
+          <a:noFill/>
+        </p:spPr>
+        <p:txBody>
+          <a:bodyPr wrap="square" rtlCol="0">
+            <a:spAutoFit/>
+          </a:bodyPr>
+          <a:lstStyle/>
+          <a:p>
+            <a:r>
+              <a:rPr lang="en-US" sz="2000" dirty="0">
+                <a:latin typeface="Times New Roman" panose="02020603050405020304" pitchFamily="18" charset="0"/>
+                <a:cs typeface="Times New Roman" panose="02020603050405020304" pitchFamily="18" charset="0"/>
+              </a:rPr>
+              <a:t>v</a:t>
+            </a:r>
+            <a:r>
+              <a:rPr lang="en-US" sz="1200" dirty="0">
+                <a:latin typeface="Times New Roman" panose="02020603050405020304" pitchFamily="18" charset="0"/>
+                <a:cs typeface="Times New Roman" panose="02020603050405020304" pitchFamily="18" charset="0"/>
+              </a:rPr>
+              <a:t>2</a:t>
+            </a:r>
+            <a:endParaRPr lang="en-US" dirty="0">
+              <a:latin typeface="Times New Roman" panose="02020603050405020304" pitchFamily="18" charset="0"/>
+              <a:cs typeface="Times New Roman" panose="02020603050405020304" pitchFamily="18" charset="0"/>
+            </a:endParaRPr>
+          </a:p>
+        </p:txBody>
+      </p:sp>
+      <p:sp>
+        <p:nvSpPr>
+          <p:cNvPr id="65" name="TextBox 64">
+            <a:extLst>
+              <a:ext uri="{FF2B5EF4-FFF2-40B4-BE49-F238E27FC236}">
+                <a16:creationId xmlns:a16="http://schemas.microsoft.com/office/drawing/2014/main" id="{0D7A7DFE-7F35-487E-BEC5-AB88032D08FD}"/>
+              </a:ext>
+            </a:extLst>
+          </p:cNvPr>
+          <p:cNvSpPr txBox="1"/>
+          <p:nvPr/>
+        </p:nvSpPr>
+        <p:spPr>
+          <a:xfrm>
+            <a:off x="5839817" y="3509358"/>
+            <a:ext cx="914400" cy="400110"/>
+          </a:xfrm>
+          <a:prstGeom prst="rect">
+            <a:avLst/>
+          </a:prstGeom>
+          <a:noFill/>
+        </p:spPr>
+        <p:txBody>
+          <a:bodyPr wrap="square" rtlCol="0">
+            <a:spAutoFit/>
+          </a:bodyPr>
+          <a:lstStyle/>
+          <a:p>
+            <a:r>
+              <a:rPr lang="en-US" sz="2000" dirty="0">
+                <a:latin typeface="Times New Roman" panose="02020603050405020304" pitchFamily="18" charset="0"/>
+                <a:cs typeface="Times New Roman" panose="02020603050405020304" pitchFamily="18" charset="0"/>
+              </a:rPr>
+              <a:t>v</a:t>
+            </a:r>
+            <a:r>
+              <a:rPr lang="en-US" sz="1200" dirty="0">
+                <a:latin typeface="Times New Roman" panose="02020603050405020304" pitchFamily="18" charset="0"/>
+                <a:cs typeface="Times New Roman" panose="02020603050405020304" pitchFamily="18" charset="0"/>
+              </a:rPr>
+              <a:t>3</a:t>
+            </a:r>
+            <a:endParaRPr lang="en-US" dirty="0">
+              <a:latin typeface="Times New Roman" panose="02020603050405020304" pitchFamily="18" charset="0"/>
+              <a:cs typeface="Times New Roman" panose="02020603050405020304" pitchFamily="18" charset="0"/>
+            </a:endParaRPr>
+          </a:p>
+        </p:txBody>
+      </p:sp>
+      <p:sp>
+        <p:nvSpPr>
+          <p:cNvPr id="67" name="TextBox 66">
+            <a:extLst>
+              <a:ext uri="{FF2B5EF4-FFF2-40B4-BE49-F238E27FC236}">
+                <a16:creationId xmlns:a16="http://schemas.microsoft.com/office/drawing/2014/main" id="{B750B460-8B8E-4461-B73A-596254B9BA24}"/>
+              </a:ext>
+            </a:extLst>
+          </p:cNvPr>
+          <p:cNvSpPr txBox="1"/>
+          <p:nvPr/>
+        </p:nvSpPr>
+        <p:spPr>
+          <a:xfrm>
+            <a:off x="7236704" y="796370"/>
+            <a:ext cx="914400" cy="400110"/>
+          </a:xfrm>
+          <a:prstGeom prst="rect">
+            <a:avLst/>
+          </a:prstGeom>
+          <a:noFill/>
+        </p:spPr>
+        <p:txBody>
+          <a:bodyPr wrap="square" rtlCol="0">
+            <a:spAutoFit/>
+          </a:bodyPr>
+          <a:lstStyle/>
+          <a:p>
+            <a:r>
+              <a:rPr lang="en-US" sz="2000" dirty="0">
+                <a:latin typeface="Times New Roman" panose="02020603050405020304" pitchFamily="18" charset="0"/>
+                <a:cs typeface="Times New Roman" panose="02020603050405020304" pitchFamily="18" charset="0"/>
+              </a:rPr>
+              <a:t>v</a:t>
+            </a:r>
+            <a:r>
+              <a:rPr lang="en-US" sz="1200" dirty="0">
+                <a:latin typeface="Times New Roman" panose="02020603050405020304" pitchFamily="18" charset="0"/>
+                <a:cs typeface="Times New Roman" panose="02020603050405020304" pitchFamily="18" charset="0"/>
+              </a:rPr>
+              <a:t>3</a:t>
+            </a:r>
+            <a:endParaRPr lang="en-US" dirty="0">
+              <a:latin typeface="Times New Roman" panose="02020603050405020304" pitchFamily="18" charset="0"/>
+              <a:cs typeface="Times New Roman" panose="02020603050405020304" pitchFamily="18" charset="0"/>
+            </a:endParaRPr>
+          </a:p>
+        </p:txBody>
+      </p:sp>
+      <p:sp>
+        <p:nvSpPr>
+          <p:cNvPr id="69" name="TextBox 68">
+            <a:extLst>
+              <a:ext uri="{FF2B5EF4-FFF2-40B4-BE49-F238E27FC236}">
+                <a16:creationId xmlns:a16="http://schemas.microsoft.com/office/drawing/2014/main" id="{DB7BF031-3AE6-454D-AE4D-0D2AC281DA4C}"/>
+              </a:ext>
+            </a:extLst>
+          </p:cNvPr>
+          <p:cNvSpPr txBox="1"/>
+          <p:nvPr/>
+        </p:nvSpPr>
+        <p:spPr>
+          <a:xfrm>
+            <a:off x="9715469" y="17374"/>
+            <a:ext cx="914400" cy="400110"/>
+          </a:xfrm>
+          <a:prstGeom prst="rect">
+            <a:avLst/>
+          </a:prstGeom>
+          <a:noFill/>
+        </p:spPr>
+        <p:txBody>
+          <a:bodyPr wrap="square" rtlCol="0">
+            <a:spAutoFit/>
+          </a:bodyPr>
+          <a:lstStyle/>
+          <a:p>
+            <a:r>
+              <a:rPr lang="en-US" sz="2000" dirty="0">
+                <a:latin typeface="Times New Roman" panose="02020603050405020304" pitchFamily="18" charset="0"/>
+                <a:cs typeface="Times New Roman" panose="02020603050405020304" pitchFamily="18" charset="0"/>
+              </a:rPr>
+              <a:t>v</a:t>
+            </a:r>
+            <a:r>
+              <a:rPr lang="en-US" sz="1200" dirty="0">
+                <a:latin typeface="Times New Roman" panose="02020603050405020304" pitchFamily="18" charset="0"/>
+                <a:cs typeface="Times New Roman" panose="02020603050405020304" pitchFamily="18" charset="0"/>
+              </a:rPr>
+              <a:t>3</a:t>
+            </a:r>
+            <a:endParaRPr lang="en-US" dirty="0">
+              <a:latin typeface="Times New Roman" panose="02020603050405020304" pitchFamily="18" charset="0"/>
+              <a:cs typeface="Times New Roman" panose="02020603050405020304" pitchFamily="18" charset="0"/>
+            </a:endParaRPr>
+          </a:p>
+        </p:txBody>
+      </p:sp>
+      <p:sp>
+        <p:nvSpPr>
+          <p:cNvPr id="71" name="TextBox 70">
+            <a:extLst>
+              <a:ext uri="{FF2B5EF4-FFF2-40B4-BE49-F238E27FC236}">
+                <a16:creationId xmlns:a16="http://schemas.microsoft.com/office/drawing/2014/main" id="{63593190-D99C-44D8-A8BD-81C3D62859E1}"/>
+              </a:ext>
+            </a:extLst>
+          </p:cNvPr>
+          <p:cNvSpPr txBox="1"/>
+          <p:nvPr/>
+        </p:nvSpPr>
+        <p:spPr>
+          <a:xfrm>
+            <a:off x="8562860" y="4666987"/>
+            <a:ext cx="914400" cy="400110"/>
+          </a:xfrm>
+          <a:prstGeom prst="rect">
+            <a:avLst/>
+          </a:prstGeom>
+          <a:noFill/>
+        </p:spPr>
+        <p:txBody>
+          <a:bodyPr wrap="square" rtlCol="0">
+            <a:spAutoFit/>
+          </a:bodyPr>
+          <a:lstStyle/>
+          <a:p>
+            <a:r>
+              <a:rPr lang="en-US" sz="2000" dirty="0">
+                <a:latin typeface="Times New Roman" panose="02020603050405020304" pitchFamily="18" charset="0"/>
+                <a:cs typeface="Times New Roman" panose="02020603050405020304" pitchFamily="18" charset="0"/>
+              </a:rPr>
+              <a:t>v</a:t>
+            </a:r>
+            <a:r>
+              <a:rPr lang="en-US" sz="1200" dirty="0">
+                <a:latin typeface="Times New Roman" panose="02020603050405020304" pitchFamily="18" charset="0"/>
+                <a:cs typeface="Times New Roman" panose="02020603050405020304" pitchFamily="18" charset="0"/>
+              </a:rPr>
+              <a:t>3</a:t>
+            </a:r>
+            <a:endParaRPr lang="en-US" dirty="0">
+              <a:latin typeface="Times New Roman" panose="02020603050405020304" pitchFamily="18" charset="0"/>
+              <a:cs typeface="Times New Roman" panose="02020603050405020304" pitchFamily="18" charset="0"/>
+            </a:endParaRPr>
+          </a:p>
+        </p:txBody>
+      </p:sp>
+      <p:sp>
+        <p:nvSpPr>
+          <p:cNvPr id="3" name="TextBox 2">
+            <a:extLst>
+              <a:ext uri="{FF2B5EF4-FFF2-40B4-BE49-F238E27FC236}">
+                <a16:creationId xmlns:a16="http://schemas.microsoft.com/office/drawing/2014/main" id="{6321807C-0050-4760-AE07-5599ED01D23E}"/>
+              </a:ext>
+            </a:extLst>
+          </p:cNvPr>
+          <p:cNvSpPr txBox="1"/>
+          <p:nvPr/>
+        </p:nvSpPr>
+        <p:spPr>
+          <a:xfrm>
+            <a:off x="1389425" y="1461281"/>
+            <a:ext cx="1018547" cy="338554"/>
+          </a:xfrm>
+          <a:prstGeom prst="rect">
+            <a:avLst/>
+          </a:prstGeom>
+          <a:noFill/>
+        </p:spPr>
+        <p:txBody>
+          <a:bodyPr wrap="square" rtlCol="0">
+            <a:spAutoFit/>
+          </a:bodyPr>
+          <a:lstStyle/>
+          <a:p>
+            <a:pPr algn="ctr"/>
+            <a:r>
+              <a:rPr lang="en-US" sz="1600" dirty="0">
+                <a:latin typeface="Times New Roman" panose="02020603050405020304" pitchFamily="18" charset="0"/>
+                <a:cs typeface="Times New Roman" panose="02020603050405020304" pitchFamily="18" charset="0"/>
+              </a:rPr>
+              <a:t>CB</a:t>
+            </a:r>
+          </a:p>
+        </p:txBody>
+      </p:sp>
+      <p:sp>
+        <p:nvSpPr>
+          <p:cNvPr id="72" name="TextBox 71">
+            <a:extLst>
+              <a:ext uri="{FF2B5EF4-FFF2-40B4-BE49-F238E27FC236}">
+                <a16:creationId xmlns:a16="http://schemas.microsoft.com/office/drawing/2014/main" id="{8E02906A-3DBD-490F-9867-6EF6E8929B2D}"/>
+              </a:ext>
+            </a:extLst>
+          </p:cNvPr>
+          <p:cNvSpPr txBox="1"/>
+          <p:nvPr/>
+        </p:nvSpPr>
+        <p:spPr>
+          <a:xfrm>
+            <a:off x="5373769" y="1997587"/>
+            <a:ext cx="1018547" cy="338554"/>
+          </a:xfrm>
+          <a:prstGeom prst="rect">
+            <a:avLst/>
+          </a:prstGeom>
+          <a:noFill/>
+        </p:spPr>
+        <p:txBody>
+          <a:bodyPr wrap="square" rtlCol="0">
+            <a:spAutoFit/>
+          </a:bodyPr>
+          <a:lstStyle/>
+          <a:p>
+            <a:pPr algn="ctr"/>
+            <a:r>
+              <a:rPr lang="en-US" sz="1600" dirty="0">
+                <a:latin typeface="Times New Roman" panose="02020603050405020304" pitchFamily="18" charset="0"/>
+                <a:cs typeface="Times New Roman" panose="02020603050405020304" pitchFamily="18" charset="0"/>
+              </a:rPr>
+              <a:t>CB</a:t>
+            </a:r>
+          </a:p>
+        </p:txBody>
+      </p:sp>
+      <p:sp>
+        <p:nvSpPr>
+          <p:cNvPr id="76" name="TextBox 75">
+            <a:extLst>
+              <a:ext uri="{FF2B5EF4-FFF2-40B4-BE49-F238E27FC236}">
+                <a16:creationId xmlns:a16="http://schemas.microsoft.com/office/drawing/2014/main" id="{6A0914C8-4790-4BE0-A24D-06BFC865F670}"/>
+              </a:ext>
+            </a:extLst>
+          </p:cNvPr>
+          <p:cNvSpPr txBox="1"/>
+          <p:nvPr/>
+        </p:nvSpPr>
+        <p:spPr>
+          <a:xfrm>
+            <a:off x="8933875" y="2571663"/>
+            <a:ext cx="1018547" cy="338554"/>
+          </a:xfrm>
+          <a:prstGeom prst="rect">
+            <a:avLst/>
+          </a:prstGeom>
+          <a:noFill/>
+        </p:spPr>
+        <p:txBody>
+          <a:bodyPr wrap="square" rtlCol="0">
+            <a:spAutoFit/>
+          </a:bodyPr>
+          <a:lstStyle/>
+          <a:p>
+            <a:pPr algn="ctr"/>
+            <a:r>
+              <a:rPr lang="en-US" sz="1600" dirty="0">
+                <a:latin typeface="Times New Roman" panose="02020603050405020304" pitchFamily="18" charset="0"/>
+                <a:cs typeface="Times New Roman" panose="02020603050405020304" pitchFamily="18" charset="0"/>
+              </a:rPr>
+              <a:t>CB</a:t>
+            </a:r>
           </a:p>
         </p:txBody>
       </p:sp>
@@ -5146,7 +6065,7 @@
 </p:sld>
 </file>
 
-<file path=ppt/slides/slide3.xml><?xml version="1.0" encoding="utf-8"?>
+<file path=ppt/slides/slide2.xml><?xml version="1.0" encoding="utf-8"?>
 <p:sld xmlns:a="http://schemas.openxmlformats.org/drawingml/2006/main" xmlns:r="http://schemas.openxmlformats.org/officeDocument/2006/relationships" xmlns:p="http://schemas.openxmlformats.org/presentationml/2006/main">
   <p:cSld>
     <p:spTree>
@@ -6614,10 +7533,2746 @@
           </a:fontRef>
         </p:style>
       </p:cxnSp>
+      <p:sp>
+        <p:nvSpPr>
+          <p:cNvPr id="27" name="TextBox 26">
+            <a:extLst>
+              <a:ext uri="{FF2B5EF4-FFF2-40B4-BE49-F238E27FC236}">
+                <a16:creationId xmlns:a16="http://schemas.microsoft.com/office/drawing/2014/main" id="{10A5863A-E9DD-4A62-B8DE-FDA088A5B7A3}"/>
+              </a:ext>
+            </a:extLst>
+          </p:cNvPr>
+          <p:cNvSpPr txBox="1"/>
+          <p:nvPr/>
+        </p:nvSpPr>
+        <p:spPr>
+          <a:xfrm>
+            <a:off x="2688063" y="3282160"/>
+            <a:ext cx="914400" cy="400110"/>
+          </a:xfrm>
+          <a:prstGeom prst="rect">
+            <a:avLst/>
+          </a:prstGeom>
+          <a:noFill/>
+        </p:spPr>
+        <p:txBody>
+          <a:bodyPr wrap="square" rtlCol="0">
+            <a:spAutoFit/>
+          </a:bodyPr>
+          <a:lstStyle/>
+          <a:p>
+            <a:r>
+              <a:rPr lang="en-US" sz="2000" dirty="0">
+                <a:latin typeface="Times New Roman" panose="02020603050405020304" pitchFamily="18" charset="0"/>
+                <a:cs typeface="Times New Roman" panose="02020603050405020304" pitchFamily="18" charset="0"/>
+              </a:rPr>
+              <a:t>v</a:t>
+            </a:r>
+            <a:r>
+              <a:rPr lang="en-US" sz="1200" dirty="0">
+                <a:latin typeface="Times New Roman" panose="02020603050405020304" pitchFamily="18" charset="0"/>
+                <a:cs typeface="Times New Roman" panose="02020603050405020304" pitchFamily="18" charset="0"/>
+              </a:rPr>
+              <a:t>3</a:t>
+            </a:r>
+            <a:endParaRPr lang="en-US" dirty="0">
+              <a:latin typeface="Times New Roman" panose="02020603050405020304" pitchFamily="18" charset="0"/>
+              <a:cs typeface="Times New Roman" panose="02020603050405020304" pitchFamily="18" charset="0"/>
+            </a:endParaRPr>
+          </a:p>
+        </p:txBody>
+      </p:sp>
+      <p:sp>
+        <p:nvSpPr>
+          <p:cNvPr id="29" name="TextBox 28">
+            <a:extLst>
+              <a:ext uri="{FF2B5EF4-FFF2-40B4-BE49-F238E27FC236}">
+                <a16:creationId xmlns:a16="http://schemas.microsoft.com/office/drawing/2014/main" id="{C2AA8D9F-43BB-4C76-BA04-5F19F2C87E3D}"/>
+              </a:ext>
+            </a:extLst>
+          </p:cNvPr>
+          <p:cNvSpPr txBox="1"/>
+          <p:nvPr/>
+        </p:nvSpPr>
+        <p:spPr>
+          <a:xfrm>
+            <a:off x="4586378" y="2309170"/>
+            <a:ext cx="914400" cy="400110"/>
+          </a:xfrm>
+          <a:prstGeom prst="rect">
+            <a:avLst/>
+          </a:prstGeom>
+          <a:noFill/>
+        </p:spPr>
+        <p:txBody>
+          <a:bodyPr wrap="square" rtlCol="0">
+            <a:spAutoFit/>
+          </a:bodyPr>
+          <a:lstStyle/>
+          <a:p>
+            <a:r>
+              <a:rPr lang="en-US" sz="2000" dirty="0">
+                <a:latin typeface="Times New Roman" panose="02020603050405020304" pitchFamily="18" charset="0"/>
+                <a:cs typeface="Times New Roman" panose="02020603050405020304" pitchFamily="18" charset="0"/>
+              </a:rPr>
+              <a:t>v</a:t>
+            </a:r>
+            <a:r>
+              <a:rPr lang="en-US" sz="1200" dirty="0">
+                <a:latin typeface="Times New Roman" panose="02020603050405020304" pitchFamily="18" charset="0"/>
+                <a:cs typeface="Times New Roman" panose="02020603050405020304" pitchFamily="18" charset="0"/>
+              </a:rPr>
+              <a:t>3</a:t>
+            </a:r>
+            <a:endParaRPr lang="en-US" dirty="0">
+              <a:latin typeface="Times New Roman" panose="02020603050405020304" pitchFamily="18" charset="0"/>
+              <a:cs typeface="Times New Roman" panose="02020603050405020304" pitchFamily="18" charset="0"/>
+            </a:endParaRPr>
+          </a:p>
+        </p:txBody>
+      </p:sp>
+      <p:sp>
+        <p:nvSpPr>
+          <p:cNvPr id="30" name="TextBox 29">
+            <a:extLst>
+              <a:ext uri="{FF2B5EF4-FFF2-40B4-BE49-F238E27FC236}">
+                <a16:creationId xmlns:a16="http://schemas.microsoft.com/office/drawing/2014/main" id="{EB5A97DF-72B6-45B8-845F-5BED4BD4A997}"/>
+              </a:ext>
+            </a:extLst>
+          </p:cNvPr>
+          <p:cNvSpPr txBox="1"/>
+          <p:nvPr/>
+        </p:nvSpPr>
+        <p:spPr>
+          <a:xfrm>
+            <a:off x="6252930" y="2512587"/>
+            <a:ext cx="914400" cy="400110"/>
+          </a:xfrm>
+          <a:prstGeom prst="rect">
+            <a:avLst/>
+          </a:prstGeom>
+          <a:noFill/>
+        </p:spPr>
+        <p:txBody>
+          <a:bodyPr wrap="square" rtlCol="0">
+            <a:spAutoFit/>
+          </a:bodyPr>
+          <a:lstStyle/>
+          <a:p>
+            <a:r>
+              <a:rPr lang="en-US" sz="2000" dirty="0">
+                <a:latin typeface="Times New Roman" panose="02020603050405020304" pitchFamily="18" charset="0"/>
+                <a:cs typeface="Times New Roman" panose="02020603050405020304" pitchFamily="18" charset="0"/>
+              </a:rPr>
+              <a:t>v</a:t>
+            </a:r>
+            <a:r>
+              <a:rPr lang="en-US" sz="1200" dirty="0">
+                <a:latin typeface="Times New Roman" panose="02020603050405020304" pitchFamily="18" charset="0"/>
+                <a:cs typeface="Times New Roman" panose="02020603050405020304" pitchFamily="18" charset="0"/>
+              </a:rPr>
+              <a:t>3</a:t>
+            </a:r>
+            <a:endParaRPr lang="en-US" dirty="0">
+              <a:latin typeface="Times New Roman" panose="02020603050405020304" pitchFamily="18" charset="0"/>
+              <a:cs typeface="Times New Roman" panose="02020603050405020304" pitchFamily="18" charset="0"/>
+            </a:endParaRPr>
+          </a:p>
+        </p:txBody>
+      </p:sp>
+      <p:sp>
+        <p:nvSpPr>
+          <p:cNvPr id="31" name="TextBox 30">
+            <a:extLst>
+              <a:ext uri="{FF2B5EF4-FFF2-40B4-BE49-F238E27FC236}">
+                <a16:creationId xmlns:a16="http://schemas.microsoft.com/office/drawing/2014/main" id="{56BBB5DD-3765-483E-A722-7D9D808D6073}"/>
+              </a:ext>
+            </a:extLst>
+          </p:cNvPr>
+          <p:cNvSpPr txBox="1"/>
+          <p:nvPr/>
+        </p:nvSpPr>
+        <p:spPr>
+          <a:xfrm>
+            <a:off x="9372110" y="3834575"/>
+            <a:ext cx="914400" cy="400110"/>
+          </a:xfrm>
+          <a:prstGeom prst="rect">
+            <a:avLst/>
+          </a:prstGeom>
+          <a:noFill/>
+        </p:spPr>
+        <p:txBody>
+          <a:bodyPr wrap="square" rtlCol="0">
+            <a:spAutoFit/>
+          </a:bodyPr>
+          <a:lstStyle/>
+          <a:p>
+            <a:r>
+              <a:rPr lang="en-US" sz="2000" dirty="0">
+                <a:latin typeface="Times New Roman" panose="02020603050405020304" pitchFamily="18" charset="0"/>
+                <a:cs typeface="Times New Roman" panose="02020603050405020304" pitchFamily="18" charset="0"/>
+              </a:rPr>
+              <a:t>v</a:t>
+            </a:r>
+            <a:r>
+              <a:rPr lang="en-US" sz="1200" dirty="0">
+                <a:latin typeface="Times New Roman" panose="02020603050405020304" pitchFamily="18" charset="0"/>
+                <a:cs typeface="Times New Roman" panose="02020603050405020304" pitchFamily="18" charset="0"/>
+              </a:rPr>
+              <a:t>3</a:t>
+            </a:r>
+            <a:endParaRPr lang="en-US" dirty="0">
+              <a:latin typeface="Times New Roman" panose="02020603050405020304" pitchFamily="18" charset="0"/>
+              <a:cs typeface="Times New Roman" panose="02020603050405020304" pitchFamily="18" charset="0"/>
+            </a:endParaRPr>
+          </a:p>
+        </p:txBody>
+      </p:sp>
+      <p:sp>
+        <p:nvSpPr>
+          <p:cNvPr id="33" name="TextBox 32">
+            <a:extLst>
+              <a:ext uri="{FF2B5EF4-FFF2-40B4-BE49-F238E27FC236}">
+                <a16:creationId xmlns:a16="http://schemas.microsoft.com/office/drawing/2014/main" id="{27C6889C-4EB9-486A-9E58-85D425D91392}"/>
+              </a:ext>
+            </a:extLst>
+          </p:cNvPr>
+          <p:cNvSpPr txBox="1"/>
+          <p:nvPr/>
+        </p:nvSpPr>
+        <p:spPr>
+          <a:xfrm>
+            <a:off x="5273091" y="3049798"/>
+            <a:ext cx="914400" cy="400110"/>
+          </a:xfrm>
+          <a:prstGeom prst="rect">
+            <a:avLst/>
+          </a:prstGeom>
+          <a:noFill/>
+        </p:spPr>
+        <p:txBody>
+          <a:bodyPr wrap="square" rtlCol="0">
+            <a:spAutoFit/>
+          </a:bodyPr>
+          <a:lstStyle/>
+          <a:p>
+            <a:r>
+              <a:rPr lang="en-US" sz="2000" dirty="0">
+                <a:latin typeface="Times New Roman" panose="02020603050405020304" pitchFamily="18" charset="0"/>
+                <a:cs typeface="Times New Roman" panose="02020603050405020304" pitchFamily="18" charset="0"/>
+              </a:rPr>
+              <a:t>v</a:t>
+            </a:r>
+            <a:r>
+              <a:rPr lang="en-US" sz="1200" dirty="0">
+                <a:latin typeface="Times New Roman" panose="02020603050405020304" pitchFamily="18" charset="0"/>
+                <a:cs typeface="Times New Roman" panose="02020603050405020304" pitchFamily="18" charset="0"/>
+              </a:rPr>
+              <a:t>2</a:t>
+            </a:r>
+            <a:endParaRPr lang="en-US" dirty="0">
+              <a:latin typeface="Times New Roman" panose="02020603050405020304" pitchFamily="18" charset="0"/>
+              <a:cs typeface="Times New Roman" panose="02020603050405020304" pitchFamily="18" charset="0"/>
+            </a:endParaRPr>
+          </a:p>
+        </p:txBody>
+      </p:sp>
+      <p:sp>
+        <p:nvSpPr>
+          <p:cNvPr id="34" name="TextBox 33">
+            <a:extLst>
+              <a:ext uri="{FF2B5EF4-FFF2-40B4-BE49-F238E27FC236}">
+                <a16:creationId xmlns:a16="http://schemas.microsoft.com/office/drawing/2014/main" id="{0FA8DFCF-A7F2-49E0-8118-808541C6DE66}"/>
+              </a:ext>
+            </a:extLst>
+          </p:cNvPr>
+          <p:cNvSpPr txBox="1"/>
+          <p:nvPr/>
+        </p:nvSpPr>
+        <p:spPr>
+          <a:xfrm>
+            <a:off x="2556249" y="4421059"/>
+            <a:ext cx="914400" cy="400110"/>
+          </a:xfrm>
+          <a:prstGeom prst="rect">
+            <a:avLst/>
+          </a:prstGeom>
+          <a:noFill/>
+        </p:spPr>
+        <p:txBody>
+          <a:bodyPr wrap="square" rtlCol="0">
+            <a:spAutoFit/>
+          </a:bodyPr>
+          <a:lstStyle/>
+          <a:p>
+            <a:r>
+              <a:rPr lang="en-US" sz="2000" dirty="0">
+                <a:latin typeface="Times New Roman" panose="02020603050405020304" pitchFamily="18" charset="0"/>
+                <a:cs typeface="Times New Roman" panose="02020603050405020304" pitchFamily="18" charset="0"/>
+              </a:rPr>
+              <a:t>v</a:t>
+            </a:r>
+            <a:r>
+              <a:rPr lang="en-US" sz="1200" dirty="0">
+                <a:latin typeface="Times New Roman" panose="02020603050405020304" pitchFamily="18" charset="0"/>
+                <a:cs typeface="Times New Roman" panose="02020603050405020304" pitchFamily="18" charset="0"/>
+              </a:rPr>
+              <a:t>2</a:t>
+            </a:r>
+            <a:endParaRPr lang="en-US" dirty="0">
+              <a:latin typeface="Times New Roman" panose="02020603050405020304" pitchFamily="18" charset="0"/>
+              <a:cs typeface="Times New Roman" panose="02020603050405020304" pitchFamily="18" charset="0"/>
+            </a:endParaRPr>
+          </a:p>
+        </p:txBody>
+      </p:sp>
+      <p:sp>
+        <p:nvSpPr>
+          <p:cNvPr id="35" name="TextBox 34">
+            <a:extLst>
+              <a:ext uri="{FF2B5EF4-FFF2-40B4-BE49-F238E27FC236}">
+                <a16:creationId xmlns:a16="http://schemas.microsoft.com/office/drawing/2014/main" id="{0475359F-E758-4330-AE37-1B112A0FF3BB}"/>
+              </a:ext>
+            </a:extLst>
+          </p:cNvPr>
+          <p:cNvSpPr txBox="1"/>
+          <p:nvPr/>
+        </p:nvSpPr>
+        <p:spPr>
+          <a:xfrm>
+            <a:off x="6553653" y="1839525"/>
+            <a:ext cx="914400" cy="400110"/>
+          </a:xfrm>
+          <a:prstGeom prst="rect">
+            <a:avLst/>
+          </a:prstGeom>
+          <a:noFill/>
+        </p:spPr>
+        <p:txBody>
+          <a:bodyPr wrap="square" rtlCol="0">
+            <a:spAutoFit/>
+          </a:bodyPr>
+          <a:lstStyle/>
+          <a:p>
+            <a:r>
+              <a:rPr lang="en-US" sz="2000" dirty="0">
+                <a:latin typeface="Times New Roman" panose="02020603050405020304" pitchFamily="18" charset="0"/>
+                <a:cs typeface="Times New Roman" panose="02020603050405020304" pitchFamily="18" charset="0"/>
+              </a:rPr>
+              <a:t>v</a:t>
+            </a:r>
+            <a:r>
+              <a:rPr lang="en-US" sz="1200" dirty="0">
+                <a:latin typeface="Times New Roman" panose="02020603050405020304" pitchFamily="18" charset="0"/>
+                <a:cs typeface="Times New Roman" panose="02020603050405020304" pitchFamily="18" charset="0"/>
+              </a:rPr>
+              <a:t>2</a:t>
+            </a:r>
+            <a:endParaRPr lang="en-US" dirty="0">
+              <a:latin typeface="Times New Roman" panose="02020603050405020304" pitchFamily="18" charset="0"/>
+              <a:cs typeface="Times New Roman" panose="02020603050405020304" pitchFamily="18" charset="0"/>
+            </a:endParaRPr>
+          </a:p>
+        </p:txBody>
+      </p:sp>
+      <p:sp>
+        <p:nvSpPr>
+          <p:cNvPr id="36" name="TextBox 35">
+            <a:extLst>
+              <a:ext uri="{FF2B5EF4-FFF2-40B4-BE49-F238E27FC236}">
+                <a16:creationId xmlns:a16="http://schemas.microsoft.com/office/drawing/2014/main" id="{147F8E76-A4F1-4311-8B1F-CB48EBB40CB5}"/>
+              </a:ext>
+            </a:extLst>
+          </p:cNvPr>
+          <p:cNvSpPr txBox="1"/>
+          <p:nvPr/>
+        </p:nvSpPr>
+        <p:spPr>
+          <a:xfrm>
+            <a:off x="9176955" y="3207544"/>
+            <a:ext cx="914400" cy="400110"/>
+          </a:xfrm>
+          <a:prstGeom prst="rect">
+            <a:avLst/>
+          </a:prstGeom>
+          <a:noFill/>
+        </p:spPr>
+        <p:txBody>
+          <a:bodyPr wrap="square" rtlCol="0">
+            <a:spAutoFit/>
+          </a:bodyPr>
+          <a:lstStyle/>
+          <a:p>
+            <a:r>
+              <a:rPr lang="en-US" sz="2000" dirty="0">
+                <a:latin typeface="Times New Roman" panose="02020603050405020304" pitchFamily="18" charset="0"/>
+                <a:cs typeface="Times New Roman" panose="02020603050405020304" pitchFamily="18" charset="0"/>
+              </a:rPr>
+              <a:t>v</a:t>
+            </a:r>
+            <a:r>
+              <a:rPr lang="en-US" sz="1200" dirty="0">
+                <a:latin typeface="Times New Roman" panose="02020603050405020304" pitchFamily="18" charset="0"/>
+                <a:cs typeface="Times New Roman" panose="02020603050405020304" pitchFamily="18" charset="0"/>
+              </a:rPr>
+              <a:t>2</a:t>
+            </a:r>
+            <a:endParaRPr lang="en-US" dirty="0">
+              <a:latin typeface="Times New Roman" panose="02020603050405020304" pitchFamily="18" charset="0"/>
+              <a:cs typeface="Times New Roman" panose="02020603050405020304" pitchFamily="18" charset="0"/>
+            </a:endParaRPr>
+          </a:p>
+        </p:txBody>
+      </p:sp>
+      <p:sp>
+        <p:nvSpPr>
+          <p:cNvPr id="37" name="TextBox 36">
+            <a:extLst>
+              <a:ext uri="{FF2B5EF4-FFF2-40B4-BE49-F238E27FC236}">
+                <a16:creationId xmlns:a16="http://schemas.microsoft.com/office/drawing/2014/main" id="{805B22D1-3FCA-4549-B59D-40CC6381A295}"/>
+              </a:ext>
+            </a:extLst>
+          </p:cNvPr>
+          <p:cNvSpPr txBox="1"/>
+          <p:nvPr/>
+        </p:nvSpPr>
+        <p:spPr>
+          <a:xfrm>
+            <a:off x="4945770" y="3966773"/>
+            <a:ext cx="914400" cy="400110"/>
+          </a:xfrm>
+          <a:prstGeom prst="rect">
+            <a:avLst/>
+          </a:prstGeom>
+          <a:noFill/>
+        </p:spPr>
+        <p:txBody>
+          <a:bodyPr wrap="square" rtlCol="0">
+            <a:spAutoFit/>
+          </a:bodyPr>
+          <a:lstStyle/>
+          <a:p>
+            <a:r>
+              <a:rPr lang="en-US" sz="2000" dirty="0">
+                <a:latin typeface="Times New Roman" panose="02020603050405020304" pitchFamily="18" charset="0"/>
+                <a:cs typeface="Times New Roman" panose="02020603050405020304" pitchFamily="18" charset="0"/>
+              </a:rPr>
+              <a:t>v</a:t>
+            </a:r>
+            <a:r>
+              <a:rPr lang="en-US" sz="1200" dirty="0">
+                <a:latin typeface="Times New Roman" panose="02020603050405020304" pitchFamily="18" charset="0"/>
+                <a:cs typeface="Times New Roman" panose="02020603050405020304" pitchFamily="18" charset="0"/>
+              </a:rPr>
+              <a:t>1</a:t>
+            </a:r>
+            <a:endParaRPr lang="en-US" dirty="0">
+              <a:latin typeface="Times New Roman" panose="02020603050405020304" pitchFamily="18" charset="0"/>
+              <a:cs typeface="Times New Roman" panose="02020603050405020304" pitchFamily="18" charset="0"/>
+            </a:endParaRPr>
+          </a:p>
+        </p:txBody>
+      </p:sp>
+      <p:sp>
+        <p:nvSpPr>
+          <p:cNvPr id="39" name="TextBox 38">
+            <a:extLst>
+              <a:ext uri="{FF2B5EF4-FFF2-40B4-BE49-F238E27FC236}">
+                <a16:creationId xmlns:a16="http://schemas.microsoft.com/office/drawing/2014/main" id="{6494E1E6-6B80-484D-9CD5-92D98FDECB48}"/>
+              </a:ext>
+            </a:extLst>
+          </p:cNvPr>
+          <p:cNvSpPr txBox="1"/>
+          <p:nvPr/>
+        </p:nvSpPr>
+        <p:spPr>
+          <a:xfrm>
+            <a:off x="1351035" y="4923059"/>
+            <a:ext cx="914400" cy="400110"/>
+          </a:xfrm>
+          <a:prstGeom prst="rect">
+            <a:avLst/>
+          </a:prstGeom>
+          <a:noFill/>
+        </p:spPr>
+        <p:txBody>
+          <a:bodyPr wrap="square" rtlCol="0">
+            <a:spAutoFit/>
+          </a:bodyPr>
+          <a:lstStyle/>
+          <a:p>
+            <a:r>
+              <a:rPr lang="en-US" sz="2000" dirty="0">
+                <a:latin typeface="Times New Roman" panose="02020603050405020304" pitchFamily="18" charset="0"/>
+                <a:cs typeface="Times New Roman" panose="02020603050405020304" pitchFamily="18" charset="0"/>
+              </a:rPr>
+              <a:t>v</a:t>
+            </a:r>
+            <a:r>
+              <a:rPr lang="en-US" sz="1200" dirty="0">
+                <a:latin typeface="Times New Roman" panose="02020603050405020304" pitchFamily="18" charset="0"/>
+                <a:cs typeface="Times New Roman" panose="02020603050405020304" pitchFamily="18" charset="0"/>
+              </a:rPr>
+              <a:t>1</a:t>
+            </a:r>
+            <a:endParaRPr lang="en-US" dirty="0">
+              <a:latin typeface="Times New Roman" panose="02020603050405020304" pitchFamily="18" charset="0"/>
+              <a:cs typeface="Times New Roman" panose="02020603050405020304" pitchFamily="18" charset="0"/>
+            </a:endParaRPr>
+          </a:p>
+        </p:txBody>
+      </p:sp>
+      <p:sp>
+        <p:nvSpPr>
+          <p:cNvPr id="40" name="TextBox 39">
+            <a:extLst>
+              <a:ext uri="{FF2B5EF4-FFF2-40B4-BE49-F238E27FC236}">
+                <a16:creationId xmlns:a16="http://schemas.microsoft.com/office/drawing/2014/main" id="{7C22E959-C920-4217-A7D0-523CB7BC232D}"/>
+              </a:ext>
+            </a:extLst>
+          </p:cNvPr>
+          <p:cNvSpPr txBox="1"/>
+          <p:nvPr/>
+        </p:nvSpPr>
+        <p:spPr>
+          <a:xfrm>
+            <a:off x="7252225" y="1427531"/>
+            <a:ext cx="914400" cy="400110"/>
+          </a:xfrm>
+          <a:prstGeom prst="rect">
+            <a:avLst/>
+          </a:prstGeom>
+          <a:noFill/>
+        </p:spPr>
+        <p:txBody>
+          <a:bodyPr wrap="square" rtlCol="0">
+            <a:spAutoFit/>
+          </a:bodyPr>
+          <a:lstStyle/>
+          <a:p>
+            <a:r>
+              <a:rPr lang="en-US" sz="2000" dirty="0">
+                <a:latin typeface="Times New Roman" panose="02020603050405020304" pitchFamily="18" charset="0"/>
+                <a:cs typeface="Times New Roman" panose="02020603050405020304" pitchFamily="18" charset="0"/>
+              </a:rPr>
+              <a:t>v</a:t>
+            </a:r>
+            <a:r>
+              <a:rPr lang="en-US" sz="1200" dirty="0">
+                <a:latin typeface="Times New Roman" panose="02020603050405020304" pitchFamily="18" charset="0"/>
+                <a:cs typeface="Times New Roman" panose="02020603050405020304" pitchFamily="18" charset="0"/>
+              </a:rPr>
+              <a:t>1</a:t>
+            </a:r>
+            <a:endParaRPr lang="en-US" dirty="0">
+              <a:latin typeface="Times New Roman" panose="02020603050405020304" pitchFamily="18" charset="0"/>
+              <a:cs typeface="Times New Roman" panose="02020603050405020304" pitchFamily="18" charset="0"/>
+            </a:endParaRPr>
+          </a:p>
+        </p:txBody>
+      </p:sp>
+      <p:sp>
+        <p:nvSpPr>
+          <p:cNvPr id="41" name="TextBox 40">
+            <a:extLst>
+              <a:ext uri="{FF2B5EF4-FFF2-40B4-BE49-F238E27FC236}">
+                <a16:creationId xmlns:a16="http://schemas.microsoft.com/office/drawing/2014/main" id="{98564E9F-524E-4014-9219-8B53CC3A71BE}"/>
+              </a:ext>
+            </a:extLst>
+          </p:cNvPr>
+          <p:cNvSpPr txBox="1"/>
+          <p:nvPr/>
+        </p:nvSpPr>
+        <p:spPr>
+          <a:xfrm>
+            <a:off x="9261069" y="2667455"/>
+            <a:ext cx="914400" cy="400110"/>
+          </a:xfrm>
+          <a:prstGeom prst="rect">
+            <a:avLst/>
+          </a:prstGeom>
+          <a:noFill/>
+        </p:spPr>
+        <p:txBody>
+          <a:bodyPr wrap="square" rtlCol="0">
+            <a:spAutoFit/>
+          </a:bodyPr>
+          <a:lstStyle/>
+          <a:p>
+            <a:r>
+              <a:rPr lang="en-US" sz="2000" dirty="0">
+                <a:latin typeface="Times New Roman" panose="02020603050405020304" pitchFamily="18" charset="0"/>
+                <a:cs typeface="Times New Roman" panose="02020603050405020304" pitchFamily="18" charset="0"/>
+              </a:rPr>
+              <a:t>v</a:t>
+            </a:r>
+            <a:r>
+              <a:rPr lang="en-US" sz="1200" dirty="0">
+                <a:latin typeface="Times New Roman" panose="02020603050405020304" pitchFamily="18" charset="0"/>
+                <a:cs typeface="Times New Roman" panose="02020603050405020304" pitchFamily="18" charset="0"/>
+              </a:rPr>
+              <a:t>1</a:t>
+            </a:r>
+            <a:endParaRPr lang="en-US" dirty="0">
+              <a:latin typeface="Times New Roman" panose="02020603050405020304" pitchFamily="18" charset="0"/>
+              <a:cs typeface="Times New Roman" panose="02020603050405020304" pitchFamily="18" charset="0"/>
+            </a:endParaRPr>
+          </a:p>
+        </p:txBody>
+      </p:sp>
+      <p:sp>
+        <p:nvSpPr>
+          <p:cNvPr id="42" name="TextBox 41">
+            <a:extLst>
+              <a:ext uri="{FF2B5EF4-FFF2-40B4-BE49-F238E27FC236}">
+                <a16:creationId xmlns:a16="http://schemas.microsoft.com/office/drawing/2014/main" id="{5055AC2F-8664-4A0D-9160-72CEEB37BBEA}"/>
+              </a:ext>
+            </a:extLst>
+          </p:cNvPr>
+          <p:cNvSpPr txBox="1"/>
+          <p:nvPr/>
+        </p:nvSpPr>
+        <p:spPr>
+          <a:xfrm>
+            <a:off x="909412" y="3742462"/>
+            <a:ext cx="1018547" cy="338554"/>
+          </a:xfrm>
+          <a:prstGeom prst="rect">
+            <a:avLst/>
+          </a:prstGeom>
+          <a:noFill/>
+        </p:spPr>
+        <p:txBody>
+          <a:bodyPr wrap="square" rtlCol="0">
+            <a:spAutoFit/>
+          </a:bodyPr>
+          <a:lstStyle/>
+          <a:p>
+            <a:pPr algn="ctr"/>
+            <a:r>
+              <a:rPr lang="en-US" sz="1600" dirty="0">
+                <a:latin typeface="Times New Roman" panose="02020603050405020304" pitchFamily="18" charset="0"/>
+                <a:cs typeface="Times New Roman" panose="02020603050405020304" pitchFamily="18" charset="0"/>
+              </a:rPr>
+              <a:t>CB</a:t>
+            </a:r>
+          </a:p>
+        </p:txBody>
+      </p:sp>
+      <p:sp>
+        <p:nvSpPr>
+          <p:cNvPr id="43" name="TextBox 42">
+            <a:extLst>
+              <a:ext uri="{FF2B5EF4-FFF2-40B4-BE49-F238E27FC236}">
+                <a16:creationId xmlns:a16="http://schemas.microsoft.com/office/drawing/2014/main" id="{90CE0ECE-04CE-4DD8-9726-1D4DBE76C42A}"/>
+              </a:ext>
+            </a:extLst>
+          </p:cNvPr>
+          <p:cNvSpPr txBox="1"/>
+          <p:nvPr/>
+        </p:nvSpPr>
+        <p:spPr>
+          <a:xfrm>
+            <a:off x="7216070" y="4183978"/>
+            <a:ext cx="1018547" cy="338554"/>
+          </a:xfrm>
+          <a:prstGeom prst="rect">
+            <a:avLst/>
+          </a:prstGeom>
+          <a:noFill/>
+        </p:spPr>
+        <p:txBody>
+          <a:bodyPr wrap="square" rtlCol="0">
+            <a:spAutoFit/>
+          </a:bodyPr>
+          <a:lstStyle/>
+          <a:p>
+            <a:pPr algn="ctr"/>
+            <a:r>
+              <a:rPr lang="en-US" sz="1600" dirty="0">
+                <a:latin typeface="Times New Roman" panose="02020603050405020304" pitchFamily="18" charset="0"/>
+                <a:cs typeface="Times New Roman" panose="02020603050405020304" pitchFamily="18" charset="0"/>
+              </a:rPr>
+              <a:t>CB</a:t>
+            </a:r>
+          </a:p>
+        </p:txBody>
+      </p:sp>
     </p:spTree>
     <p:extLst>
       <p:ext uri="{BB962C8B-B14F-4D97-AF65-F5344CB8AC3E}">
         <p14:creationId xmlns:p14="http://schemas.microsoft.com/office/powerpoint/2010/main" val="2185806288"/>
+      </p:ext>
+    </p:extLst>
+  </p:cSld>
+  <p:clrMapOvr>
+    <a:masterClrMapping/>
+  </p:clrMapOvr>
+</p:sld>
+</file>
+
+<file path=ppt/slides/slide3.xml><?xml version="1.0" encoding="utf-8"?>
+<p:sld xmlns:a="http://schemas.openxmlformats.org/drawingml/2006/main" xmlns:r="http://schemas.openxmlformats.org/officeDocument/2006/relationships" xmlns:p="http://schemas.openxmlformats.org/presentationml/2006/main">
+  <p:cSld>
+    <p:spTree>
+      <p:nvGrpSpPr>
+        <p:cNvPr id="1" name=""/>
+        <p:cNvGrpSpPr/>
+        <p:nvPr/>
+      </p:nvGrpSpPr>
+      <p:grpSpPr>
+        <a:xfrm>
+          <a:off x="0" y="0"/>
+          <a:ext cx="0" cy="0"/>
+          <a:chOff x="0" y="0"/>
+          <a:chExt cx="0" cy="0"/>
+        </a:xfrm>
+      </p:grpSpPr>
+      <p:cxnSp>
+        <p:nvCxnSpPr>
+          <p:cNvPr id="54" name="Straight Connector 53">
+            <a:extLst>
+              <a:ext uri="{FF2B5EF4-FFF2-40B4-BE49-F238E27FC236}">
+                <a16:creationId xmlns:a16="http://schemas.microsoft.com/office/drawing/2014/main" id="{48C56E57-FF70-4035-BF84-4538C73D1D39}"/>
+              </a:ext>
+            </a:extLst>
+          </p:cNvPr>
+          <p:cNvCxnSpPr/>
+          <p:nvPr/>
+        </p:nvCxnSpPr>
+        <p:spPr>
+          <a:xfrm>
+            <a:off x="6969734" y="2304287"/>
+            <a:ext cx="3657600" cy="0"/>
+          </a:xfrm>
+          <a:prstGeom prst="line">
+            <a:avLst/>
+          </a:prstGeom>
+          <a:ln>
+            <a:solidFill>
+              <a:schemeClr val="bg1">
+                <a:lumMod val="50000"/>
+              </a:schemeClr>
+            </a:solidFill>
+            <a:prstDash val="dash"/>
+          </a:ln>
+        </p:spPr>
+        <p:style>
+          <a:lnRef idx="1">
+            <a:schemeClr val="accent1"/>
+          </a:lnRef>
+          <a:fillRef idx="0">
+            <a:schemeClr val="accent1"/>
+          </a:fillRef>
+          <a:effectRef idx="0">
+            <a:schemeClr val="accent1"/>
+          </a:effectRef>
+          <a:fontRef idx="minor">
+            <a:schemeClr val="tx1"/>
+          </a:fontRef>
+        </p:style>
+      </p:cxnSp>
+      <p:cxnSp>
+        <p:nvCxnSpPr>
+          <p:cNvPr id="55" name="Straight Connector 54">
+            <a:extLst>
+              <a:ext uri="{FF2B5EF4-FFF2-40B4-BE49-F238E27FC236}">
+                <a16:creationId xmlns:a16="http://schemas.microsoft.com/office/drawing/2014/main" id="{0AE80157-E46C-4CE0-B674-9CEBF673F4DB}"/>
+              </a:ext>
+            </a:extLst>
+          </p:cNvPr>
+          <p:cNvCxnSpPr/>
+          <p:nvPr/>
+        </p:nvCxnSpPr>
+        <p:spPr>
+          <a:xfrm>
+            <a:off x="6969734" y="3488873"/>
+            <a:ext cx="3657600" cy="0"/>
+          </a:xfrm>
+          <a:prstGeom prst="line">
+            <a:avLst/>
+          </a:prstGeom>
+          <a:ln>
+            <a:solidFill>
+              <a:schemeClr val="bg1">
+                <a:lumMod val="50000"/>
+              </a:schemeClr>
+            </a:solidFill>
+            <a:prstDash val="dash"/>
+          </a:ln>
+        </p:spPr>
+        <p:style>
+          <a:lnRef idx="1">
+            <a:schemeClr val="accent1"/>
+          </a:lnRef>
+          <a:fillRef idx="0">
+            <a:schemeClr val="accent1"/>
+          </a:fillRef>
+          <a:effectRef idx="0">
+            <a:schemeClr val="accent1"/>
+          </a:effectRef>
+          <a:fontRef idx="minor">
+            <a:schemeClr val="tx1"/>
+          </a:fontRef>
+        </p:style>
+      </p:cxnSp>
+      <p:cxnSp>
+        <p:nvCxnSpPr>
+          <p:cNvPr id="56" name="Straight Connector 55">
+            <a:extLst>
+              <a:ext uri="{FF2B5EF4-FFF2-40B4-BE49-F238E27FC236}">
+                <a16:creationId xmlns:a16="http://schemas.microsoft.com/office/drawing/2014/main" id="{E207D78D-59BD-4E69-9CA3-D72C72607D5C}"/>
+              </a:ext>
+            </a:extLst>
+          </p:cNvPr>
+          <p:cNvCxnSpPr/>
+          <p:nvPr/>
+        </p:nvCxnSpPr>
+        <p:spPr>
+          <a:xfrm>
+            <a:off x="6969734" y="3886300"/>
+            <a:ext cx="3657600" cy="0"/>
+          </a:xfrm>
+          <a:prstGeom prst="line">
+            <a:avLst/>
+          </a:prstGeom>
+          <a:ln>
+            <a:solidFill>
+              <a:schemeClr val="bg1">
+                <a:lumMod val="50000"/>
+              </a:schemeClr>
+            </a:solidFill>
+            <a:prstDash val="dash"/>
+          </a:ln>
+        </p:spPr>
+        <p:style>
+          <a:lnRef idx="1">
+            <a:schemeClr val="accent1"/>
+          </a:lnRef>
+          <a:fillRef idx="0">
+            <a:schemeClr val="accent1"/>
+          </a:fillRef>
+          <a:effectRef idx="0">
+            <a:schemeClr val="accent1"/>
+          </a:effectRef>
+          <a:fontRef idx="minor">
+            <a:schemeClr val="tx1"/>
+          </a:fontRef>
+        </p:style>
+      </p:cxnSp>
+      <p:cxnSp>
+        <p:nvCxnSpPr>
+          <p:cNvPr id="38" name="Straight Connector 37">
+            <a:extLst>
+              <a:ext uri="{FF2B5EF4-FFF2-40B4-BE49-F238E27FC236}">
+                <a16:creationId xmlns:a16="http://schemas.microsoft.com/office/drawing/2014/main" id="{35A4AE88-A6B8-4335-9FA6-A12C7284BBF2}"/>
+              </a:ext>
+            </a:extLst>
+          </p:cNvPr>
+          <p:cNvCxnSpPr>
+            <a:cxnSpLocks/>
+          </p:cNvCxnSpPr>
+          <p:nvPr/>
+        </p:nvCxnSpPr>
+        <p:spPr>
+          <a:xfrm flipH="1">
+            <a:off x="7899469" y="2841251"/>
+            <a:ext cx="1018843" cy="661756"/>
+          </a:xfrm>
+          <a:prstGeom prst="line">
+            <a:avLst/>
+          </a:prstGeom>
+          <a:ln w="19050">
+            <a:solidFill>
+              <a:schemeClr val="bg1">
+                <a:lumMod val="50000"/>
+              </a:schemeClr>
+            </a:solidFill>
+          </a:ln>
+        </p:spPr>
+        <p:style>
+          <a:lnRef idx="1">
+            <a:schemeClr val="accent1"/>
+          </a:lnRef>
+          <a:fillRef idx="0">
+            <a:schemeClr val="accent1"/>
+          </a:fillRef>
+          <a:effectRef idx="0">
+            <a:schemeClr val="accent1"/>
+          </a:effectRef>
+          <a:fontRef idx="minor">
+            <a:schemeClr val="tx1"/>
+          </a:fontRef>
+        </p:style>
+      </p:cxnSp>
+      <p:cxnSp>
+        <p:nvCxnSpPr>
+          <p:cNvPr id="33" name="Straight Connector 32">
+            <a:extLst>
+              <a:ext uri="{FF2B5EF4-FFF2-40B4-BE49-F238E27FC236}">
+                <a16:creationId xmlns:a16="http://schemas.microsoft.com/office/drawing/2014/main" id="{7463C725-6F55-471C-B6A9-6A3967307BF8}"/>
+              </a:ext>
+            </a:extLst>
+          </p:cNvPr>
+          <p:cNvCxnSpPr>
+            <a:cxnSpLocks/>
+          </p:cNvCxnSpPr>
+          <p:nvPr/>
+        </p:nvCxnSpPr>
+        <p:spPr>
+          <a:xfrm>
+            <a:off x="6862747" y="2825956"/>
+            <a:ext cx="1018843" cy="661756"/>
+          </a:xfrm>
+          <a:prstGeom prst="line">
+            <a:avLst/>
+          </a:prstGeom>
+          <a:ln w="19050">
+            <a:solidFill>
+              <a:schemeClr val="bg1">
+                <a:lumMod val="50000"/>
+              </a:schemeClr>
+            </a:solidFill>
+          </a:ln>
+        </p:spPr>
+        <p:style>
+          <a:lnRef idx="1">
+            <a:schemeClr val="accent1"/>
+          </a:lnRef>
+          <a:fillRef idx="0">
+            <a:schemeClr val="accent1"/>
+          </a:fillRef>
+          <a:effectRef idx="0">
+            <a:schemeClr val="accent1"/>
+          </a:effectRef>
+          <a:fontRef idx="minor">
+            <a:schemeClr val="tx1"/>
+          </a:fontRef>
+        </p:style>
+      </p:cxnSp>
+      <p:cxnSp>
+        <p:nvCxnSpPr>
+          <p:cNvPr id="30" name="Straight Arrow Connector 29">
+            <a:extLst>
+              <a:ext uri="{FF2B5EF4-FFF2-40B4-BE49-F238E27FC236}">
+                <a16:creationId xmlns:a16="http://schemas.microsoft.com/office/drawing/2014/main" id="{BF46756A-F6F8-4917-A2DA-F9ACEB1FF11C}"/>
+              </a:ext>
+            </a:extLst>
+          </p:cNvPr>
+          <p:cNvCxnSpPr>
+            <a:cxnSpLocks/>
+          </p:cNvCxnSpPr>
+          <p:nvPr/>
+        </p:nvCxnSpPr>
+        <p:spPr>
+          <a:xfrm rot="10800000">
+            <a:off x="7909928" y="1544827"/>
+            <a:ext cx="0" cy="3657600"/>
+          </a:xfrm>
+          <a:prstGeom prst="straightConnector1">
+            <a:avLst/>
+          </a:prstGeom>
+          <a:ln w="28575">
+            <a:solidFill>
+              <a:schemeClr val="bg1">
+                <a:lumMod val="75000"/>
+              </a:schemeClr>
+            </a:solidFill>
+            <a:tailEnd type="triangle"/>
+          </a:ln>
+        </p:spPr>
+        <p:style>
+          <a:lnRef idx="1">
+            <a:schemeClr val="accent1"/>
+          </a:lnRef>
+          <a:fillRef idx="0">
+            <a:schemeClr val="accent1"/>
+          </a:fillRef>
+          <a:effectRef idx="0">
+            <a:schemeClr val="accent1"/>
+          </a:effectRef>
+          <a:fontRef idx="minor">
+            <a:schemeClr val="tx1"/>
+          </a:fontRef>
+        </p:style>
+      </p:cxnSp>
+      <p:cxnSp>
+        <p:nvCxnSpPr>
+          <p:cNvPr id="28" name="Straight Arrow Connector 27">
+            <a:extLst>
+              <a:ext uri="{FF2B5EF4-FFF2-40B4-BE49-F238E27FC236}">
+                <a16:creationId xmlns:a16="http://schemas.microsoft.com/office/drawing/2014/main" id="{0358A506-282E-4D45-BDF4-7FD56A1FC600}"/>
+              </a:ext>
+            </a:extLst>
+          </p:cNvPr>
+          <p:cNvCxnSpPr/>
+          <p:nvPr/>
+        </p:nvCxnSpPr>
+        <p:spPr>
+          <a:xfrm>
+            <a:off x="6243121" y="3884990"/>
+            <a:ext cx="3383280" cy="0"/>
+          </a:xfrm>
+          <a:prstGeom prst="straightConnector1">
+            <a:avLst/>
+          </a:prstGeom>
+          <a:ln w="28575">
+            <a:solidFill>
+              <a:schemeClr val="bg1">
+                <a:lumMod val="75000"/>
+              </a:schemeClr>
+            </a:solidFill>
+            <a:tailEnd type="triangle"/>
+          </a:ln>
+        </p:spPr>
+        <p:style>
+          <a:lnRef idx="1">
+            <a:schemeClr val="accent1"/>
+          </a:lnRef>
+          <a:fillRef idx="0">
+            <a:schemeClr val="accent1"/>
+          </a:fillRef>
+          <a:effectRef idx="0">
+            <a:schemeClr val="accent1"/>
+          </a:effectRef>
+          <a:fontRef idx="minor">
+            <a:schemeClr val="tx1"/>
+          </a:fontRef>
+        </p:style>
+      </p:cxnSp>
+      <p:sp>
+        <p:nvSpPr>
+          <p:cNvPr id="5" name="Oval 4">
+            <a:extLst>
+              <a:ext uri="{FF2B5EF4-FFF2-40B4-BE49-F238E27FC236}">
+                <a16:creationId xmlns:a16="http://schemas.microsoft.com/office/drawing/2014/main" id="{15B4416D-55A4-4FA7-8F48-27A963BFDC5A}"/>
+              </a:ext>
+            </a:extLst>
+          </p:cNvPr>
+          <p:cNvSpPr>
+            <a:spLocks noChangeAspect="1"/>
+          </p:cNvSpPr>
+          <p:nvPr/>
+        </p:nvSpPr>
+        <p:spPr>
+          <a:xfrm rot="16200000">
+            <a:off x="6694618" y="2310108"/>
+            <a:ext cx="2377440" cy="2377440"/>
+          </a:xfrm>
+          <a:prstGeom prst="ellipse">
+            <a:avLst/>
+          </a:prstGeom>
+          <a:noFill/>
+          <a:ln w="19050">
+            <a:solidFill>
+              <a:schemeClr val="tx1"/>
+            </a:solidFill>
+            <a:prstDash val="lgDashDotDot"/>
+          </a:ln>
+        </p:spPr>
+        <p:style>
+          <a:lnRef idx="2">
+            <a:schemeClr val="accent1">
+              <a:shade val="50000"/>
+            </a:schemeClr>
+          </a:lnRef>
+          <a:fillRef idx="1">
+            <a:schemeClr val="accent1"/>
+          </a:fillRef>
+          <a:effectRef idx="0">
+            <a:schemeClr val="accent1"/>
+          </a:effectRef>
+          <a:fontRef idx="minor">
+            <a:schemeClr val="lt1"/>
+          </a:fontRef>
+        </p:style>
+        <p:txBody>
+          <a:bodyPr rtlCol="0" anchor="ctr"/>
+          <a:lstStyle/>
+          <a:p>
+            <a:pPr algn="ctr"/>
+            <a:endParaRPr lang="en-US"/>
+          </a:p>
+        </p:txBody>
+      </p:sp>
+      <p:sp>
+        <p:nvSpPr>
+          <p:cNvPr id="11" name="Oval 10">
+            <a:extLst>
+              <a:ext uri="{FF2B5EF4-FFF2-40B4-BE49-F238E27FC236}">
+                <a16:creationId xmlns:a16="http://schemas.microsoft.com/office/drawing/2014/main" id="{66FB81EE-D04E-422E-8A72-BB9EB872BEF8}"/>
+              </a:ext>
+            </a:extLst>
+          </p:cNvPr>
+          <p:cNvSpPr/>
+          <p:nvPr/>
+        </p:nvSpPr>
+        <p:spPr>
+          <a:xfrm rot="16200000">
+            <a:off x="7855610" y="3839271"/>
+            <a:ext cx="91440" cy="91440"/>
+          </a:xfrm>
+          <a:prstGeom prst="ellipse">
+            <a:avLst/>
+          </a:prstGeom>
+          <a:solidFill>
+            <a:schemeClr val="tx1"/>
+          </a:solidFill>
+          <a:ln>
+            <a:solidFill>
+              <a:schemeClr val="tx1"/>
+            </a:solidFill>
+          </a:ln>
+        </p:spPr>
+        <p:style>
+          <a:lnRef idx="2">
+            <a:schemeClr val="accent1">
+              <a:shade val="50000"/>
+            </a:schemeClr>
+          </a:lnRef>
+          <a:fillRef idx="1">
+            <a:schemeClr val="accent1"/>
+          </a:fillRef>
+          <a:effectRef idx="0">
+            <a:schemeClr val="accent1"/>
+          </a:effectRef>
+          <a:fontRef idx="minor">
+            <a:schemeClr val="lt1"/>
+          </a:fontRef>
+        </p:style>
+        <p:txBody>
+          <a:bodyPr rtlCol="0" anchor="ctr"/>
+          <a:lstStyle/>
+          <a:p>
+            <a:pPr algn="ctr"/>
+            <a:endParaRPr lang="en-US"/>
+          </a:p>
+        </p:txBody>
+      </p:sp>
+      <p:sp>
+        <p:nvSpPr>
+          <p:cNvPr id="12" name="Arc 11">
+            <a:extLst>
+              <a:ext uri="{FF2B5EF4-FFF2-40B4-BE49-F238E27FC236}">
+                <a16:creationId xmlns:a16="http://schemas.microsoft.com/office/drawing/2014/main" id="{0FA4F546-3EB0-4E3D-A1C3-9AE43CA15F1C}"/>
+              </a:ext>
+            </a:extLst>
+          </p:cNvPr>
+          <p:cNvSpPr/>
+          <p:nvPr/>
+        </p:nvSpPr>
+        <p:spPr>
+          <a:xfrm rot="16200000">
+            <a:off x="6695013" y="2305446"/>
+            <a:ext cx="2377440" cy="2377440"/>
+          </a:xfrm>
+          <a:prstGeom prst="arc">
+            <a:avLst>
+              <a:gd name="adj1" fmla="val 18149876"/>
+              <a:gd name="adj2" fmla="val 3620261"/>
+            </a:avLst>
+          </a:prstGeom>
+          <a:noFill/>
+          <a:ln w="38100">
+            <a:solidFill>
+              <a:srgbClr val="FF0000"/>
+            </a:solidFill>
+          </a:ln>
+        </p:spPr>
+        <p:style>
+          <a:lnRef idx="1">
+            <a:schemeClr val="accent1"/>
+          </a:lnRef>
+          <a:fillRef idx="0">
+            <a:schemeClr val="accent1"/>
+          </a:fillRef>
+          <a:effectRef idx="0">
+            <a:schemeClr val="accent1"/>
+          </a:effectRef>
+          <a:fontRef idx="minor">
+            <a:schemeClr val="tx1"/>
+          </a:fontRef>
+        </p:style>
+        <p:txBody>
+          <a:bodyPr rtlCol="0" anchor="ctr"/>
+          <a:lstStyle/>
+          <a:p>
+            <a:pPr algn="ctr"/>
+            <a:endParaRPr lang="en-US"/>
+          </a:p>
+        </p:txBody>
+      </p:sp>
+      <p:cxnSp>
+        <p:nvCxnSpPr>
+          <p:cNvPr id="13" name="Straight Arrow Connector 12">
+            <a:extLst>
+              <a:ext uri="{FF2B5EF4-FFF2-40B4-BE49-F238E27FC236}">
+                <a16:creationId xmlns:a16="http://schemas.microsoft.com/office/drawing/2014/main" id="{1E86DA5C-E9CD-4A16-89A5-6686C3A3B2F2}"/>
+              </a:ext>
+            </a:extLst>
+          </p:cNvPr>
+          <p:cNvCxnSpPr>
+            <a:cxnSpLocks/>
+          </p:cNvCxnSpPr>
+          <p:nvPr/>
+        </p:nvCxnSpPr>
+        <p:spPr>
+          <a:xfrm rot="18900000">
+            <a:off x="7710063" y="3376388"/>
+            <a:ext cx="1417320" cy="0"/>
+          </a:xfrm>
+          <a:prstGeom prst="straightConnector1">
+            <a:avLst/>
+          </a:prstGeom>
+          <a:ln w="19050">
+            <a:solidFill>
+              <a:schemeClr val="tx1"/>
+            </a:solidFill>
+            <a:tailEnd type="triangle"/>
+          </a:ln>
+        </p:spPr>
+        <p:style>
+          <a:lnRef idx="1">
+            <a:schemeClr val="accent1"/>
+          </a:lnRef>
+          <a:fillRef idx="0">
+            <a:schemeClr val="accent1"/>
+          </a:fillRef>
+          <a:effectRef idx="0">
+            <a:schemeClr val="accent1"/>
+          </a:effectRef>
+          <a:fontRef idx="minor">
+            <a:schemeClr val="tx1"/>
+          </a:fontRef>
+        </p:style>
+      </p:cxnSp>
+      <p:cxnSp>
+        <p:nvCxnSpPr>
+          <p:cNvPr id="14" name="Straight Arrow Connector 13">
+            <a:extLst>
+              <a:ext uri="{FF2B5EF4-FFF2-40B4-BE49-F238E27FC236}">
+                <a16:creationId xmlns:a16="http://schemas.microsoft.com/office/drawing/2014/main" id="{4F570586-1E6C-46FA-A23B-D486C28AC406}"/>
+              </a:ext>
+            </a:extLst>
+          </p:cNvPr>
+          <p:cNvCxnSpPr>
+            <a:cxnSpLocks/>
+          </p:cNvCxnSpPr>
+          <p:nvPr/>
+        </p:nvCxnSpPr>
+        <p:spPr>
+          <a:xfrm rot="16200000">
+            <a:off x="7132688" y="3103089"/>
+            <a:ext cx="1554480" cy="0"/>
+          </a:xfrm>
+          <a:prstGeom prst="straightConnector1">
+            <a:avLst/>
+          </a:prstGeom>
+          <a:ln w="19050">
+            <a:solidFill>
+              <a:schemeClr val="tx1"/>
+            </a:solidFill>
+            <a:prstDash val="lgDash"/>
+            <a:tailEnd type="triangle"/>
+          </a:ln>
+        </p:spPr>
+        <p:style>
+          <a:lnRef idx="1">
+            <a:schemeClr val="accent1"/>
+          </a:lnRef>
+          <a:fillRef idx="0">
+            <a:schemeClr val="accent1"/>
+          </a:fillRef>
+          <a:effectRef idx="0">
+            <a:schemeClr val="accent1"/>
+          </a:effectRef>
+          <a:fontRef idx="minor">
+            <a:schemeClr val="tx1"/>
+          </a:fontRef>
+        </p:style>
+      </p:cxnSp>
+      <p:cxnSp>
+        <p:nvCxnSpPr>
+          <p:cNvPr id="15" name="Straight Arrow Connector 14">
+            <a:extLst>
+              <a:ext uri="{FF2B5EF4-FFF2-40B4-BE49-F238E27FC236}">
+                <a16:creationId xmlns:a16="http://schemas.microsoft.com/office/drawing/2014/main" id="{CBA76AD8-AE9A-4001-B665-01C9C14575D5}"/>
+              </a:ext>
+            </a:extLst>
+          </p:cNvPr>
+          <p:cNvCxnSpPr>
+            <a:cxnSpLocks/>
+          </p:cNvCxnSpPr>
+          <p:nvPr/>
+        </p:nvCxnSpPr>
+        <p:spPr>
+          <a:xfrm rot="13500000">
+            <a:off x="6680712" y="3366722"/>
+            <a:ext cx="1417320" cy="0"/>
+          </a:xfrm>
+          <a:prstGeom prst="straightConnector1">
+            <a:avLst/>
+          </a:prstGeom>
+          <a:ln w="19050">
+            <a:solidFill>
+              <a:schemeClr val="tx1"/>
+            </a:solidFill>
+            <a:prstDash val="dashDot"/>
+            <a:tailEnd type="triangle"/>
+          </a:ln>
+        </p:spPr>
+        <p:style>
+          <a:lnRef idx="1">
+            <a:schemeClr val="accent1"/>
+          </a:lnRef>
+          <a:fillRef idx="0">
+            <a:schemeClr val="accent1"/>
+          </a:fillRef>
+          <a:effectRef idx="0">
+            <a:schemeClr val="accent1"/>
+          </a:effectRef>
+          <a:fontRef idx="minor">
+            <a:schemeClr val="tx1"/>
+          </a:fontRef>
+        </p:style>
+      </p:cxnSp>
+      <p:sp>
+        <p:nvSpPr>
+          <p:cNvPr id="4" name="Freeform: Shape 3">
+            <a:extLst>
+              <a:ext uri="{FF2B5EF4-FFF2-40B4-BE49-F238E27FC236}">
+                <a16:creationId xmlns:a16="http://schemas.microsoft.com/office/drawing/2014/main" id="{32CD16CB-947E-4D91-830C-DB8714340405}"/>
+              </a:ext>
+            </a:extLst>
+          </p:cNvPr>
+          <p:cNvSpPr/>
+          <p:nvPr/>
+        </p:nvSpPr>
+        <p:spPr>
+          <a:xfrm rot="16451432">
+            <a:off x="3845886" y="3240334"/>
+            <a:ext cx="1468582" cy="685800"/>
+          </a:xfrm>
+          <a:custGeom>
+            <a:avLst/>
+            <a:gdLst>
+              <a:gd name="connsiteX0" fmla="*/ 644237 w 1468582"/>
+              <a:gd name="connsiteY0" fmla="*/ 0 h 685800"/>
+              <a:gd name="connsiteX1" fmla="*/ 0 w 1468582"/>
+              <a:gd name="connsiteY1" fmla="*/ 450272 h 685800"/>
+              <a:gd name="connsiteX2" fmla="*/ 76200 w 1468582"/>
+              <a:gd name="connsiteY2" fmla="*/ 512618 h 685800"/>
+              <a:gd name="connsiteX3" fmla="*/ 242455 w 1468582"/>
+              <a:gd name="connsiteY3" fmla="*/ 602672 h 685800"/>
+              <a:gd name="connsiteX4" fmla="*/ 346364 w 1468582"/>
+              <a:gd name="connsiteY4" fmla="*/ 637309 h 685800"/>
+              <a:gd name="connsiteX5" fmla="*/ 526473 w 1468582"/>
+              <a:gd name="connsiteY5" fmla="*/ 671945 h 685800"/>
+              <a:gd name="connsiteX6" fmla="*/ 671946 w 1468582"/>
+              <a:gd name="connsiteY6" fmla="*/ 685800 h 685800"/>
+              <a:gd name="connsiteX7" fmla="*/ 803564 w 1468582"/>
+              <a:gd name="connsiteY7" fmla="*/ 665018 h 685800"/>
+              <a:gd name="connsiteX8" fmla="*/ 983673 w 1468582"/>
+              <a:gd name="connsiteY8" fmla="*/ 623454 h 685800"/>
+              <a:gd name="connsiteX9" fmla="*/ 1184564 w 1468582"/>
+              <a:gd name="connsiteY9" fmla="*/ 540327 h 685800"/>
+              <a:gd name="connsiteX10" fmla="*/ 1295400 w 1468582"/>
+              <a:gd name="connsiteY10" fmla="*/ 450272 h 685800"/>
+              <a:gd name="connsiteX11" fmla="*/ 1468582 w 1468582"/>
+              <a:gd name="connsiteY11" fmla="*/ 304800 h 685800"/>
+              <a:gd name="connsiteX12" fmla="*/ 644237 w 1468582"/>
+              <a:gd name="connsiteY12" fmla="*/ 0 h 685800"/>
+            </a:gdLst>
+            <a:ahLst/>
+            <a:cxnLst>
+              <a:cxn ang="0">
+                <a:pos x="connsiteX0" y="connsiteY0"/>
+              </a:cxn>
+              <a:cxn ang="0">
+                <a:pos x="connsiteX1" y="connsiteY1"/>
+              </a:cxn>
+              <a:cxn ang="0">
+                <a:pos x="connsiteX2" y="connsiteY2"/>
+              </a:cxn>
+              <a:cxn ang="0">
+                <a:pos x="connsiteX3" y="connsiteY3"/>
+              </a:cxn>
+              <a:cxn ang="0">
+                <a:pos x="connsiteX4" y="connsiteY4"/>
+              </a:cxn>
+              <a:cxn ang="0">
+                <a:pos x="connsiteX5" y="connsiteY5"/>
+              </a:cxn>
+              <a:cxn ang="0">
+                <a:pos x="connsiteX6" y="connsiteY6"/>
+              </a:cxn>
+              <a:cxn ang="0">
+                <a:pos x="connsiteX7" y="connsiteY7"/>
+              </a:cxn>
+              <a:cxn ang="0">
+                <a:pos x="connsiteX8" y="connsiteY8"/>
+              </a:cxn>
+              <a:cxn ang="0">
+                <a:pos x="connsiteX9" y="connsiteY9"/>
+              </a:cxn>
+              <a:cxn ang="0">
+                <a:pos x="connsiteX10" y="connsiteY10"/>
+              </a:cxn>
+              <a:cxn ang="0">
+                <a:pos x="connsiteX11" y="connsiteY11"/>
+              </a:cxn>
+              <a:cxn ang="0">
+                <a:pos x="connsiteX12" y="connsiteY12"/>
+              </a:cxn>
+            </a:cxnLst>
+            <a:rect l="l" t="t" r="r" b="b"/>
+            <a:pathLst>
+              <a:path w="1468582" h="685800">
+                <a:moveTo>
+                  <a:pt x="644237" y="0"/>
+                </a:moveTo>
+                <a:lnTo>
+                  <a:pt x="0" y="450272"/>
+                </a:lnTo>
+                <a:lnTo>
+                  <a:pt x="76200" y="512618"/>
+                </a:lnTo>
+                <a:lnTo>
+                  <a:pt x="242455" y="602672"/>
+                </a:lnTo>
+                <a:lnTo>
+                  <a:pt x="346364" y="637309"/>
+                </a:lnTo>
+                <a:lnTo>
+                  <a:pt x="526473" y="671945"/>
+                </a:lnTo>
+                <a:lnTo>
+                  <a:pt x="671946" y="685800"/>
+                </a:lnTo>
+                <a:lnTo>
+                  <a:pt x="803564" y="665018"/>
+                </a:lnTo>
+                <a:lnTo>
+                  <a:pt x="983673" y="623454"/>
+                </a:lnTo>
+                <a:lnTo>
+                  <a:pt x="1184564" y="540327"/>
+                </a:lnTo>
+                <a:lnTo>
+                  <a:pt x="1295400" y="450272"/>
+                </a:lnTo>
+                <a:lnTo>
+                  <a:pt x="1468582" y="304800"/>
+                </a:lnTo>
+                <a:lnTo>
+                  <a:pt x="644237" y="0"/>
+                </a:lnTo>
+                <a:close/>
+              </a:path>
+            </a:pathLst>
+          </a:custGeom>
+          <a:solidFill>
+            <a:srgbClr val="FF0000">
+              <a:alpha val="30000"/>
+            </a:srgbClr>
+          </a:solidFill>
+          <a:ln>
+            <a:noFill/>
+          </a:ln>
+        </p:spPr>
+        <p:style>
+          <a:lnRef idx="2">
+            <a:schemeClr val="accent1">
+              <a:shade val="50000"/>
+            </a:schemeClr>
+          </a:lnRef>
+          <a:fillRef idx="1">
+            <a:schemeClr val="accent1"/>
+          </a:fillRef>
+          <a:effectRef idx="0">
+            <a:schemeClr val="accent1"/>
+          </a:effectRef>
+          <a:fontRef idx="minor">
+            <a:schemeClr val="lt1"/>
+          </a:fontRef>
+        </p:style>
+        <p:txBody>
+          <a:bodyPr rtlCol="0" anchor="ctr"/>
+          <a:lstStyle/>
+          <a:p>
+            <a:pPr algn="ctr"/>
+            <a:endParaRPr lang="en-US"/>
+          </a:p>
+        </p:txBody>
+      </p:sp>
+      <p:sp>
+        <p:nvSpPr>
+          <p:cNvPr id="6" name="Oval 5">
+            <a:extLst>
+              <a:ext uri="{FF2B5EF4-FFF2-40B4-BE49-F238E27FC236}">
+                <a16:creationId xmlns:a16="http://schemas.microsoft.com/office/drawing/2014/main" id="{9A751670-1106-460D-86F3-EEE5002A94FE}"/>
+              </a:ext>
+            </a:extLst>
+          </p:cNvPr>
+          <p:cNvSpPr/>
+          <p:nvPr/>
+        </p:nvSpPr>
+        <p:spPr>
+          <a:xfrm rot="16200000">
+            <a:off x="2353587" y="2255940"/>
+            <a:ext cx="2377440" cy="2743200"/>
+          </a:xfrm>
+          <a:prstGeom prst="ellipse">
+            <a:avLst/>
+          </a:prstGeom>
+          <a:noFill/>
+          <a:ln w="28575">
+            <a:solidFill>
+              <a:schemeClr val="tx1"/>
+            </a:solidFill>
+          </a:ln>
+        </p:spPr>
+        <p:style>
+          <a:lnRef idx="2">
+            <a:schemeClr val="accent1">
+              <a:shade val="50000"/>
+            </a:schemeClr>
+          </a:lnRef>
+          <a:fillRef idx="1">
+            <a:schemeClr val="accent1"/>
+          </a:fillRef>
+          <a:effectRef idx="0">
+            <a:schemeClr val="accent1"/>
+          </a:effectRef>
+          <a:fontRef idx="minor">
+            <a:schemeClr val="lt1"/>
+          </a:fontRef>
+        </p:style>
+        <p:txBody>
+          <a:bodyPr rtlCol="0" anchor="ctr"/>
+          <a:lstStyle/>
+          <a:p>
+            <a:pPr algn="ctr"/>
+            <a:endParaRPr lang="en-US" dirty="0"/>
+          </a:p>
+        </p:txBody>
+      </p:sp>
+      <p:sp>
+        <p:nvSpPr>
+          <p:cNvPr id="7" name="Oval 6">
+            <a:extLst>
+              <a:ext uri="{FF2B5EF4-FFF2-40B4-BE49-F238E27FC236}">
+                <a16:creationId xmlns:a16="http://schemas.microsoft.com/office/drawing/2014/main" id="{4AB5703E-483C-485F-A84F-5D0CFBD4AC78}"/>
+              </a:ext>
+            </a:extLst>
+          </p:cNvPr>
+          <p:cNvSpPr/>
+          <p:nvPr/>
+        </p:nvSpPr>
+        <p:spPr>
+          <a:xfrm rot="16200000">
+            <a:off x="4182387" y="3581820"/>
+            <a:ext cx="91440" cy="91440"/>
+          </a:xfrm>
+          <a:prstGeom prst="ellipse">
+            <a:avLst/>
+          </a:prstGeom>
+          <a:solidFill>
+            <a:schemeClr val="tx1"/>
+          </a:solidFill>
+          <a:ln>
+            <a:solidFill>
+              <a:schemeClr val="tx1"/>
+            </a:solidFill>
+          </a:ln>
+        </p:spPr>
+        <p:style>
+          <a:lnRef idx="2">
+            <a:schemeClr val="accent1">
+              <a:shade val="50000"/>
+            </a:schemeClr>
+          </a:lnRef>
+          <a:fillRef idx="1">
+            <a:schemeClr val="accent1"/>
+          </a:fillRef>
+          <a:effectRef idx="0">
+            <a:schemeClr val="accent1"/>
+          </a:effectRef>
+          <a:fontRef idx="minor">
+            <a:schemeClr val="lt1"/>
+          </a:fontRef>
+        </p:style>
+        <p:txBody>
+          <a:bodyPr rtlCol="0" anchor="ctr"/>
+          <a:lstStyle/>
+          <a:p>
+            <a:pPr algn="ctr"/>
+            <a:endParaRPr lang="en-US"/>
+          </a:p>
+        </p:txBody>
+      </p:sp>
+      <p:cxnSp>
+        <p:nvCxnSpPr>
+          <p:cNvPr id="8" name="Straight Arrow Connector 7">
+            <a:extLst>
+              <a:ext uri="{FF2B5EF4-FFF2-40B4-BE49-F238E27FC236}">
+                <a16:creationId xmlns:a16="http://schemas.microsoft.com/office/drawing/2014/main" id="{61F681F1-7BCC-4698-A0BA-ACA497FF1972}"/>
+              </a:ext>
+            </a:extLst>
+          </p:cNvPr>
+          <p:cNvCxnSpPr>
+            <a:cxnSpLocks/>
+          </p:cNvCxnSpPr>
+          <p:nvPr/>
+        </p:nvCxnSpPr>
+        <p:spPr>
+          <a:xfrm rot="18900000">
+            <a:off x="4290777" y="3982275"/>
+            <a:ext cx="1417320" cy="0"/>
+          </a:xfrm>
+          <a:prstGeom prst="straightConnector1">
+            <a:avLst/>
+          </a:prstGeom>
+          <a:ln w="19050">
+            <a:solidFill>
+              <a:schemeClr val="tx1"/>
+            </a:solidFill>
+            <a:tailEnd type="triangle"/>
+          </a:ln>
+        </p:spPr>
+        <p:style>
+          <a:lnRef idx="1">
+            <a:schemeClr val="accent1"/>
+          </a:lnRef>
+          <a:fillRef idx="0">
+            <a:schemeClr val="accent1"/>
+          </a:fillRef>
+          <a:effectRef idx="0">
+            <a:schemeClr val="accent1"/>
+          </a:effectRef>
+          <a:fontRef idx="minor">
+            <a:schemeClr val="tx1"/>
+          </a:fontRef>
+        </p:style>
+      </p:cxnSp>
+      <p:cxnSp>
+        <p:nvCxnSpPr>
+          <p:cNvPr id="9" name="Straight Arrow Connector 8">
+            <a:extLst>
+              <a:ext uri="{FF2B5EF4-FFF2-40B4-BE49-F238E27FC236}">
+                <a16:creationId xmlns:a16="http://schemas.microsoft.com/office/drawing/2014/main" id="{DC995CA2-F909-4474-AEEE-D133D87581C8}"/>
+              </a:ext>
+            </a:extLst>
+          </p:cNvPr>
+          <p:cNvCxnSpPr>
+            <a:cxnSpLocks/>
+          </p:cNvCxnSpPr>
+          <p:nvPr/>
+        </p:nvCxnSpPr>
+        <p:spPr>
+          <a:xfrm rot="16200000">
+            <a:off x="4135967" y="2849995"/>
+            <a:ext cx="1554480" cy="0"/>
+          </a:xfrm>
+          <a:prstGeom prst="straightConnector1">
+            <a:avLst/>
+          </a:prstGeom>
+          <a:ln w="19050">
+            <a:solidFill>
+              <a:schemeClr val="tx1"/>
+            </a:solidFill>
+            <a:prstDash val="lgDash"/>
+            <a:tailEnd type="triangle"/>
+          </a:ln>
+        </p:spPr>
+        <p:style>
+          <a:lnRef idx="1">
+            <a:schemeClr val="accent1"/>
+          </a:lnRef>
+          <a:fillRef idx="0">
+            <a:schemeClr val="accent1"/>
+          </a:fillRef>
+          <a:effectRef idx="0">
+            <a:schemeClr val="accent1"/>
+          </a:effectRef>
+          <a:fontRef idx="minor">
+            <a:schemeClr val="tx1"/>
+          </a:fontRef>
+        </p:style>
+      </p:cxnSp>
+      <p:cxnSp>
+        <p:nvCxnSpPr>
+          <p:cNvPr id="10" name="Straight Arrow Connector 9">
+            <a:extLst>
+              <a:ext uri="{FF2B5EF4-FFF2-40B4-BE49-F238E27FC236}">
+                <a16:creationId xmlns:a16="http://schemas.microsoft.com/office/drawing/2014/main" id="{52E35C6B-BD28-4EB0-B325-3D728D47E5A0}"/>
+              </a:ext>
+            </a:extLst>
+          </p:cNvPr>
+          <p:cNvCxnSpPr>
+            <a:cxnSpLocks/>
+          </p:cNvCxnSpPr>
+          <p:nvPr/>
+        </p:nvCxnSpPr>
+        <p:spPr>
+          <a:xfrm rot="13500000">
+            <a:off x="3418886" y="2387659"/>
+            <a:ext cx="1417320" cy="0"/>
+          </a:xfrm>
+          <a:prstGeom prst="straightConnector1">
+            <a:avLst/>
+          </a:prstGeom>
+          <a:ln w="19050">
+            <a:solidFill>
+              <a:schemeClr val="tx1"/>
+            </a:solidFill>
+            <a:prstDash val="dashDot"/>
+            <a:tailEnd type="triangle"/>
+          </a:ln>
+        </p:spPr>
+        <p:style>
+          <a:lnRef idx="1">
+            <a:schemeClr val="accent1"/>
+          </a:lnRef>
+          <a:fillRef idx="0">
+            <a:schemeClr val="accent1"/>
+          </a:fillRef>
+          <a:effectRef idx="0">
+            <a:schemeClr val="accent1"/>
+          </a:effectRef>
+          <a:fontRef idx="minor">
+            <a:schemeClr val="tx1"/>
+          </a:fontRef>
+        </p:style>
+      </p:cxnSp>
+      <p:sp>
+        <p:nvSpPr>
+          <p:cNvPr id="16" name="TextBox 15">
+            <a:extLst>
+              <a:ext uri="{FF2B5EF4-FFF2-40B4-BE49-F238E27FC236}">
+                <a16:creationId xmlns:a16="http://schemas.microsoft.com/office/drawing/2014/main" id="{D3C11641-4473-4CD9-B7F7-87C4F38964DA}"/>
+              </a:ext>
+            </a:extLst>
+          </p:cNvPr>
+          <p:cNvSpPr txBox="1"/>
+          <p:nvPr/>
+        </p:nvSpPr>
+        <p:spPr>
+          <a:xfrm>
+            <a:off x="3292951" y="1564491"/>
+            <a:ext cx="914400" cy="400110"/>
+          </a:xfrm>
+          <a:prstGeom prst="rect">
+            <a:avLst/>
+          </a:prstGeom>
+          <a:noFill/>
+        </p:spPr>
+        <p:txBody>
+          <a:bodyPr wrap="square" rtlCol="0">
+            <a:spAutoFit/>
+          </a:bodyPr>
+          <a:lstStyle/>
+          <a:p>
+            <a:r>
+              <a:rPr lang="en-US" sz="2000" dirty="0">
+                <a:latin typeface="Times New Roman" panose="02020603050405020304" pitchFamily="18" charset="0"/>
+                <a:cs typeface="Times New Roman" panose="02020603050405020304" pitchFamily="18" charset="0"/>
+              </a:rPr>
+              <a:t>v</a:t>
+            </a:r>
+            <a:r>
+              <a:rPr lang="en-US" sz="1200" dirty="0">
+                <a:latin typeface="Times New Roman" panose="02020603050405020304" pitchFamily="18" charset="0"/>
+                <a:cs typeface="Times New Roman" panose="02020603050405020304" pitchFamily="18" charset="0"/>
+              </a:rPr>
+              <a:t>3</a:t>
+            </a:r>
+            <a:endParaRPr lang="en-US" dirty="0">
+              <a:latin typeface="Times New Roman" panose="02020603050405020304" pitchFamily="18" charset="0"/>
+              <a:cs typeface="Times New Roman" panose="02020603050405020304" pitchFamily="18" charset="0"/>
+            </a:endParaRPr>
+          </a:p>
+        </p:txBody>
+      </p:sp>
+      <p:sp>
+        <p:nvSpPr>
+          <p:cNvPr id="18" name="TextBox 17">
+            <a:extLst>
+              <a:ext uri="{FF2B5EF4-FFF2-40B4-BE49-F238E27FC236}">
+                <a16:creationId xmlns:a16="http://schemas.microsoft.com/office/drawing/2014/main" id="{97EC5A5B-201D-4396-81E3-0A97CF3FD72C}"/>
+              </a:ext>
+            </a:extLst>
+          </p:cNvPr>
+          <p:cNvSpPr txBox="1"/>
+          <p:nvPr/>
+        </p:nvSpPr>
+        <p:spPr>
+          <a:xfrm>
+            <a:off x="4704791" y="1712447"/>
+            <a:ext cx="914400" cy="400110"/>
+          </a:xfrm>
+          <a:prstGeom prst="rect">
+            <a:avLst/>
+          </a:prstGeom>
+          <a:noFill/>
+        </p:spPr>
+        <p:txBody>
+          <a:bodyPr wrap="square" rtlCol="0">
+            <a:spAutoFit/>
+          </a:bodyPr>
+          <a:lstStyle/>
+          <a:p>
+            <a:r>
+              <a:rPr lang="en-US" sz="2000" dirty="0">
+                <a:latin typeface="Times New Roman" panose="02020603050405020304" pitchFamily="18" charset="0"/>
+                <a:cs typeface="Times New Roman" panose="02020603050405020304" pitchFamily="18" charset="0"/>
+              </a:rPr>
+              <a:t>v</a:t>
+            </a:r>
+            <a:r>
+              <a:rPr lang="en-US" sz="1200" dirty="0">
+                <a:latin typeface="Times New Roman" panose="02020603050405020304" pitchFamily="18" charset="0"/>
+                <a:cs typeface="Times New Roman" panose="02020603050405020304" pitchFamily="18" charset="0"/>
+              </a:rPr>
+              <a:t>2</a:t>
+            </a:r>
+            <a:endParaRPr lang="en-US" dirty="0">
+              <a:latin typeface="Times New Roman" panose="02020603050405020304" pitchFamily="18" charset="0"/>
+              <a:cs typeface="Times New Roman" panose="02020603050405020304" pitchFamily="18" charset="0"/>
+            </a:endParaRPr>
+          </a:p>
+        </p:txBody>
+      </p:sp>
+      <p:sp>
+        <p:nvSpPr>
+          <p:cNvPr id="20" name="TextBox 19">
+            <a:extLst>
+              <a:ext uri="{FF2B5EF4-FFF2-40B4-BE49-F238E27FC236}">
+                <a16:creationId xmlns:a16="http://schemas.microsoft.com/office/drawing/2014/main" id="{7DB30B95-92C5-4D06-9C28-C72696D5ED33}"/>
+              </a:ext>
+            </a:extLst>
+          </p:cNvPr>
+          <p:cNvSpPr txBox="1"/>
+          <p:nvPr/>
+        </p:nvSpPr>
+        <p:spPr>
+          <a:xfrm>
+            <a:off x="5437208" y="3166666"/>
+            <a:ext cx="914400" cy="400110"/>
+          </a:xfrm>
+          <a:prstGeom prst="rect">
+            <a:avLst/>
+          </a:prstGeom>
+          <a:noFill/>
+        </p:spPr>
+        <p:txBody>
+          <a:bodyPr wrap="square" rtlCol="0">
+            <a:spAutoFit/>
+          </a:bodyPr>
+          <a:lstStyle/>
+          <a:p>
+            <a:r>
+              <a:rPr lang="en-US" sz="2000" dirty="0">
+                <a:latin typeface="Times New Roman" panose="02020603050405020304" pitchFamily="18" charset="0"/>
+                <a:cs typeface="Times New Roman" panose="02020603050405020304" pitchFamily="18" charset="0"/>
+              </a:rPr>
+              <a:t>v</a:t>
+            </a:r>
+            <a:r>
+              <a:rPr lang="en-US" sz="1200" dirty="0">
+                <a:latin typeface="Times New Roman" panose="02020603050405020304" pitchFamily="18" charset="0"/>
+                <a:cs typeface="Times New Roman" panose="02020603050405020304" pitchFamily="18" charset="0"/>
+              </a:rPr>
+              <a:t>1</a:t>
+            </a:r>
+            <a:endParaRPr lang="en-US" dirty="0">
+              <a:latin typeface="Times New Roman" panose="02020603050405020304" pitchFamily="18" charset="0"/>
+              <a:cs typeface="Times New Roman" panose="02020603050405020304" pitchFamily="18" charset="0"/>
+            </a:endParaRPr>
+          </a:p>
+        </p:txBody>
+      </p:sp>
+      <p:sp>
+        <p:nvSpPr>
+          <p:cNvPr id="21" name="TextBox 20">
+            <a:extLst>
+              <a:ext uri="{FF2B5EF4-FFF2-40B4-BE49-F238E27FC236}">
+                <a16:creationId xmlns:a16="http://schemas.microsoft.com/office/drawing/2014/main" id="{FC3F654D-4827-4020-95EC-5654DF8B81EA}"/>
+              </a:ext>
+            </a:extLst>
+          </p:cNvPr>
+          <p:cNvSpPr txBox="1"/>
+          <p:nvPr/>
+        </p:nvSpPr>
+        <p:spPr>
+          <a:xfrm>
+            <a:off x="3464603" y="3458264"/>
+            <a:ext cx="1018547" cy="338554"/>
+          </a:xfrm>
+          <a:prstGeom prst="rect">
+            <a:avLst/>
+          </a:prstGeom>
+          <a:noFill/>
+        </p:spPr>
+        <p:txBody>
+          <a:bodyPr wrap="square" rtlCol="0">
+            <a:spAutoFit/>
+          </a:bodyPr>
+          <a:lstStyle/>
+          <a:p>
+            <a:pPr algn="ctr"/>
+            <a:r>
+              <a:rPr lang="en-US" sz="1600" dirty="0">
+                <a:latin typeface="Times New Roman" panose="02020603050405020304" pitchFamily="18" charset="0"/>
+                <a:cs typeface="Times New Roman" panose="02020603050405020304" pitchFamily="18" charset="0"/>
+              </a:rPr>
+              <a:t>CB</a:t>
+            </a:r>
+          </a:p>
+        </p:txBody>
+      </p:sp>
+      <p:sp>
+        <p:nvSpPr>
+          <p:cNvPr id="24" name="TextBox 23">
+            <a:extLst>
+              <a:ext uri="{FF2B5EF4-FFF2-40B4-BE49-F238E27FC236}">
+                <a16:creationId xmlns:a16="http://schemas.microsoft.com/office/drawing/2014/main" id="{7899B8A6-68C2-4F8A-8B6E-93EB9802C4A6}"/>
+              </a:ext>
+            </a:extLst>
+          </p:cNvPr>
+          <p:cNvSpPr txBox="1"/>
+          <p:nvPr/>
+        </p:nvSpPr>
+        <p:spPr>
+          <a:xfrm>
+            <a:off x="7698720" y="1914009"/>
+            <a:ext cx="914400" cy="400110"/>
+          </a:xfrm>
+          <a:prstGeom prst="rect">
+            <a:avLst/>
+          </a:prstGeom>
+          <a:noFill/>
+        </p:spPr>
+        <p:txBody>
+          <a:bodyPr wrap="square" rtlCol="0">
+            <a:spAutoFit/>
+          </a:bodyPr>
+          <a:lstStyle/>
+          <a:p>
+            <a:r>
+              <a:rPr lang="en-US" sz="2000" dirty="0">
+                <a:latin typeface="Times New Roman" panose="02020603050405020304" pitchFamily="18" charset="0"/>
+                <a:cs typeface="Times New Roman" panose="02020603050405020304" pitchFamily="18" charset="0"/>
+              </a:rPr>
+              <a:t>v</a:t>
+            </a:r>
+            <a:r>
+              <a:rPr lang="en-US" sz="1200" dirty="0">
+                <a:latin typeface="Times New Roman" panose="02020603050405020304" pitchFamily="18" charset="0"/>
+                <a:cs typeface="Times New Roman" panose="02020603050405020304" pitchFamily="18" charset="0"/>
+              </a:rPr>
+              <a:t>2</a:t>
+            </a:r>
+            <a:endParaRPr lang="en-US" dirty="0">
+              <a:latin typeface="Times New Roman" panose="02020603050405020304" pitchFamily="18" charset="0"/>
+              <a:cs typeface="Times New Roman" panose="02020603050405020304" pitchFamily="18" charset="0"/>
+            </a:endParaRPr>
+          </a:p>
+        </p:txBody>
+      </p:sp>
+      <p:sp>
+        <p:nvSpPr>
+          <p:cNvPr id="25" name="TextBox 24">
+            <a:extLst>
+              <a:ext uri="{FF2B5EF4-FFF2-40B4-BE49-F238E27FC236}">
+                <a16:creationId xmlns:a16="http://schemas.microsoft.com/office/drawing/2014/main" id="{B7520F22-B6D4-4E1E-BF00-CD438551EDBE}"/>
+              </a:ext>
+            </a:extLst>
+          </p:cNvPr>
+          <p:cNvSpPr txBox="1"/>
+          <p:nvPr/>
+        </p:nvSpPr>
+        <p:spPr>
+          <a:xfrm>
+            <a:off x="6512534" y="2546757"/>
+            <a:ext cx="914400" cy="400110"/>
+          </a:xfrm>
+          <a:prstGeom prst="rect">
+            <a:avLst/>
+          </a:prstGeom>
+          <a:noFill/>
+        </p:spPr>
+        <p:txBody>
+          <a:bodyPr wrap="square" rtlCol="0">
+            <a:spAutoFit/>
+          </a:bodyPr>
+          <a:lstStyle/>
+          <a:p>
+            <a:r>
+              <a:rPr lang="en-US" sz="2000" dirty="0">
+                <a:latin typeface="Times New Roman" panose="02020603050405020304" pitchFamily="18" charset="0"/>
+                <a:cs typeface="Times New Roman" panose="02020603050405020304" pitchFamily="18" charset="0"/>
+              </a:rPr>
+              <a:t>v</a:t>
+            </a:r>
+            <a:r>
+              <a:rPr lang="en-US" sz="1200" dirty="0">
+                <a:latin typeface="Times New Roman" panose="02020603050405020304" pitchFamily="18" charset="0"/>
+                <a:cs typeface="Times New Roman" panose="02020603050405020304" pitchFamily="18" charset="0"/>
+              </a:rPr>
+              <a:t>3</a:t>
+            </a:r>
+            <a:endParaRPr lang="en-US" dirty="0">
+              <a:latin typeface="Times New Roman" panose="02020603050405020304" pitchFamily="18" charset="0"/>
+              <a:cs typeface="Times New Roman" panose="02020603050405020304" pitchFamily="18" charset="0"/>
+            </a:endParaRPr>
+          </a:p>
+        </p:txBody>
+      </p:sp>
+      <p:sp>
+        <p:nvSpPr>
+          <p:cNvPr id="26" name="TextBox 25">
+            <a:extLst>
+              <a:ext uri="{FF2B5EF4-FFF2-40B4-BE49-F238E27FC236}">
+                <a16:creationId xmlns:a16="http://schemas.microsoft.com/office/drawing/2014/main" id="{C1BF2971-4957-4D89-BC2C-343A8199718D}"/>
+              </a:ext>
+            </a:extLst>
+          </p:cNvPr>
+          <p:cNvSpPr txBox="1"/>
+          <p:nvPr/>
+        </p:nvSpPr>
+        <p:spPr>
+          <a:xfrm>
+            <a:off x="8865514" y="2590019"/>
+            <a:ext cx="914400" cy="400110"/>
+          </a:xfrm>
+          <a:prstGeom prst="rect">
+            <a:avLst/>
+          </a:prstGeom>
+          <a:noFill/>
+        </p:spPr>
+        <p:txBody>
+          <a:bodyPr wrap="square" rtlCol="0">
+            <a:spAutoFit/>
+          </a:bodyPr>
+          <a:lstStyle/>
+          <a:p>
+            <a:r>
+              <a:rPr lang="en-US" sz="2000" dirty="0">
+                <a:latin typeface="Times New Roman" panose="02020603050405020304" pitchFamily="18" charset="0"/>
+                <a:cs typeface="Times New Roman" panose="02020603050405020304" pitchFamily="18" charset="0"/>
+              </a:rPr>
+              <a:t>v</a:t>
+            </a:r>
+            <a:r>
+              <a:rPr lang="en-US" sz="1200" dirty="0">
+                <a:latin typeface="Times New Roman" panose="02020603050405020304" pitchFamily="18" charset="0"/>
+                <a:cs typeface="Times New Roman" panose="02020603050405020304" pitchFamily="18" charset="0"/>
+              </a:rPr>
+              <a:t>1</a:t>
+            </a:r>
+            <a:endParaRPr lang="en-US" dirty="0">
+              <a:latin typeface="Times New Roman" panose="02020603050405020304" pitchFamily="18" charset="0"/>
+              <a:cs typeface="Times New Roman" panose="02020603050405020304" pitchFamily="18" charset="0"/>
+            </a:endParaRPr>
+          </a:p>
+        </p:txBody>
+      </p:sp>
+      <p:sp>
+        <p:nvSpPr>
+          <p:cNvPr id="31" name="Oval 30">
+            <a:extLst>
+              <a:ext uri="{FF2B5EF4-FFF2-40B4-BE49-F238E27FC236}">
+                <a16:creationId xmlns:a16="http://schemas.microsoft.com/office/drawing/2014/main" id="{B6875C43-231C-450C-A768-98969BEA7F30}"/>
+              </a:ext>
+            </a:extLst>
+          </p:cNvPr>
+          <p:cNvSpPr/>
+          <p:nvPr/>
+        </p:nvSpPr>
+        <p:spPr>
+          <a:xfrm rot="16200000">
+            <a:off x="7852446" y="3448446"/>
+            <a:ext cx="91440" cy="91440"/>
+          </a:xfrm>
+          <a:prstGeom prst="ellipse">
+            <a:avLst/>
+          </a:prstGeom>
+          <a:solidFill>
+            <a:schemeClr val="tx1"/>
+          </a:solidFill>
+          <a:ln>
+            <a:solidFill>
+              <a:schemeClr val="tx1"/>
+            </a:solidFill>
+          </a:ln>
+        </p:spPr>
+        <p:style>
+          <a:lnRef idx="2">
+            <a:schemeClr val="accent1">
+              <a:shade val="50000"/>
+            </a:schemeClr>
+          </a:lnRef>
+          <a:fillRef idx="1">
+            <a:schemeClr val="accent1"/>
+          </a:fillRef>
+          <a:effectRef idx="0">
+            <a:schemeClr val="accent1"/>
+          </a:effectRef>
+          <a:fontRef idx="minor">
+            <a:schemeClr val="lt1"/>
+          </a:fontRef>
+        </p:style>
+        <p:txBody>
+          <a:bodyPr rtlCol="0" anchor="ctr"/>
+          <a:lstStyle/>
+          <a:p>
+            <a:pPr algn="ctr"/>
+            <a:endParaRPr lang="en-US"/>
+          </a:p>
+        </p:txBody>
+      </p:sp>
+      <p:sp>
+        <p:nvSpPr>
+          <p:cNvPr id="39" name="Partial Circle 38">
+            <a:extLst>
+              <a:ext uri="{FF2B5EF4-FFF2-40B4-BE49-F238E27FC236}">
+                <a16:creationId xmlns:a16="http://schemas.microsoft.com/office/drawing/2014/main" id="{8FAC88F9-DFB0-456E-BB09-1FC9CA690122}"/>
+              </a:ext>
+            </a:extLst>
+          </p:cNvPr>
+          <p:cNvSpPr/>
+          <p:nvPr/>
+        </p:nvSpPr>
+        <p:spPr>
+          <a:xfrm>
+            <a:off x="7584616" y="3173004"/>
+            <a:ext cx="640080" cy="640080"/>
+          </a:xfrm>
+          <a:prstGeom prst="pie">
+            <a:avLst>
+              <a:gd name="adj1" fmla="val 12747637"/>
+              <a:gd name="adj2" fmla="val 19589198"/>
+            </a:avLst>
+          </a:prstGeom>
+          <a:noFill/>
+          <a:ln w="19050">
+            <a:solidFill>
+              <a:schemeClr val="bg1">
+                <a:lumMod val="50000"/>
+              </a:schemeClr>
+            </a:solidFill>
+          </a:ln>
+        </p:spPr>
+        <p:style>
+          <a:lnRef idx="2">
+            <a:schemeClr val="accent1">
+              <a:shade val="50000"/>
+            </a:schemeClr>
+          </a:lnRef>
+          <a:fillRef idx="1">
+            <a:schemeClr val="accent1"/>
+          </a:fillRef>
+          <a:effectRef idx="0">
+            <a:schemeClr val="accent1"/>
+          </a:effectRef>
+          <a:fontRef idx="minor">
+            <a:schemeClr val="lt1"/>
+          </a:fontRef>
+        </p:style>
+        <p:txBody>
+          <a:bodyPr rtlCol="0" anchor="ctr"/>
+          <a:lstStyle/>
+          <a:p>
+            <a:pPr algn="ctr"/>
+            <a:endParaRPr lang="en-US">
+              <a:solidFill>
+                <a:schemeClr val="tx1"/>
+              </a:solidFill>
+            </a:endParaRPr>
+          </a:p>
+        </p:txBody>
+      </p:sp>
+      <p:sp>
+        <p:nvSpPr>
+          <p:cNvPr id="40" name="Partial Circle 39">
+            <a:extLst>
+              <a:ext uri="{FF2B5EF4-FFF2-40B4-BE49-F238E27FC236}">
+                <a16:creationId xmlns:a16="http://schemas.microsoft.com/office/drawing/2014/main" id="{BA37E5F8-229F-4AAD-AC8E-BF971427B5B0}"/>
+              </a:ext>
+            </a:extLst>
+          </p:cNvPr>
+          <p:cNvSpPr/>
+          <p:nvPr/>
+        </p:nvSpPr>
+        <p:spPr>
+          <a:xfrm rot="5400000">
+            <a:off x="4002053" y="3396178"/>
+            <a:ext cx="457200" cy="457200"/>
+          </a:xfrm>
+          <a:prstGeom prst="pie">
+            <a:avLst>
+              <a:gd name="adj1" fmla="val 12351666"/>
+              <a:gd name="adj2" fmla="val 19687751"/>
+            </a:avLst>
+          </a:prstGeom>
+          <a:noFill/>
+          <a:ln w="19050">
+            <a:solidFill>
+              <a:schemeClr val="bg1">
+                <a:lumMod val="50000"/>
+              </a:schemeClr>
+            </a:solidFill>
+          </a:ln>
+        </p:spPr>
+        <p:style>
+          <a:lnRef idx="2">
+            <a:schemeClr val="accent1">
+              <a:shade val="50000"/>
+            </a:schemeClr>
+          </a:lnRef>
+          <a:fillRef idx="1">
+            <a:schemeClr val="accent1"/>
+          </a:fillRef>
+          <a:effectRef idx="0">
+            <a:schemeClr val="accent1"/>
+          </a:effectRef>
+          <a:fontRef idx="minor">
+            <a:schemeClr val="lt1"/>
+          </a:fontRef>
+        </p:style>
+        <p:txBody>
+          <a:bodyPr rtlCol="0" anchor="ctr"/>
+          <a:lstStyle/>
+          <a:p>
+            <a:pPr algn="ctr"/>
+            <a:endParaRPr lang="en-US">
+              <a:solidFill>
+                <a:schemeClr val="tx1"/>
+              </a:solidFill>
+            </a:endParaRPr>
+          </a:p>
+        </p:txBody>
+      </p:sp>
+      <p:cxnSp>
+        <p:nvCxnSpPr>
+          <p:cNvPr id="43" name="Straight Connector 42">
+            <a:extLst>
+              <a:ext uri="{FF2B5EF4-FFF2-40B4-BE49-F238E27FC236}">
+                <a16:creationId xmlns:a16="http://schemas.microsoft.com/office/drawing/2014/main" id="{D5D14634-A7E3-48FC-8526-9DBF0041B12F}"/>
+              </a:ext>
+            </a:extLst>
+          </p:cNvPr>
+          <p:cNvCxnSpPr>
+            <a:cxnSpLocks/>
+            <a:endCxn id="4" idx="11"/>
+          </p:cNvCxnSpPr>
+          <p:nvPr/>
+        </p:nvCxnSpPr>
+        <p:spPr>
+          <a:xfrm flipV="1">
+            <a:off x="4228107" y="2848122"/>
+            <a:ext cx="367729" cy="788946"/>
+          </a:xfrm>
+          <a:prstGeom prst="line">
+            <a:avLst/>
+          </a:prstGeom>
+          <a:ln w="19050">
+            <a:solidFill>
+              <a:schemeClr val="bg1">
+                <a:lumMod val="50000"/>
+              </a:schemeClr>
+            </a:solidFill>
+          </a:ln>
+        </p:spPr>
+        <p:style>
+          <a:lnRef idx="1">
+            <a:schemeClr val="accent1"/>
+          </a:lnRef>
+          <a:fillRef idx="0">
+            <a:schemeClr val="accent1"/>
+          </a:fillRef>
+          <a:effectRef idx="0">
+            <a:schemeClr val="accent1"/>
+          </a:effectRef>
+          <a:fontRef idx="minor">
+            <a:schemeClr val="tx1"/>
+          </a:fontRef>
+        </p:style>
+      </p:cxnSp>
+      <p:cxnSp>
+        <p:nvCxnSpPr>
+          <p:cNvPr id="47" name="Straight Connector 46">
+            <a:extLst>
+              <a:ext uri="{FF2B5EF4-FFF2-40B4-BE49-F238E27FC236}">
+                <a16:creationId xmlns:a16="http://schemas.microsoft.com/office/drawing/2014/main" id="{547ECB57-5FD8-4D89-AE36-EE3FDA15CA61}"/>
+              </a:ext>
+            </a:extLst>
+          </p:cNvPr>
+          <p:cNvCxnSpPr>
+            <a:cxnSpLocks/>
+          </p:cNvCxnSpPr>
+          <p:nvPr/>
+        </p:nvCxnSpPr>
+        <p:spPr>
+          <a:xfrm>
+            <a:off x="4227408" y="3612585"/>
+            <a:ext cx="409187" cy="716003"/>
+          </a:xfrm>
+          <a:prstGeom prst="line">
+            <a:avLst/>
+          </a:prstGeom>
+          <a:ln w="19050">
+            <a:solidFill>
+              <a:schemeClr val="bg1">
+                <a:lumMod val="50000"/>
+              </a:schemeClr>
+            </a:solidFill>
+          </a:ln>
+        </p:spPr>
+        <p:style>
+          <a:lnRef idx="1">
+            <a:schemeClr val="accent1"/>
+          </a:lnRef>
+          <a:fillRef idx="0">
+            <a:schemeClr val="accent1"/>
+          </a:fillRef>
+          <a:effectRef idx="0">
+            <a:schemeClr val="accent1"/>
+          </a:effectRef>
+          <a:fontRef idx="minor">
+            <a:schemeClr val="tx1"/>
+          </a:fontRef>
+        </p:style>
+      </p:cxnSp>
+      <p:sp>
+        <p:nvSpPr>
+          <p:cNvPr id="51" name="TextBox 50">
+            <a:extLst>
+              <a:ext uri="{FF2B5EF4-FFF2-40B4-BE49-F238E27FC236}">
+                <a16:creationId xmlns:a16="http://schemas.microsoft.com/office/drawing/2014/main" id="{23BCC0AA-2377-4E1E-AAE6-A49475FC1007}"/>
+              </a:ext>
+            </a:extLst>
+          </p:cNvPr>
+          <p:cNvSpPr txBox="1"/>
+          <p:nvPr/>
+        </p:nvSpPr>
+        <p:spPr>
+          <a:xfrm>
+            <a:off x="4438941" y="3401111"/>
+            <a:ext cx="914400" cy="400110"/>
+          </a:xfrm>
+          <a:prstGeom prst="rect">
+            <a:avLst/>
+          </a:prstGeom>
+          <a:noFill/>
+        </p:spPr>
+        <p:txBody>
+          <a:bodyPr wrap="square" rtlCol="0">
+            <a:spAutoFit/>
+          </a:bodyPr>
+          <a:lstStyle/>
+          <a:p>
+            <a:r>
+              <a:rPr lang="el-GR" sz="2000" dirty="0">
+                <a:latin typeface="Times New Roman" panose="02020603050405020304" pitchFamily="18" charset="0"/>
+                <a:cs typeface="Times New Roman" panose="02020603050405020304" pitchFamily="18" charset="0"/>
+              </a:rPr>
+              <a:t>Δ</a:t>
+            </a:r>
+            <a:r>
+              <a:rPr lang="en-US" sz="2000" i="1" dirty="0">
+                <a:latin typeface="Times New Roman" panose="02020603050405020304" pitchFamily="18" charset="0"/>
+                <a:cs typeface="Times New Roman" panose="02020603050405020304" pitchFamily="18" charset="0"/>
+              </a:rPr>
+              <a:t>f</a:t>
+            </a:r>
+            <a:endParaRPr lang="en-US" i="1" dirty="0">
+              <a:latin typeface="Times New Roman" panose="02020603050405020304" pitchFamily="18" charset="0"/>
+              <a:cs typeface="Times New Roman" panose="02020603050405020304" pitchFamily="18" charset="0"/>
+            </a:endParaRPr>
+          </a:p>
+        </p:txBody>
+      </p:sp>
+      <p:sp>
+        <p:nvSpPr>
+          <p:cNvPr id="52" name="TextBox 51">
+            <a:extLst>
+              <a:ext uri="{FF2B5EF4-FFF2-40B4-BE49-F238E27FC236}">
+                <a16:creationId xmlns:a16="http://schemas.microsoft.com/office/drawing/2014/main" id="{D3536E0D-4670-4EBA-BDA1-F9191F586EA0}"/>
+              </a:ext>
+            </a:extLst>
+          </p:cNvPr>
+          <p:cNvSpPr txBox="1"/>
+          <p:nvPr/>
+        </p:nvSpPr>
+        <p:spPr>
+          <a:xfrm>
+            <a:off x="7932981" y="2826201"/>
+            <a:ext cx="914400" cy="400110"/>
+          </a:xfrm>
+          <a:prstGeom prst="rect">
+            <a:avLst/>
+          </a:prstGeom>
+          <a:noFill/>
+        </p:spPr>
+        <p:txBody>
+          <a:bodyPr wrap="square" rtlCol="0">
+            <a:spAutoFit/>
+          </a:bodyPr>
+          <a:lstStyle/>
+          <a:p>
+            <a:r>
+              <a:rPr lang="el-GR" sz="2000" dirty="0">
+                <a:latin typeface="Times New Roman" panose="02020603050405020304" pitchFamily="18" charset="0"/>
+                <a:cs typeface="Times New Roman" panose="02020603050405020304" pitchFamily="18" charset="0"/>
+              </a:rPr>
+              <a:t>Δ</a:t>
+            </a:r>
+            <a:r>
+              <a:rPr lang="en-US" sz="2000" i="1" dirty="0">
+                <a:latin typeface="Times New Roman" panose="02020603050405020304" pitchFamily="18" charset="0"/>
+                <a:cs typeface="Times New Roman" panose="02020603050405020304" pitchFamily="18" charset="0"/>
+              </a:rPr>
+              <a:t>f</a:t>
+            </a:r>
+            <a:endParaRPr lang="en-US" i="1" dirty="0">
+              <a:latin typeface="Times New Roman" panose="02020603050405020304" pitchFamily="18" charset="0"/>
+              <a:cs typeface="Times New Roman" panose="02020603050405020304" pitchFamily="18" charset="0"/>
+            </a:endParaRPr>
+          </a:p>
+        </p:txBody>
+      </p:sp>
+      <p:cxnSp>
+        <p:nvCxnSpPr>
+          <p:cNvPr id="58" name="Straight Arrow Connector 57">
+            <a:extLst>
+              <a:ext uri="{FF2B5EF4-FFF2-40B4-BE49-F238E27FC236}">
+                <a16:creationId xmlns:a16="http://schemas.microsoft.com/office/drawing/2014/main" id="{52C4066A-1F1F-4104-8112-576F0C0DB420}"/>
+              </a:ext>
+            </a:extLst>
+          </p:cNvPr>
+          <p:cNvCxnSpPr/>
+          <p:nvPr/>
+        </p:nvCxnSpPr>
+        <p:spPr>
+          <a:xfrm>
+            <a:off x="10205884" y="3156834"/>
+            <a:ext cx="0" cy="346173"/>
+          </a:xfrm>
+          <a:prstGeom prst="straightConnector1">
+            <a:avLst/>
+          </a:prstGeom>
+          <a:ln>
+            <a:solidFill>
+              <a:schemeClr val="bg1">
+                <a:lumMod val="50000"/>
+              </a:schemeClr>
+            </a:solidFill>
+            <a:tailEnd type="triangle"/>
+          </a:ln>
+        </p:spPr>
+        <p:style>
+          <a:lnRef idx="1">
+            <a:schemeClr val="accent1"/>
+          </a:lnRef>
+          <a:fillRef idx="0">
+            <a:schemeClr val="accent1"/>
+          </a:fillRef>
+          <a:effectRef idx="0">
+            <a:schemeClr val="accent1"/>
+          </a:effectRef>
+          <a:fontRef idx="minor">
+            <a:schemeClr val="tx1"/>
+          </a:fontRef>
+        </p:style>
+      </p:cxnSp>
+      <p:cxnSp>
+        <p:nvCxnSpPr>
+          <p:cNvPr id="59" name="Straight Arrow Connector 58">
+            <a:extLst>
+              <a:ext uri="{FF2B5EF4-FFF2-40B4-BE49-F238E27FC236}">
+                <a16:creationId xmlns:a16="http://schemas.microsoft.com/office/drawing/2014/main" id="{8394C20B-91D5-4AB6-90A2-AC845E3A2646}"/>
+              </a:ext>
+            </a:extLst>
+          </p:cNvPr>
+          <p:cNvCxnSpPr>
+            <a:cxnSpLocks/>
+          </p:cNvCxnSpPr>
+          <p:nvPr/>
+        </p:nvCxnSpPr>
+        <p:spPr>
+          <a:xfrm rot="10800000">
+            <a:off x="10205884" y="2304361"/>
+            <a:ext cx="0" cy="346173"/>
+          </a:xfrm>
+          <a:prstGeom prst="straightConnector1">
+            <a:avLst/>
+          </a:prstGeom>
+          <a:ln>
+            <a:solidFill>
+              <a:schemeClr val="bg1">
+                <a:lumMod val="50000"/>
+              </a:schemeClr>
+            </a:solidFill>
+            <a:tailEnd type="triangle"/>
+          </a:ln>
+        </p:spPr>
+        <p:style>
+          <a:lnRef idx="1">
+            <a:schemeClr val="accent1"/>
+          </a:lnRef>
+          <a:fillRef idx="0">
+            <a:schemeClr val="accent1"/>
+          </a:fillRef>
+          <a:effectRef idx="0">
+            <a:schemeClr val="accent1"/>
+          </a:effectRef>
+          <a:fontRef idx="minor">
+            <a:schemeClr val="tx1"/>
+          </a:fontRef>
+        </p:style>
+      </p:cxnSp>
+      <p:cxnSp>
+        <p:nvCxnSpPr>
+          <p:cNvPr id="60" name="Straight Arrow Connector 59">
+            <a:extLst>
+              <a:ext uri="{FF2B5EF4-FFF2-40B4-BE49-F238E27FC236}">
+                <a16:creationId xmlns:a16="http://schemas.microsoft.com/office/drawing/2014/main" id="{02F88834-77AA-45A1-9811-324CE8643D82}"/>
+              </a:ext>
+            </a:extLst>
+          </p:cNvPr>
+          <p:cNvCxnSpPr>
+            <a:cxnSpLocks/>
+          </p:cNvCxnSpPr>
+          <p:nvPr/>
+        </p:nvCxnSpPr>
+        <p:spPr>
+          <a:xfrm rot="10800000">
+            <a:off x="10200971" y="3882436"/>
+            <a:ext cx="0" cy="346173"/>
+          </a:xfrm>
+          <a:prstGeom prst="straightConnector1">
+            <a:avLst/>
+          </a:prstGeom>
+          <a:ln>
+            <a:solidFill>
+              <a:schemeClr val="bg1">
+                <a:lumMod val="50000"/>
+              </a:schemeClr>
+            </a:solidFill>
+            <a:tailEnd type="triangle"/>
+          </a:ln>
+        </p:spPr>
+        <p:style>
+          <a:lnRef idx="1">
+            <a:schemeClr val="accent1"/>
+          </a:lnRef>
+          <a:fillRef idx="0">
+            <a:schemeClr val="accent1"/>
+          </a:fillRef>
+          <a:effectRef idx="0">
+            <a:schemeClr val="accent1"/>
+          </a:effectRef>
+          <a:fontRef idx="minor">
+            <a:schemeClr val="tx1"/>
+          </a:fontRef>
+        </p:style>
+      </p:cxnSp>
+      <p:sp>
+        <p:nvSpPr>
+          <p:cNvPr id="62" name="TextBox 61">
+            <a:extLst>
+              <a:ext uri="{FF2B5EF4-FFF2-40B4-BE49-F238E27FC236}">
+                <a16:creationId xmlns:a16="http://schemas.microsoft.com/office/drawing/2014/main" id="{A230DEBF-6550-45FD-A81F-F054C9810FCA}"/>
+              </a:ext>
+            </a:extLst>
+          </p:cNvPr>
+          <p:cNvSpPr txBox="1"/>
+          <p:nvPr/>
+        </p:nvSpPr>
+        <p:spPr>
+          <a:xfrm>
+            <a:off x="9743771" y="2711110"/>
+            <a:ext cx="914400" cy="400110"/>
+          </a:xfrm>
+          <a:prstGeom prst="rect">
+            <a:avLst/>
+          </a:prstGeom>
+          <a:noFill/>
+        </p:spPr>
+        <p:txBody>
+          <a:bodyPr wrap="square" rtlCol="0">
+            <a:spAutoFit/>
+          </a:bodyPr>
+          <a:lstStyle/>
+          <a:p>
+            <a:pPr algn="ctr"/>
+            <a:r>
+              <a:rPr lang="en-US" sz="2000" i="1" dirty="0">
+                <a:latin typeface="Times New Roman" panose="02020603050405020304" pitchFamily="18" charset="0"/>
+                <a:cs typeface="Times New Roman" panose="02020603050405020304" pitchFamily="18" charset="0"/>
+              </a:rPr>
+              <a:t>R</a:t>
+            </a:r>
+            <a:endParaRPr lang="en-US" i="1" dirty="0">
+              <a:latin typeface="Times New Roman" panose="02020603050405020304" pitchFamily="18" charset="0"/>
+              <a:cs typeface="Times New Roman" panose="02020603050405020304" pitchFamily="18" charset="0"/>
+            </a:endParaRPr>
+          </a:p>
+        </p:txBody>
+      </p:sp>
+      <p:sp>
+        <p:nvSpPr>
+          <p:cNvPr id="63" name="TextBox 62">
+            <a:extLst>
+              <a:ext uri="{FF2B5EF4-FFF2-40B4-BE49-F238E27FC236}">
+                <a16:creationId xmlns:a16="http://schemas.microsoft.com/office/drawing/2014/main" id="{7CBBF5CE-7EB9-44C1-8A0B-92F03AFEBF3A}"/>
+              </a:ext>
+            </a:extLst>
+          </p:cNvPr>
+          <p:cNvSpPr txBox="1"/>
+          <p:nvPr/>
+        </p:nvSpPr>
+        <p:spPr>
+          <a:xfrm>
+            <a:off x="9752838" y="3477377"/>
+            <a:ext cx="914400" cy="400110"/>
+          </a:xfrm>
+          <a:prstGeom prst="rect">
+            <a:avLst/>
+          </a:prstGeom>
+          <a:noFill/>
+        </p:spPr>
+        <p:txBody>
+          <a:bodyPr wrap="square" rtlCol="0">
+            <a:spAutoFit/>
+          </a:bodyPr>
+          <a:lstStyle/>
+          <a:p>
+            <a:pPr algn="ctr"/>
+            <a:r>
+              <a:rPr lang="en-US" sz="2000" i="1" dirty="0">
+                <a:latin typeface="Times New Roman" panose="02020603050405020304" pitchFamily="18" charset="0"/>
+                <a:cs typeface="Times New Roman" panose="02020603050405020304" pitchFamily="18" charset="0"/>
+              </a:rPr>
+              <a:t>c</a:t>
+            </a:r>
+            <a:endParaRPr lang="en-US" i="1" dirty="0">
+              <a:latin typeface="Times New Roman" panose="02020603050405020304" pitchFamily="18" charset="0"/>
+              <a:cs typeface="Times New Roman" panose="02020603050405020304" pitchFamily="18" charset="0"/>
+            </a:endParaRPr>
+          </a:p>
+        </p:txBody>
+      </p:sp>
+      <p:sp>
+        <p:nvSpPr>
+          <p:cNvPr id="41" name="Partial Circle 40">
+            <a:extLst>
+              <a:ext uri="{FF2B5EF4-FFF2-40B4-BE49-F238E27FC236}">
+                <a16:creationId xmlns:a16="http://schemas.microsoft.com/office/drawing/2014/main" id="{B8A26125-D23B-4BCB-933A-30498E2C5AC4}"/>
+              </a:ext>
+            </a:extLst>
+          </p:cNvPr>
+          <p:cNvSpPr/>
+          <p:nvPr/>
+        </p:nvSpPr>
+        <p:spPr>
+          <a:xfrm>
+            <a:off x="7451878" y="3040271"/>
+            <a:ext cx="914400" cy="914400"/>
+          </a:xfrm>
+          <a:prstGeom prst="pie">
+            <a:avLst>
+              <a:gd name="adj1" fmla="val 12747637"/>
+              <a:gd name="adj2" fmla="val 16170213"/>
+            </a:avLst>
+          </a:prstGeom>
+          <a:noFill/>
+          <a:ln w="19050">
+            <a:solidFill>
+              <a:schemeClr val="bg1">
+                <a:lumMod val="50000"/>
+              </a:schemeClr>
+            </a:solidFill>
+          </a:ln>
+        </p:spPr>
+        <p:style>
+          <a:lnRef idx="2">
+            <a:schemeClr val="accent1">
+              <a:shade val="50000"/>
+            </a:schemeClr>
+          </a:lnRef>
+          <a:fillRef idx="1">
+            <a:schemeClr val="accent1"/>
+          </a:fillRef>
+          <a:effectRef idx="0">
+            <a:schemeClr val="accent1"/>
+          </a:effectRef>
+          <a:fontRef idx="minor">
+            <a:schemeClr val="lt1"/>
+          </a:fontRef>
+        </p:style>
+        <p:txBody>
+          <a:bodyPr rtlCol="0" anchor="ctr"/>
+          <a:lstStyle/>
+          <a:p>
+            <a:pPr algn="ctr"/>
+            <a:endParaRPr lang="en-US">
+              <a:solidFill>
+                <a:schemeClr val="tx1"/>
+              </a:solidFill>
+            </a:endParaRPr>
+          </a:p>
+        </p:txBody>
+      </p:sp>
+      <p:sp>
+        <p:nvSpPr>
+          <p:cNvPr id="42" name="TextBox 41">
+            <a:extLst>
+              <a:ext uri="{FF2B5EF4-FFF2-40B4-BE49-F238E27FC236}">
+                <a16:creationId xmlns:a16="http://schemas.microsoft.com/office/drawing/2014/main" id="{5463907E-5B86-4A81-BA87-0137DA96CB01}"/>
+              </a:ext>
+            </a:extLst>
+          </p:cNvPr>
+          <p:cNvSpPr txBox="1"/>
+          <p:nvPr/>
+        </p:nvSpPr>
+        <p:spPr>
+          <a:xfrm>
+            <a:off x="7522497" y="2701736"/>
+            <a:ext cx="914400" cy="400110"/>
+          </a:xfrm>
+          <a:prstGeom prst="rect">
+            <a:avLst/>
+          </a:prstGeom>
+          <a:noFill/>
+        </p:spPr>
+        <p:txBody>
+          <a:bodyPr wrap="square" rtlCol="0">
+            <a:spAutoFit/>
+          </a:bodyPr>
+          <a:lstStyle/>
+          <a:p>
+            <a:r>
+              <a:rPr lang="en-US" sz="2000" i="1" dirty="0">
+                <a:latin typeface="Times New Roman" panose="02020603050405020304" pitchFamily="18" charset="0"/>
+                <a:cs typeface="Times New Roman" panose="02020603050405020304" pitchFamily="18" charset="0"/>
+              </a:rPr>
+              <a:t>f</a:t>
+            </a:r>
+            <a:endParaRPr lang="en-US" i="1" dirty="0">
+              <a:latin typeface="Times New Roman" panose="02020603050405020304" pitchFamily="18" charset="0"/>
+              <a:cs typeface="Times New Roman" panose="02020603050405020304" pitchFamily="18" charset="0"/>
+            </a:endParaRPr>
+          </a:p>
+        </p:txBody>
+      </p:sp>
+    </p:spTree>
+    <p:extLst>
+      <p:ext uri="{BB962C8B-B14F-4D97-AF65-F5344CB8AC3E}">
+        <p14:creationId xmlns:p14="http://schemas.microsoft.com/office/powerpoint/2010/main" val="4061371707"/>
       </p:ext>
     </p:extLst>
   </p:cSld>

</xml_diff>